<commit_message>
Site updated: 2024-12-26 11:27:57
</commit_message>
<xml_diff>
--- a/pdf/PASRML/王艺霖_基于机器学习的行星大气光谱反演.pptx
+++ b/pdf/PASRML/王艺霖_基于机器学习的行星大气光谱反演.pptx
@@ -227,7 +227,7 @@
           <a:p>
             <a:fld id="{04443101-678E-44A3-A2F4-0899093EB440}" type="datetimeFigureOut">
               <a:rPr lang="zh-CN" altLang="en-US" smtClean="0"/>
-              <a:t>2024/12/25</a:t>
+              <a:t>2024/12/26</a:t>
             </a:fld>
             <a:endParaRPr lang="zh-CN" altLang="en-US"/>
           </a:p>
@@ -2333,7 +2333,7 @@
           <a:p>
             <a:fld id="{514FC1B0-AAA2-42A6-B6FD-676BEC986EE3}" type="datetime1">
               <a:rPr lang="zh-CN" altLang="en-US" smtClean="0"/>
-              <a:t>2024/12/25</a:t>
+              <a:t>2024/12/26</a:t>
             </a:fld>
             <a:endParaRPr lang="zh-CN" altLang="en-US"/>
           </a:p>
@@ -2531,7 +2531,7 @@
           <a:p>
             <a:fld id="{C31E058D-DBE4-45FF-8A56-59BB0C7037FF}" type="datetime1">
               <a:rPr lang="zh-CN" altLang="en-US" smtClean="0"/>
-              <a:t>2024/12/25</a:t>
+              <a:t>2024/12/26</a:t>
             </a:fld>
             <a:endParaRPr lang="zh-CN" altLang="en-US"/>
           </a:p>
@@ -2739,7 +2739,7 @@
           <a:p>
             <a:fld id="{1901C27B-4A15-48D5-81A6-6179AF3BB4A3}" type="datetime1">
               <a:rPr lang="zh-CN" altLang="en-US" smtClean="0"/>
-              <a:t>2024/12/25</a:t>
+              <a:t>2024/12/26</a:t>
             </a:fld>
             <a:endParaRPr lang="zh-CN" altLang="en-US"/>
           </a:p>
@@ -2937,7 +2937,7 @@
           <a:p>
             <a:fld id="{7BDE3042-71A2-4631-B0B2-AF8B4AA3EE5A}" type="datetime1">
               <a:rPr lang="zh-CN" altLang="en-US" smtClean="0"/>
-              <a:t>2024/12/25</a:t>
+              <a:t>2024/12/26</a:t>
             </a:fld>
             <a:endParaRPr lang="zh-CN" altLang="en-US"/>
           </a:p>
@@ -3212,7 +3212,7 @@
           <a:p>
             <a:fld id="{DC86395C-4BF0-4E4C-8E21-62A0DC546E86}" type="datetime1">
               <a:rPr lang="zh-CN" altLang="en-US" smtClean="0"/>
-              <a:t>2024/12/25</a:t>
+              <a:t>2024/12/26</a:t>
             </a:fld>
             <a:endParaRPr lang="zh-CN" altLang="en-US"/>
           </a:p>
@@ -3477,7 +3477,7 @@
           <a:p>
             <a:fld id="{99D9D908-C953-49DB-8B38-828068F37CCB}" type="datetime1">
               <a:rPr lang="zh-CN" altLang="en-US" smtClean="0"/>
-              <a:t>2024/12/25</a:t>
+              <a:t>2024/12/26</a:t>
             </a:fld>
             <a:endParaRPr lang="zh-CN" altLang="en-US"/>
           </a:p>
@@ -3889,7 +3889,7 @@
           <a:p>
             <a:fld id="{DB327C16-0DC7-4F15-B9E3-10CEB92B3803}" type="datetime1">
               <a:rPr lang="zh-CN" altLang="en-US" smtClean="0"/>
-              <a:t>2024/12/25</a:t>
+              <a:t>2024/12/26</a:t>
             </a:fld>
             <a:endParaRPr lang="zh-CN" altLang="en-US"/>
           </a:p>
@@ -4030,7 +4030,7 @@
           <a:p>
             <a:fld id="{7C7B88F9-4AFB-4977-A8F7-86048E81AB5E}" type="datetime1">
               <a:rPr lang="zh-CN" altLang="en-US" smtClean="0"/>
-              <a:t>2024/12/25</a:t>
+              <a:t>2024/12/26</a:t>
             </a:fld>
             <a:endParaRPr lang="zh-CN" altLang="en-US"/>
           </a:p>
@@ -4143,7 +4143,7 @@
           <a:p>
             <a:fld id="{39E2C160-A688-4924-AE14-6CDEBBFBE807}" type="datetime1">
               <a:rPr lang="zh-CN" altLang="en-US" smtClean="0"/>
-              <a:t>2024/12/25</a:t>
+              <a:t>2024/12/26</a:t>
             </a:fld>
             <a:endParaRPr lang="zh-CN" altLang="en-US"/>
           </a:p>
@@ -4454,7 +4454,7 @@
           <a:p>
             <a:fld id="{5DECAD19-4AF8-4EAD-9662-431904DD7D85}" type="datetime1">
               <a:rPr lang="zh-CN" altLang="en-US" smtClean="0"/>
-              <a:t>2024/12/25</a:t>
+              <a:t>2024/12/26</a:t>
             </a:fld>
             <a:endParaRPr lang="zh-CN" altLang="en-US"/>
           </a:p>
@@ -4742,7 +4742,7 @@
           <a:p>
             <a:fld id="{41CAB997-B187-4302-9C37-8592B4C1B67F}" type="datetime1">
               <a:rPr lang="zh-CN" altLang="en-US" smtClean="0"/>
-              <a:t>2024/12/25</a:t>
+              <a:t>2024/12/26</a:t>
             </a:fld>
             <a:endParaRPr lang="zh-CN" altLang="en-US"/>
           </a:p>
@@ -4983,7 +4983,7 @@
           <a:p>
             <a:fld id="{36E60CAF-3A8F-49E2-B6B7-00F15C7D6228}" type="datetime1">
               <a:rPr lang="zh-CN" altLang="en-US" smtClean="0"/>
-              <a:t>2024/12/25</a:t>
+              <a:t>2024/12/26</a:t>
             </a:fld>
             <a:endParaRPr lang="zh-CN" altLang="en-US"/>
           </a:p>
@@ -13878,8 +13878,8 @@
           </a:p>
         </p:txBody>
       </p:sp>
-      <mc:AlternateContent xmlns:mc="http://schemas.openxmlformats.org/markup-compatibility/2006" xmlns:a14="http://schemas.microsoft.com/office/drawing/2010/main">
-        <mc:Choice Requires="a14">
+      <mc:AlternateContent xmlns:mc="http://schemas.openxmlformats.org/markup-compatibility/2006">
+        <mc:Choice xmlns:a14="http://schemas.microsoft.com/office/drawing/2010/main" Requires="a14">
           <p:sp>
             <p:nvSpPr>
               <p:cNvPr id="8" name="文本框 7">
@@ -14250,7 +14250,7 @@
                     <a:latin typeface="Times New Roman" panose="02020603050405020304" pitchFamily="18" charset="0"/>
                     <a:cs typeface="Times New Roman" panose="02020603050405020304" pitchFamily="18" charset="0"/>
                   </a:rPr>
-                  <a:t>种痕量气体）</a:t>
+                  <a:t>种微量气体）</a:t>
                 </a:r>
                 <a:endParaRPr lang="en-US" altLang="zh-CN" sz="2400" dirty="0">
                   <a:latin typeface="Times New Roman" panose="02020603050405020304" pitchFamily="18" charset="0"/>
@@ -15089,7 +15089,7 @@
             </p:txBody>
           </p:sp>
         </mc:Choice>
-        <mc:Fallback xmlns="">
+        <mc:Fallback>
           <p:sp>
             <p:nvSpPr>
               <p:cNvPr id="8" name="文本框 7">
@@ -15626,8 +15626,8 @@
           </a:p>
         </p:txBody>
       </p:sp>
-      <mc:AlternateContent xmlns:mc="http://schemas.openxmlformats.org/markup-compatibility/2006" xmlns:a14="http://schemas.microsoft.com/office/drawing/2010/main">
-        <mc:Choice Requires="a14">
+      <mc:AlternateContent xmlns:mc="http://schemas.openxmlformats.org/markup-compatibility/2006">
+        <mc:Choice xmlns:a14="http://schemas.microsoft.com/office/drawing/2010/main" Requires="a14">
           <p:sp>
             <p:nvSpPr>
               <p:cNvPr id="10" name="文本框 9">
@@ -15642,8 +15642,8 @@
             </p:nvSpPr>
             <p:spPr>
               <a:xfrm>
-                <a:off x="995320" y="3429000"/>
-                <a:ext cx="7808815" cy="1890261"/>
+                <a:off x="995321" y="3429000"/>
+                <a:ext cx="7012404" cy="1890261"/>
               </a:xfrm>
               <a:prstGeom prst="rect">
                 <a:avLst/>
@@ -15802,7 +15802,7 @@
             </p:txBody>
           </p:sp>
         </mc:Choice>
-        <mc:Fallback xmlns="">
+        <mc:Fallback>
           <p:sp>
             <p:nvSpPr>
               <p:cNvPr id="10" name="文本框 9">
@@ -15819,8 +15819,8 @@
             </p:nvSpPr>
             <p:spPr>
               <a:xfrm>
-                <a:off x="995320" y="3429000"/>
-                <a:ext cx="7808815" cy="1890261"/>
+                <a:off x="995321" y="3429000"/>
+                <a:ext cx="7012404" cy="1890261"/>
               </a:xfrm>
               <a:prstGeom prst="rect">
                 <a:avLst/>
@@ -15828,7 +15828,7 @@
               <a:blipFill>
                 <a:blip r:embed="rId5"/>
                 <a:stretch>
-                  <a:fillRect l="-781" b="-4516"/>
+                  <a:fillRect l="-869" b="-4516"/>
                 </a:stretch>
               </a:blipFill>
             </p:spPr>
@@ -18075,7 +18075,7 @@
         </p:blipFill>
         <p:spPr>
           <a:xfrm>
-            <a:off x="2249363" y="717657"/>
+            <a:off x="723115" y="717657"/>
             <a:ext cx="7693274" cy="5074426"/>
           </a:xfrm>
           <a:prstGeom prst="rect">
@@ -18083,8 +18083,8 @@
           </a:prstGeom>
         </p:spPr>
       </p:pic>
-      <mc:AlternateContent xmlns:mc="http://schemas.openxmlformats.org/markup-compatibility/2006" xmlns:a14="http://schemas.microsoft.com/office/drawing/2010/main">
-        <mc:Choice Requires="a14">
+      <mc:AlternateContent xmlns:mc="http://schemas.openxmlformats.org/markup-compatibility/2006">
+        <mc:Choice xmlns:a14="http://schemas.microsoft.com/office/drawing/2010/main" Requires="a14">
           <p:sp>
             <p:nvSpPr>
               <p:cNvPr id="11" name="文本框 10">
@@ -18099,7 +18099,7 @@
             </p:nvSpPr>
             <p:spPr>
               <a:xfrm>
-                <a:off x="2763368" y="5932584"/>
+                <a:off x="1163160" y="5932584"/>
                 <a:ext cx="7218832" cy="461665"/>
               </a:xfrm>
               <a:prstGeom prst="rect">
@@ -18156,7 +18156,21 @@
                         <a:latin typeface="Cambria Math" panose="02040503050406030204" pitchFamily="18" charset="0"/>
                         <a:cs typeface="Times New Roman" panose="02020603050405020304" pitchFamily="18" charset="0"/>
                       </a:rPr>
-                      <m:t>, {</m:t>
+                      <m:t>, </m:t>
+                    </m:r>
+                    <m:r>
+                      <a:rPr lang="en-US" altLang="zh-CN" sz="2400" b="0" i="1" smtClean="0">
+                        <a:latin typeface="Cambria Math" panose="02040503050406030204" pitchFamily="18" charset="0"/>
+                        <a:cs typeface="Times New Roman" panose="02020603050405020304" pitchFamily="18" charset="0"/>
+                      </a:rPr>
+                      <m:t> </m:t>
+                    </m:r>
+                    <m:r>
+                      <a:rPr lang="en-US" altLang="zh-CN" sz="2400" b="0" i="1" smtClean="0">
+                        <a:latin typeface="Cambria Math" panose="02040503050406030204" pitchFamily="18" charset="0"/>
+                        <a:cs typeface="Times New Roman" panose="02020603050405020304" pitchFamily="18" charset="0"/>
+                      </a:rPr>
+                      <m:t>{</m:t>
                     </m:r>
                     <m:sSub>
                       <m:sSubPr>
@@ -18455,7 +18469,7 @@
             </p:txBody>
           </p:sp>
         </mc:Choice>
-        <mc:Fallback xmlns="">
+        <mc:Fallback>
           <p:sp>
             <p:nvSpPr>
               <p:cNvPr id="11" name="文本框 10">
@@ -18472,7 +18486,7 @@
             </p:nvSpPr>
             <p:spPr>
               <a:xfrm>
-                <a:off x="2763368" y="5932584"/>
+                <a:off x="1163160" y="5932584"/>
                 <a:ext cx="7218832" cy="461665"/>
               </a:xfrm>
               <a:prstGeom prst="rect">
@@ -18481,7 +18495,242 @@
               <a:blipFill>
                 <a:blip r:embed="rId7"/>
                 <a:stretch>
-                  <a:fillRect l="-1266" t="-9211" b="-30263"/>
+                  <a:fillRect l="-1351" t="-9211" b="-30263"/>
+                </a:stretch>
+              </a:blipFill>
+            </p:spPr>
+            <p:txBody>
+              <a:bodyPr/>
+              <a:lstStyle/>
+              <a:p>
+                <a:r>
+                  <a:rPr lang="zh-CN" altLang="en-US">
+                    <a:noFill/>
+                  </a:rPr>
+                  <a:t> </a:t>
+                </a:r>
+              </a:p>
+            </p:txBody>
+          </p:sp>
+        </mc:Fallback>
+      </mc:AlternateContent>
+      <mc:AlternateContent xmlns:mc="http://schemas.openxmlformats.org/markup-compatibility/2006">
+        <mc:Choice xmlns:a14="http://schemas.microsoft.com/office/drawing/2010/main" Requires="a14">
+          <p:sp>
+            <p:nvSpPr>
+              <p:cNvPr id="8" name="文本框 7">
+                <a:extLst>
+                  <a:ext uri="{FF2B5EF4-FFF2-40B4-BE49-F238E27FC236}">
+                    <a16:creationId xmlns:a16="http://schemas.microsoft.com/office/drawing/2014/main" id="{BC45EE6D-ADA4-933D-5460-8420D4333BE6}"/>
+                  </a:ext>
+                </a:extLst>
+              </p:cNvPr>
+              <p:cNvSpPr txBox="1"/>
+              <p:nvPr/>
+            </p:nvSpPr>
+            <p:spPr>
+              <a:xfrm>
+                <a:off x="8720416" y="2305615"/>
+                <a:ext cx="3368489" cy="2246769"/>
+              </a:xfrm>
+              <a:prstGeom prst="rect">
+                <a:avLst/>
+              </a:prstGeom>
+              <a:noFill/>
+            </p:spPr>
+            <p:txBody>
+              <a:bodyPr wrap="square" rtlCol="0">
+                <a:spAutoFit/>
+              </a:bodyPr>
+              <a:lstStyle/>
+              <a:p>
+                <a:pPr algn="l"/>
+                <a:r>
+                  <a:rPr lang="zh-CN" altLang="en-US" sz="2000" dirty="0">
+                    <a:latin typeface="Times New Roman" panose="02020603050405020304" pitchFamily="18" charset="0"/>
+                    <a:cs typeface="Times New Roman" panose="02020603050405020304" pitchFamily="18" charset="0"/>
+                  </a:rPr>
+                  <a:t>发现</a:t>
+                </a:r>
+                <a14:m>
+                  <m:oMath xmlns:m="http://schemas.openxmlformats.org/officeDocument/2006/math">
+                    <m:sSub>
+                      <m:sSubPr>
+                        <m:ctrlPr>
+                          <a:rPr lang="en-US" altLang="zh-CN" sz="2000" b="0" i="1" smtClean="0">
+                            <a:latin typeface="Cambria Math" panose="02040503050406030204" pitchFamily="18" charset="0"/>
+                            <a:cs typeface="Times New Roman" panose="02020603050405020304" pitchFamily="18" charset="0"/>
+                          </a:rPr>
+                        </m:ctrlPr>
+                      </m:sSubPr>
+                      <m:e>
+                        <m:r>
+                          <a:rPr lang="en-US" altLang="zh-CN" sz="2000" b="0" i="1" smtClean="0">
+                            <a:latin typeface="Cambria Math" panose="02040503050406030204" pitchFamily="18" charset="0"/>
+                            <a:cs typeface="Times New Roman" panose="02020603050405020304" pitchFamily="18" charset="0"/>
+                          </a:rPr>
+                          <m:t>𝑎</m:t>
+                        </m:r>
+                      </m:e>
+                      <m:sub>
+                        <m:r>
+                          <a:rPr lang="en-US" altLang="zh-CN" sz="2000" b="0" i="1" smtClean="0">
+                            <a:latin typeface="Cambria Math" panose="02040503050406030204" pitchFamily="18" charset="0"/>
+                            <a:cs typeface="Times New Roman" panose="02020603050405020304" pitchFamily="18" charset="0"/>
+                          </a:rPr>
+                          <m:t>1</m:t>
+                        </m:r>
+                      </m:sub>
+                    </m:sSub>
+                    <m:r>
+                      <a:rPr lang="en-US" altLang="zh-CN" sz="2000" b="0" i="1" smtClean="0">
+                        <a:latin typeface="Cambria Math" panose="02040503050406030204" pitchFamily="18" charset="0"/>
+                        <a:cs typeface="Times New Roman" panose="02020603050405020304" pitchFamily="18" charset="0"/>
+                      </a:rPr>
+                      <m:t>,</m:t>
+                    </m:r>
+                    <m:sSub>
+                      <m:sSubPr>
+                        <m:ctrlPr>
+                          <a:rPr lang="en-US" altLang="zh-CN" sz="2000" b="0" i="1" smtClean="0">
+                            <a:latin typeface="Cambria Math" panose="02040503050406030204" pitchFamily="18" charset="0"/>
+                            <a:cs typeface="Times New Roman" panose="02020603050405020304" pitchFamily="18" charset="0"/>
+                          </a:rPr>
+                        </m:ctrlPr>
+                      </m:sSubPr>
+                      <m:e>
+                        <m:r>
+                          <a:rPr lang="en-US" altLang="zh-CN" sz="2000" b="0" i="1" smtClean="0">
+                            <a:latin typeface="Cambria Math" panose="02040503050406030204" pitchFamily="18" charset="0"/>
+                            <a:cs typeface="Times New Roman" panose="02020603050405020304" pitchFamily="18" charset="0"/>
+                          </a:rPr>
+                          <m:t>𝑇</m:t>
+                        </m:r>
+                      </m:e>
+                      <m:sub>
+                        <m:r>
+                          <a:rPr lang="en-US" altLang="zh-CN" sz="2000" b="0" i="1" smtClean="0">
+                            <a:latin typeface="Cambria Math" panose="02040503050406030204" pitchFamily="18" charset="0"/>
+                            <a:cs typeface="Times New Roman" panose="02020603050405020304" pitchFamily="18" charset="0"/>
+                          </a:rPr>
+                          <m:t>0</m:t>
+                        </m:r>
+                      </m:sub>
+                    </m:sSub>
+                  </m:oMath>
+                </a14:m>
+                <a:r>
+                  <a:rPr lang="zh-CN" altLang="en-US" sz="2000" dirty="0">
+                    <a:latin typeface="Times New Roman" panose="02020603050405020304" pitchFamily="18" charset="0"/>
+                    <a:cs typeface="Times New Roman" panose="02020603050405020304" pitchFamily="18" charset="0"/>
+                  </a:rPr>
+                  <a:t>和</a:t>
+                </a:r>
+                <a:r>
+                  <a:rPr lang="en-US" altLang="zh-CN" sz="2000" dirty="0">
+                    <a:latin typeface="Times New Roman" panose="02020603050405020304" pitchFamily="18" charset="0"/>
+                    <a:cs typeface="Times New Roman" panose="02020603050405020304" pitchFamily="18" charset="0"/>
+                  </a:rPr>
+                  <a:t>8</a:t>
+                </a:r>
+                <a:r>
+                  <a:rPr lang="zh-CN" altLang="en-US" sz="2000" dirty="0">
+                    <a:latin typeface="Times New Roman" panose="02020603050405020304" pitchFamily="18" charset="0"/>
+                    <a:cs typeface="Times New Roman" panose="02020603050405020304" pitchFamily="18" charset="0"/>
+                  </a:rPr>
+                  <a:t>种主要气体的含量的预测效果还可以，其余参量的预测效果较差</a:t>
+                </a:r>
+                <a:endParaRPr lang="en-US" altLang="zh-CN" sz="2000" dirty="0">
+                  <a:latin typeface="Times New Roman" panose="02020603050405020304" pitchFamily="18" charset="0"/>
+                  <a:cs typeface="Times New Roman" panose="02020603050405020304" pitchFamily="18" charset="0"/>
+                </a:endParaRPr>
+              </a:p>
+              <a:p>
+                <a:pPr algn="l"/>
+                <a:endParaRPr lang="en-US" altLang="zh-CN" sz="2000" dirty="0">
+                  <a:latin typeface="Times New Roman" panose="02020603050405020304" pitchFamily="18" charset="0"/>
+                  <a:cs typeface="Times New Roman" panose="02020603050405020304" pitchFamily="18" charset="0"/>
+                </a:endParaRPr>
+              </a:p>
+              <a:p>
+                <a:pPr algn="l"/>
+                <a:r>
+                  <a:rPr lang="zh-CN" altLang="en-US" sz="2000" dirty="0">
+                    <a:latin typeface="Times New Roman" panose="02020603050405020304" pitchFamily="18" charset="0"/>
+                    <a:cs typeface="Times New Roman" panose="02020603050405020304" pitchFamily="18" charset="0"/>
+                  </a:rPr>
+                  <a:t>这是可以理解的，对光谱影响小的参数很难在</a:t>
+                </a:r>
+                <a14:m>
+                  <m:oMath xmlns:m="http://schemas.openxmlformats.org/officeDocument/2006/math">
+                    <m:sSup>
+                      <m:sSupPr>
+                        <m:ctrlPr>
+                          <a:rPr lang="en-US" altLang="zh-CN" sz="2000" b="0" i="1" smtClean="0">
+                            <a:latin typeface="Cambria Math" panose="02040503050406030204" pitchFamily="18" charset="0"/>
+                            <a:cs typeface="Times New Roman" panose="02020603050405020304" pitchFamily="18" charset="0"/>
+                          </a:rPr>
+                        </m:ctrlPr>
+                      </m:sSupPr>
+                      <m:e>
+                        <m:r>
+                          <a:rPr lang="en-US" altLang="zh-CN" sz="2000" b="0" i="1" smtClean="0">
+                            <a:latin typeface="Cambria Math" panose="02040503050406030204" pitchFamily="18" charset="0"/>
+                            <a:cs typeface="Times New Roman" panose="02020603050405020304" pitchFamily="18" charset="0"/>
+                          </a:rPr>
+                          <m:t>10</m:t>
+                        </m:r>
+                      </m:e>
+                      <m:sup>
+                        <m:r>
+                          <a:rPr lang="en-US" altLang="zh-CN" sz="2000" b="0" i="1" smtClean="0">
+                            <a:latin typeface="Cambria Math" panose="02040503050406030204" pitchFamily="18" charset="0"/>
+                            <a:cs typeface="Times New Roman" panose="02020603050405020304" pitchFamily="18" charset="0"/>
+                          </a:rPr>
+                          <m:t>4</m:t>
+                        </m:r>
+                      </m:sup>
+                    </m:sSup>
+                  </m:oMath>
+                </a14:m>
+                <a:r>
+                  <a:rPr lang="zh-CN" altLang="en-US" sz="2000" dirty="0">
+                    <a:latin typeface="Times New Roman" panose="02020603050405020304" pitchFamily="18" charset="0"/>
+                    <a:cs typeface="Times New Roman" panose="02020603050405020304" pitchFamily="18" charset="0"/>
+                  </a:rPr>
+                  <a:t>个样本中学习到</a:t>
+                </a:r>
+              </a:p>
+            </p:txBody>
+          </p:sp>
+        </mc:Choice>
+        <mc:Fallback>
+          <p:sp>
+            <p:nvSpPr>
+              <p:cNvPr id="8" name="文本框 7">
+                <a:extLst>
+                  <a:ext uri="{FF2B5EF4-FFF2-40B4-BE49-F238E27FC236}">
+                    <a16:creationId xmlns:a16="http://schemas.microsoft.com/office/drawing/2014/main" id="{BC45EE6D-ADA4-933D-5460-8420D4333BE6}"/>
+                  </a:ext>
+                </a:extLst>
+              </p:cNvPr>
+              <p:cNvSpPr txBox="1">
+                <a:spLocks noRot="1" noChangeAspect="1" noMove="1" noResize="1" noEditPoints="1" noAdjustHandles="1" noChangeArrowheads="1" noChangeShapeType="1" noTextEdit="1"/>
+              </p:cNvSpPr>
+              <p:nvPr/>
+            </p:nvSpPr>
+            <p:spPr>
+              <a:xfrm>
+                <a:off x="8720416" y="2305615"/>
+                <a:ext cx="3368489" cy="2246769"/>
+              </a:xfrm>
+              <a:prstGeom prst="rect">
+                <a:avLst/>
+              </a:prstGeom>
+              <a:blipFill>
+                <a:blip r:embed="rId8"/>
+                <a:stretch>
+                  <a:fillRect l="-1993" t="-1626" b="-3794"/>
                 </a:stretch>
               </a:blipFill>
             </p:spPr>
@@ -18894,7 +19143,7 @@
         </p:blipFill>
         <p:spPr>
           <a:xfrm>
-            <a:off x="385321" y="1336917"/>
+            <a:off x="385321" y="940225"/>
             <a:ext cx="5493178" cy="4184165"/>
           </a:xfrm>
           <a:prstGeom prst="rect">
@@ -19009,6 +19258,181 @@
           </a:p>
         </p:txBody>
       </p:sp>
+      <mc:AlternateContent xmlns:mc="http://schemas.openxmlformats.org/markup-compatibility/2006">
+        <mc:Choice xmlns:a14="http://schemas.microsoft.com/office/drawing/2010/main" Requires="a14">
+          <p:sp>
+            <p:nvSpPr>
+              <p:cNvPr id="12" name="文本框 11">
+                <a:extLst>
+                  <a:ext uri="{FF2B5EF4-FFF2-40B4-BE49-F238E27FC236}">
+                    <a16:creationId xmlns:a16="http://schemas.microsoft.com/office/drawing/2014/main" id="{2C409840-F88A-505B-EACA-9EBA232279F3}"/>
+                  </a:ext>
+                </a:extLst>
+              </p:cNvPr>
+              <p:cNvSpPr txBox="1"/>
+              <p:nvPr/>
+            </p:nvSpPr>
+            <p:spPr>
+              <a:xfrm>
+                <a:off x="275665" y="5318312"/>
+                <a:ext cx="5820335" cy="1446550"/>
+              </a:xfrm>
+              <a:prstGeom prst="rect">
+                <a:avLst/>
+              </a:prstGeom>
+              <a:noFill/>
+            </p:spPr>
+            <p:txBody>
+              <a:bodyPr wrap="square" rtlCol="0">
+                <a:spAutoFit/>
+              </a:bodyPr>
+              <a:lstStyle/>
+              <a:p>
+                <a:pPr algn="l">
+                  <a:spcBef>
+                    <a:spcPts val="600"/>
+                  </a:spcBef>
+                  <a:spcAft>
+                    <a:spcPts val="600"/>
+                  </a:spcAft>
+                </a:pPr>
+                <a:r>
+                  <a:rPr lang="zh-CN" altLang="en-US" sz="2400" dirty="0">
+                    <a:latin typeface="Times New Roman" panose="02020603050405020304" pitchFamily="18" charset="0"/>
+                    <a:cs typeface="Times New Roman" panose="02020603050405020304" pitchFamily="18" charset="0"/>
+                  </a:rPr>
+                  <a:t>效果还不错！</a:t>
+                </a:r>
+                <a:r>
+                  <a:rPr lang="zh-CN" altLang="en-US" dirty="0">
+                    <a:latin typeface="Times New Roman" panose="02020603050405020304" pitchFamily="18" charset="0"/>
+                    <a:cs typeface="Times New Roman" panose="02020603050405020304" pitchFamily="18" charset="0"/>
+                  </a:rPr>
+                  <a:t>（考虑到只有</a:t>
+                </a:r>
+                <a14:m>
+                  <m:oMath xmlns:m="http://schemas.openxmlformats.org/officeDocument/2006/math">
+                    <m:sSup>
+                      <m:sSupPr>
+                        <m:ctrlPr>
+                          <a:rPr lang="en-US" altLang="zh-CN" b="0" i="1" smtClean="0">
+                            <a:latin typeface="Cambria Math" panose="02040503050406030204" pitchFamily="18" charset="0"/>
+                            <a:cs typeface="Times New Roman" panose="02020603050405020304" pitchFamily="18" charset="0"/>
+                          </a:rPr>
+                        </m:ctrlPr>
+                      </m:sSupPr>
+                      <m:e>
+                        <m:r>
+                          <a:rPr lang="en-US" altLang="zh-CN" b="0" i="1" smtClean="0">
+                            <a:latin typeface="Cambria Math" panose="02040503050406030204" pitchFamily="18" charset="0"/>
+                            <a:cs typeface="Times New Roman" panose="02020603050405020304" pitchFamily="18" charset="0"/>
+                          </a:rPr>
+                          <m:t>10</m:t>
+                        </m:r>
+                      </m:e>
+                      <m:sup>
+                        <m:r>
+                          <a:rPr lang="en-US" altLang="zh-CN" b="0" i="1" smtClean="0">
+                            <a:latin typeface="Cambria Math" panose="02040503050406030204" pitchFamily="18" charset="0"/>
+                            <a:cs typeface="Times New Roman" panose="02020603050405020304" pitchFamily="18" charset="0"/>
+                          </a:rPr>
+                          <m:t>4</m:t>
+                        </m:r>
+                      </m:sup>
+                    </m:sSup>
+                  </m:oMath>
+                </a14:m>
+                <a:r>
+                  <a:rPr lang="zh-CN" altLang="en-US" dirty="0">
+                    <a:latin typeface="Times New Roman" panose="02020603050405020304" pitchFamily="18" charset="0"/>
+                    <a:cs typeface="Times New Roman" panose="02020603050405020304" pitchFamily="18" charset="0"/>
+                  </a:rPr>
+                  <a:t>的样本量和极为有限的调参次数）</a:t>
+                </a:r>
+                <a:endParaRPr lang="en-US" altLang="zh-CN" dirty="0">
+                  <a:latin typeface="Times New Roman" panose="02020603050405020304" pitchFamily="18" charset="0"/>
+                  <a:cs typeface="Times New Roman" panose="02020603050405020304" pitchFamily="18" charset="0"/>
+                </a:endParaRPr>
+              </a:p>
+              <a:p>
+                <a:pPr algn="l">
+                  <a:spcBef>
+                    <a:spcPts val="600"/>
+                  </a:spcBef>
+                  <a:spcAft>
+                    <a:spcPts val="600"/>
+                  </a:spcAft>
+                </a:pPr>
+                <a:r>
+                  <a:rPr lang="zh-CN" altLang="en-US" dirty="0">
+                    <a:latin typeface="Times New Roman" panose="02020603050405020304" pitchFamily="18" charset="0"/>
+                    <a:cs typeface="Times New Roman" panose="02020603050405020304" pitchFamily="18" charset="0"/>
+                  </a:rPr>
+                  <a:t>（以及，把一维数据折叠成二维来套用</a:t>
+                </a:r>
+                <a:r>
+                  <a:rPr lang="en-US" altLang="zh-CN" dirty="0">
+                    <a:latin typeface="Times New Roman" panose="02020603050405020304" pitchFamily="18" charset="0"/>
+                    <a:cs typeface="Times New Roman" panose="02020603050405020304" pitchFamily="18" charset="0"/>
+                  </a:rPr>
+                  <a:t>2D CNN</a:t>
+                </a:r>
+                <a:r>
+                  <a:rPr lang="zh-CN" altLang="en-US" dirty="0">
+                    <a:latin typeface="Times New Roman" panose="02020603050405020304" pitchFamily="18" charset="0"/>
+                    <a:cs typeface="Times New Roman" panose="02020603050405020304" pitchFamily="18" charset="0"/>
+                  </a:rPr>
+                  <a:t>看起来是损失大于收益的）</a:t>
+                </a:r>
+              </a:p>
+            </p:txBody>
+          </p:sp>
+        </mc:Choice>
+        <mc:Fallback>
+          <p:sp>
+            <p:nvSpPr>
+              <p:cNvPr id="12" name="文本框 11">
+                <a:extLst>
+                  <a:ext uri="{FF2B5EF4-FFF2-40B4-BE49-F238E27FC236}">
+                    <a16:creationId xmlns:a16="http://schemas.microsoft.com/office/drawing/2014/main" id="{2C409840-F88A-505B-EACA-9EBA232279F3}"/>
+                  </a:ext>
+                </a:extLst>
+              </p:cNvPr>
+              <p:cNvSpPr txBox="1">
+                <a:spLocks noRot="1" noChangeAspect="1" noMove="1" noResize="1" noEditPoints="1" noAdjustHandles="1" noChangeArrowheads="1" noChangeShapeType="1" noTextEdit="1"/>
+              </p:cNvSpPr>
+              <p:nvPr/>
+            </p:nvSpPr>
+            <p:spPr>
+              <a:xfrm>
+                <a:off x="275665" y="5318312"/>
+                <a:ext cx="5820335" cy="1446550"/>
+              </a:xfrm>
+              <a:prstGeom prst="rect">
+                <a:avLst/>
+              </a:prstGeom>
+              <a:blipFill>
+                <a:blip r:embed="rId7"/>
+                <a:stretch>
+                  <a:fillRect l="-1571" t="-2941" r="-838" b="-5462"/>
+                </a:stretch>
+              </a:blipFill>
+            </p:spPr>
+            <p:txBody>
+              <a:bodyPr/>
+              <a:lstStyle/>
+              <a:p>
+                <a:r>
+                  <a:rPr lang="zh-CN" altLang="en-US">
+                    <a:noFill/>
+                  </a:rPr>
+                  <a:t> </a:t>
+                </a:r>
+              </a:p>
+            </p:txBody>
+          </p:sp>
+        </mc:Fallback>
+      </mc:AlternateContent>
     </p:spTree>
     <p:extLst>
       <p:ext uri="{BB962C8B-B14F-4D97-AF65-F5344CB8AC3E}">
@@ -19375,130 +19799,294 @@
           </a:p>
         </p:txBody>
       </p:sp>
-      <p:sp>
-        <p:nvSpPr>
-          <p:cNvPr id="8" name="文本框 7">
-            <a:extLst>
-              <a:ext uri="{FF2B5EF4-FFF2-40B4-BE49-F238E27FC236}">
-                <a16:creationId xmlns:a16="http://schemas.microsoft.com/office/drawing/2014/main" id="{278C136E-C1B0-5A89-E00F-10570FFFABEF}"/>
-              </a:ext>
-            </a:extLst>
-          </p:cNvPr>
-          <p:cNvSpPr txBox="1"/>
-          <p:nvPr/>
-        </p:nvSpPr>
-        <p:spPr>
-          <a:xfrm>
-            <a:off x="5974321" y="1539279"/>
-            <a:ext cx="5761840" cy="2215991"/>
-          </a:xfrm>
-          <a:prstGeom prst="rect">
-            <a:avLst/>
-          </a:prstGeom>
-          <a:noFill/>
-        </p:spPr>
-        <p:txBody>
-          <a:bodyPr wrap="square" rtlCol="0">
-            <a:spAutoFit/>
-          </a:bodyPr>
-          <a:lstStyle/>
-          <a:p>
-            <a:pPr marL="342900" indent="-342900" algn="l">
-              <a:spcBef>
-                <a:spcPts val="600"/>
-              </a:spcBef>
-              <a:spcAft>
-                <a:spcPts val="600"/>
-              </a:spcAft>
-              <a:buFont typeface="Arial" panose="020B0604020202020204" pitchFamily="34" charset="0"/>
-              <a:buChar char="•"/>
-            </a:pPr>
-            <a:r>
-              <a:rPr lang="zh-CN" altLang="en-US" sz="2400" dirty="0">
-                <a:latin typeface="Times New Roman" panose="02020603050405020304" pitchFamily="18" charset="0"/>
-                <a:cs typeface="Times New Roman" panose="02020603050405020304" pitchFamily="18" charset="0"/>
-              </a:rPr>
-              <a:t>温度廓线：</a:t>
-            </a:r>
-            <a:r>
-              <a:rPr lang="en-US" altLang="zh-CN" sz="2000" dirty="0">
-                <a:latin typeface="Times New Roman" panose="02020603050405020304" pitchFamily="18" charset="0"/>
-                <a:cs typeface="Times New Roman" panose="02020603050405020304" pitchFamily="18" charset="0"/>
-              </a:rPr>
-              <a:t>Madhu</a:t>
-            </a:r>
-            <a:r>
-              <a:rPr lang="zh-CN" altLang="en-US" sz="2000" dirty="0">
-                <a:latin typeface="Times New Roman" panose="02020603050405020304" pitchFamily="18" charset="0"/>
-                <a:cs typeface="Times New Roman" panose="02020603050405020304" pitchFamily="18" charset="0"/>
-              </a:rPr>
-              <a:t>参数对于温度廓线的影响比较复杂；另一个重要的影响因素是光学厚度，在发射光谱中光学厚度为</a:t>
-            </a:r>
-            <a:r>
-              <a:rPr lang="en-US" altLang="zh-CN" sz="2000" dirty="0">
-                <a:latin typeface="Times New Roman" panose="02020603050405020304" pitchFamily="18" charset="0"/>
-                <a:cs typeface="Times New Roman" panose="02020603050405020304" pitchFamily="18" charset="0"/>
-              </a:rPr>
-              <a:t>1</a:t>
-            </a:r>
-            <a:r>
-              <a:rPr lang="zh-CN" altLang="en-US" sz="2000" dirty="0">
-                <a:latin typeface="Times New Roman" panose="02020603050405020304" pitchFamily="18" charset="0"/>
-                <a:cs typeface="Times New Roman" panose="02020603050405020304" pitchFamily="18" charset="0"/>
-              </a:rPr>
-              <a:t>位置的权重函数最大，深层大气发射的光谱无法穿透</a:t>
-            </a:r>
-            <a:endParaRPr lang="en-US" altLang="zh-CN" sz="2000" dirty="0">
-              <a:latin typeface="Times New Roman" panose="02020603050405020304" pitchFamily="18" charset="0"/>
-              <a:cs typeface="Times New Roman" panose="02020603050405020304" pitchFamily="18" charset="0"/>
-            </a:endParaRPr>
-          </a:p>
-          <a:p>
-            <a:pPr marL="342900" indent="-342900" algn="l">
-              <a:spcBef>
-                <a:spcPts val="600"/>
-              </a:spcBef>
-              <a:spcAft>
-                <a:spcPts val="600"/>
-              </a:spcAft>
-              <a:buFont typeface="Arial" panose="020B0604020202020204" pitchFamily="34" charset="0"/>
-              <a:buChar char="•"/>
-            </a:pPr>
-            <a:r>
-              <a:rPr lang="zh-CN" altLang="en-US" sz="2400" dirty="0">
-                <a:latin typeface="Times New Roman" panose="02020603050405020304" pitchFamily="18" charset="0"/>
-                <a:cs typeface="Times New Roman" panose="02020603050405020304" pitchFamily="18" charset="0"/>
-              </a:rPr>
-              <a:t>大气成分：</a:t>
-            </a:r>
-            <a:r>
-              <a:rPr lang="zh-CN" altLang="en-US" sz="2000" dirty="0">
-                <a:latin typeface="Times New Roman" panose="02020603050405020304" pitchFamily="18" charset="0"/>
-                <a:cs typeface="Times New Roman" panose="02020603050405020304" pitchFamily="18" charset="0"/>
-              </a:rPr>
-              <a:t>大概能判断出来行星大气的主要成分，但肯定与</a:t>
-            </a:r>
-            <a:r>
-              <a:rPr lang="en-US" altLang="zh-CN" sz="2000" dirty="0">
-                <a:latin typeface="Times New Roman" panose="02020603050405020304" pitchFamily="18" charset="0"/>
-                <a:cs typeface="Times New Roman" panose="02020603050405020304" pitchFamily="18" charset="0"/>
-              </a:rPr>
-              <a:t>biosignature</a:t>
-            </a:r>
-            <a:r>
-              <a:rPr lang="zh-CN" altLang="en-US" sz="2000" dirty="0">
-                <a:latin typeface="Times New Roman" panose="02020603050405020304" pitchFamily="18" charset="0"/>
-                <a:cs typeface="Times New Roman" panose="02020603050405020304" pitchFamily="18" charset="0"/>
-              </a:rPr>
-              <a:t>识别这种任务无缘</a:t>
-            </a:r>
-            <a:endParaRPr lang="en-US" altLang="zh-CN" sz="2000" dirty="0">
-              <a:latin typeface="Times New Roman" panose="02020603050405020304" pitchFamily="18" charset="0"/>
-              <a:cs typeface="Times New Roman" panose="02020603050405020304" pitchFamily="18" charset="0"/>
-            </a:endParaRPr>
-          </a:p>
-        </p:txBody>
-      </p:sp>
+      <mc:AlternateContent xmlns:mc="http://schemas.openxmlformats.org/markup-compatibility/2006">
+        <mc:Choice xmlns:a14="http://schemas.microsoft.com/office/drawing/2010/main" Requires="a14">
+          <p:sp>
+            <p:nvSpPr>
+              <p:cNvPr id="8" name="文本框 7">
+                <a:extLst>
+                  <a:ext uri="{FF2B5EF4-FFF2-40B4-BE49-F238E27FC236}">
+                    <a16:creationId xmlns:a16="http://schemas.microsoft.com/office/drawing/2014/main" id="{278C136E-C1B0-5A89-E00F-10570FFFABEF}"/>
+                  </a:ext>
+                </a:extLst>
+              </p:cNvPr>
+              <p:cNvSpPr txBox="1"/>
+              <p:nvPr/>
+            </p:nvSpPr>
+            <p:spPr>
+              <a:xfrm>
+                <a:off x="5974321" y="981222"/>
+                <a:ext cx="5761840" cy="3354765"/>
+              </a:xfrm>
+              <a:prstGeom prst="rect">
+                <a:avLst/>
+              </a:prstGeom>
+              <a:noFill/>
+            </p:spPr>
+            <p:txBody>
+              <a:bodyPr wrap="square" rtlCol="0">
+                <a:spAutoFit/>
+              </a:bodyPr>
+              <a:lstStyle/>
+              <a:p>
+                <a:pPr marL="342900" indent="-342900" algn="l">
+                  <a:spcBef>
+                    <a:spcPts val="600"/>
+                  </a:spcBef>
+                  <a:spcAft>
+                    <a:spcPts val="600"/>
+                  </a:spcAft>
+                  <a:buFont typeface="Arial" panose="020B0604020202020204" pitchFamily="34" charset="0"/>
+                  <a:buChar char="•"/>
+                </a:pPr>
+                <a:r>
+                  <a:rPr lang="zh-CN" altLang="en-US" sz="2400" b="1" dirty="0">
+                    <a:latin typeface="Times New Roman" panose="02020603050405020304" pitchFamily="18" charset="0"/>
+                    <a:cs typeface="Times New Roman" panose="02020603050405020304" pitchFamily="18" charset="0"/>
+                  </a:rPr>
+                  <a:t>温度廓线</a:t>
+                </a:r>
+                <a:r>
+                  <a:rPr lang="zh-CN" altLang="en-US" sz="2400" dirty="0">
+                    <a:latin typeface="Times New Roman" panose="02020603050405020304" pitchFamily="18" charset="0"/>
+                    <a:cs typeface="Times New Roman" panose="02020603050405020304" pitchFamily="18" charset="0"/>
+                  </a:rPr>
+                  <a:t>：</a:t>
+                </a:r>
+                <a:r>
+                  <a:rPr lang="en-US" altLang="zh-CN" sz="2000" dirty="0">
+                    <a:latin typeface="Times New Roman" panose="02020603050405020304" pitchFamily="18" charset="0"/>
+                    <a:cs typeface="Times New Roman" panose="02020603050405020304" pitchFamily="18" charset="0"/>
+                  </a:rPr>
+                  <a:t>Madhu</a:t>
+                </a:r>
+                <a:r>
+                  <a:rPr lang="zh-CN" altLang="en-US" sz="2000" dirty="0">
+                    <a:latin typeface="Times New Roman" panose="02020603050405020304" pitchFamily="18" charset="0"/>
+                    <a:cs typeface="Times New Roman" panose="02020603050405020304" pitchFamily="18" charset="0"/>
+                  </a:rPr>
+                  <a:t>参数对于温度廓线的影响比较复杂；更重要的影响因素是</a:t>
+                </a:r>
+                <a:r>
+                  <a:rPr lang="zh-CN" altLang="en-US" sz="2000" b="1" dirty="0">
+                    <a:latin typeface="Times New Roman" panose="02020603050405020304" pitchFamily="18" charset="0"/>
+                    <a:cs typeface="Times New Roman" panose="02020603050405020304" pitchFamily="18" charset="0"/>
+                  </a:rPr>
+                  <a:t>光学厚度</a:t>
+                </a:r>
+                <a:r>
+                  <a:rPr lang="zh-CN" altLang="en-US" sz="2000" dirty="0">
+                    <a:latin typeface="Times New Roman" panose="02020603050405020304" pitchFamily="18" charset="0"/>
+                    <a:cs typeface="Times New Roman" panose="02020603050405020304" pitchFamily="18" charset="0"/>
+                  </a:rPr>
+                  <a:t>，在发射光谱中光学厚度为</a:t>
+                </a:r>
+                <a:r>
+                  <a:rPr lang="en-US" altLang="zh-CN" sz="2000" dirty="0">
+                    <a:latin typeface="Times New Roman" panose="02020603050405020304" pitchFamily="18" charset="0"/>
+                    <a:cs typeface="Times New Roman" panose="02020603050405020304" pitchFamily="18" charset="0"/>
+                  </a:rPr>
+                  <a:t>1</a:t>
+                </a:r>
+                <a:r>
+                  <a:rPr lang="zh-CN" altLang="en-US" sz="2000" dirty="0">
+                    <a:latin typeface="Times New Roman" panose="02020603050405020304" pitchFamily="18" charset="0"/>
+                    <a:cs typeface="Times New Roman" panose="02020603050405020304" pitchFamily="18" charset="0"/>
+                  </a:rPr>
+                  <a:t>位置的权重函数最大，深层大气发射的光谱无法穿透</a:t>
+                </a:r>
+                <a:r>
+                  <a:rPr lang="zh-CN" altLang="en-US" dirty="0">
+                    <a:latin typeface="Times New Roman" panose="02020603050405020304" pitchFamily="18" charset="0"/>
+                    <a:cs typeface="Times New Roman" panose="02020603050405020304" pitchFamily="18" charset="0"/>
+                  </a:rPr>
+                  <a:t>（</a:t>
+                </a:r>
+                <a:r>
+                  <a:rPr lang="en-US" altLang="zh-CN" dirty="0">
+                    <a:latin typeface="Times New Roman" panose="02020603050405020304" pitchFamily="18" charset="0"/>
+                    <a:cs typeface="Times New Roman" panose="02020603050405020304" pitchFamily="18" charset="0"/>
+                  </a:rPr>
+                  <a:t>Madhu</a:t>
+                </a:r>
+                <a:r>
+                  <a:rPr lang="zh-CN" altLang="en-US" dirty="0">
+                    <a:latin typeface="Times New Roman" panose="02020603050405020304" pitchFamily="18" charset="0"/>
+                    <a:cs typeface="Times New Roman" panose="02020603050405020304" pitchFamily="18" charset="0"/>
+                  </a:rPr>
+                  <a:t>参数中的</a:t>
+                </a:r>
+                <a14:m>
+                  <m:oMath xmlns:m="http://schemas.openxmlformats.org/officeDocument/2006/math">
+                    <m:sSub>
+                      <m:sSubPr>
+                        <m:ctrlPr>
+                          <a:rPr lang="en-US" altLang="zh-CN" b="0" i="1" smtClean="0">
+                            <a:latin typeface="Cambria Math" panose="02040503050406030204" pitchFamily="18" charset="0"/>
+                            <a:cs typeface="Times New Roman" panose="02020603050405020304" pitchFamily="18" charset="0"/>
+                          </a:rPr>
+                        </m:ctrlPr>
+                      </m:sSubPr>
+                      <m:e>
+                        <m:r>
+                          <a:rPr lang="en-US" altLang="zh-CN" b="0" i="1" smtClean="0">
+                            <a:latin typeface="Cambria Math" panose="02040503050406030204" pitchFamily="18" charset="0"/>
+                            <a:cs typeface="Times New Roman" panose="02020603050405020304" pitchFamily="18" charset="0"/>
+                          </a:rPr>
+                          <m:t>𝑎</m:t>
+                        </m:r>
+                      </m:e>
+                      <m:sub>
+                        <m:r>
+                          <a:rPr lang="en-US" altLang="zh-CN" b="0" i="1" smtClean="0">
+                            <a:latin typeface="Cambria Math" panose="02040503050406030204" pitchFamily="18" charset="0"/>
+                            <a:cs typeface="Times New Roman" panose="02020603050405020304" pitchFamily="18" charset="0"/>
+                          </a:rPr>
+                          <m:t>1</m:t>
+                        </m:r>
+                      </m:sub>
+                    </m:sSub>
+                  </m:oMath>
+                </a14:m>
+                <a:r>
+                  <a:rPr lang="zh-CN" altLang="en-US" dirty="0">
+                    <a:latin typeface="Times New Roman" panose="02020603050405020304" pitchFamily="18" charset="0"/>
+                    <a:cs typeface="Times New Roman" panose="02020603050405020304" pitchFamily="18" charset="0"/>
+                  </a:rPr>
+                  <a:t>对这个位置的决定也有作用，所以学的效果明显好于剩余的</a:t>
+                </a:r>
+                <a:r>
+                  <a:rPr lang="en-US" altLang="zh-CN" dirty="0">
+                    <a:latin typeface="Times New Roman" panose="02020603050405020304" pitchFamily="18" charset="0"/>
+                    <a:cs typeface="Times New Roman" panose="02020603050405020304" pitchFamily="18" charset="0"/>
+                  </a:rPr>
+                  <a:t>4</a:t>
+                </a:r>
+                <a:r>
+                  <a:rPr lang="zh-CN" altLang="en-US" dirty="0">
+                    <a:latin typeface="Times New Roman" panose="02020603050405020304" pitchFamily="18" charset="0"/>
+                    <a:cs typeface="Times New Roman" panose="02020603050405020304" pitchFamily="18" charset="0"/>
+                  </a:rPr>
+                  <a:t>个参数，剩下</a:t>
+                </a:r>
+                <a:r>
+                  <a:rPr lang="en-US" altLang="zh-CN" dirty="0">
+                    <a:latin typeface="Times New Roman" panose="02020603050405020304" pitchFamily="18" charset="0"/>
+                    <a:cs typeface="Times New Roman" panose="02020603050405020304" pitchFamily="18" charset="0"/>
+                  </a:rPr>
+                  <a:t>4</a:t>
+                </a:r>
+                <a:r>
+                  <a:rPr lang="zh-CN" altLang="en-US" dirty="0">
+                    <a:latin typeface="Times New Roman" panose="02020603050405020304" pitchFamily="18" charset="0"/>
+                    <a:cs typeface="Times New Roman" panose="02020603050405020304" pitchFamily="18" charset="0"/>
+                  </a:rPr>
+                  <a:t>个参数主要对更深的大气有影响）</a:t>
+                </a:r>
+                <a:endParaRPr lang="en-US" altLang="zh-CN" dirty="0">
+                  <a:latin typeface="Times New Roman" panose="02020603050405020304" pitchFamily="18" charset="0"/>
+                  <a:cs typeface="Times New Roman" panose="02020603050405020304" pitchFamily="18" charset="0"/>
+                </a:endParaRPr>
+              </a:p>
+              <a:p>
+                <a:pPr marL="342900" indent="-342900" algn="l">
+                  <a:spcBef>
+                    <a:spcPts val="600"/>
+                  </a:spcBef>
+                  <a:spcAft>
+                    <a:spcPts val="600"/>
+                  </a:spcAft>
+                  <a:buFont typeface="Arial" panose="020B0604020202020204" pitchFamily="34" charset="0"/>
+                  <a:buChar char="•"/>
+                </a:pPr>
+                <a:r>
+                  <a:rPr lang="zh-CN" altLang="en-US" sz="2400" b="1" dirty="0">
+                    <a:latin typeface="Times New Roman" panose="02020603050405020304" pitchFamily="18" charset="0"/>
+                    <a:cs typeface="Times New Roman" panose="02020603050405020304" pitchFamily="18" charset="0"/>
+                  </a:rPr>
+                  <a:t>大气成分</a:t>
+                </a:r>
+                <a:r>
+                  <a:rPr lang="zh-CN" altLang="en-US" sz="2400" dirty="0">
+                    <a:latin typeface="Times New Roman" panose="02020603050405020304" pitchFamily="18" charset="0"/>
+                    <a:cs typeface="Times New Roman" panose="02020603050405020304" pitchFamily="18" charset="0"/>
+                  </a:rPr>
+                  <a:t>：</a:t>
+                </a:r>
+                <a:r>
+                  <a:rPr lang="zh-CN" altLang="en-US" sz="2000" dirty="0">
+                    <a:latin typeface="Times New Roman" panose="02020603050405020304" pitchFamily="18" charset="0"/>
+                    <a:cs typeface="Times New Roman" panose="02020603050405020304" pitchFamily="18" charset="0"/>
+                  </a:rPr>
+                  <a:t>大概能判断出来行星大气的主要成分和含量，但肯定与</a:t>
+                </a:r>
+                <a:r>
+                  <a:rPr lang="en-US" altLang="zh-CN" sz="2000" dirty="0">
+                    <a:latin typeface="Times New Roman" panose="02020603050405020304" pitchFamily="18" charset="0"/>
+                    <a:cs typeface="Times New Roman" panose="02020603050405020304" pitchFamily="18" charset="0"/>
+                  </a:rPr>
+                  <a:t>biosignature</a:t>
+                </a:r>
+                <a:r>
+                  <a:rPr lang="zh-CN" altLang="en-US" sz="2000" dirty="0">
+                    <a:latin typeface="Times New Roman" panose="02020603050405020304" pitchFamily="18" charset="0"/>
+                    <a:cs typeface="Times New Roman" panose="02020603050405020304" pitchFamily="18" charset="0"/>
+                  </a:rPr>
+                  <a:t>识别这种任务无缘</a:t>
+                </a:r>
+                <a:endParaRPr lang="en-US" altLang="zh-CN" sz="2000" dirty="0">
+                  <a:latin typeface="Times New Roman" panose="02020603050405020304" pitchFamily="18" charset="0"/>
+                  <a:cs typeface="Times New Roman" panose="02020603050405020304" pitchFamily="18" charset="0"/>
+                </a:endParaRPr>
+              </a:p>
+            </p:txBody>
+          </p:sp>
+        </mc:Choice>
+        <mc:Fallback>
+          <p:sp>
+            <p:nvSpPr>
+              <p:cNvPr id="8" name="文本框 7">
+                <a:extLst>
+                  <a:ext uri="{FF2B5EF4-FFF2-40B4-BE49-F238E27FC236}">
+                    <a16:creationId xmlns:a16="http://schemas.microsoft.com/office/drawing/2014/main" id="{278C136E-C1B0-5A89-E00F-10570FFFABEF}"/>
+                  </a:ext>
+                </a:extLst>
+              </p:cNvPr>
+              <p:cNvSpPr txBox="1">
+                <a:spLocks noRot="1" noChangeAspect="1" noMove="1" noResize="1" noEditPoints="1" noAdjustHandles="1" noChangeArrowheads="1" noChangeShapeType="1" noTextEdit="1"/>
+              </p:cNvSpPr>
+              <p:nvPr/>
+            </p:nvSpPr>
+            <p:spPr>
+              <a:xfrm>
+                <a:off x="5974321" y="981222"/>
+                <a:ext cx="5761840" cy="3354765"/>
+              </a:xfrm>
+              <a:prstGeom prst="rect">
+                <a:avLst/>
+              </a:prstGeom>
+              <a:blipFill>
+                <a:blip r:embed="rId5"/>
+                <a:stretch>
+                  <a:fillRect l="-1376" t="-1273" r="-952" b="-2364"/>
+                </a:stretch>
+              </a:blipFill>
+            </p:spPr>
+            <p:txBody>
+              <a:bodyPr/>
+              <a:lstStyle/>
+              <a:p>
+                <a:r>
+                  <a:rPr lang="zh-CN" altLang="en-US">
+                    <a:noFill/>
+                  </a:rPr>
+                  <a:t> </a:t>
+                </a:r>
+              </a:p>
+            </p:txBody>
+          </p:sp>
+        </mc:Fallback>
+      </mc:AlternateContent>
       <p:pic>
         <p:nvPicPr>
           <p:cNvPr id="11" name="图片 10">
@@ -19514,7 +20102,7 @@
           <p:nvPr/>
         </p:nvPicPr>
         <p:blipFill>
-          <a:blip r:embed="rId5">
+          <a:blip r:embed="rId6">
             <a:extLst>
               <a:ext uri="{28A0092B-C50C-407E-A947-70E740481C1C}">
                 <a14:useLocalDpi xmlns:a14="http://schemas.microsoft.com/office/drawing/2010/main" val="0"/>
@@ -19550,7 +20138,7 @@
         <p:spPr>
           <a:xfrm>
             <a:off x="750356" y="4325025"/>
-            <a:ext cx="10295093" cy="2031325"/>
+            <a:ext cx="8944973" cy="2031325"/>
           </a:xfrm>
           <a:prstGeom prst="rect">
             <a:avLst/>
@@ -19673,7 +20261,7 @@
                 <a:latin typeface="Times New Roman" panose="02020603050405020304" pitchFamily="18" charset="0"/>
                 <a:cs typeface="Times New Roman" panose="02020603050405020304" pitchFamily="18" charset="0"/>
               </a:rPr>
-              <a:t>和主流的方法的预测效果、资源消耗进行比对</a:t>
+              <a:t>和主流的方法的预测效果、资源消耗进行对比</a:t>
             </a:r>
           </a:p>
         </p:txBody>
@@ -20287,6 +20875,89 @@
           </a:p>
         </p:txBody>
       </p:sp>
+      <p:sp>
+        <p:nvSpPr>
+          <p:cNvPr id="10" name="文本框 9">
+            <a:extLst>
+              <a:ext uri="{FF2B5EF4-FFF2-40B4-BE49-F238E27FC236}">
+                <a16:creationId xmlns:a16="http://schemas.microsoft.com/office/drawing/2014/main" id="{8E0D4568-2F5C-B15E-2855-79BFE896E3A4}"/>
+              </a:ext>
+            </a:extLst>
+          </p:cNvPr>
+          <p:cNvSpPr txBox="1"/>
+          <p:nvPr/>
+        </p:nvSpPr>
+        <p:spPr>
+          <a:xfrm>
+            <a:off x="894229" y="5002306"/>
+            <a:ext cx="5055309" cy="1234184"/>
+          </a:xfrm>
+          <a:prstGeom prst="rect">
+            <a:avLst/>
+          </a:prstGeom>
+          <a:noFill/>
+        </p:spPr>
+        <p:txBody>
+          <a:bodyPr wrap="square" rtlCol="0">
+            <a:spAutoFit/>
+          </a:bodyPr>
+          <a:lstStyle/>
+          <a:p>
+            <a:pPr algn="l">
+              <a:lnSpc>
+                <a:spcPct val="150000"/>
+              </a:lnSpc>
+            </a:pPr>
+            <a:r>
+              <a:rPr lang="zh-CN" altLang="en-US" sz="2800" b="1" dirty="0">
+                <a:latin typeface="Times New Roman" panose="02020603050405020304" pitchFamily="18" charset="0"/>
+                <a:cs typeface="Times New Roman" panose="02020603050405020304" pitchFamily="18" charset="0"/>
+              </a:rPr>
+              <a:t>感谢大家 </a:t>
+            </a:r>
+            <a:r>
+              <a:rPr lang="en-US" altLang="zh-CN" sz="2800" b="1" dirty="0">
+                <a:latin typeface="Times New Roman" panose="02020603050405020304" pitchFamily="18" charset="0"/>
+                <a:cs typeface="Times New Roman" panose="02020603050405020304" pitchFamily="18" charset="0"/>
+              </a:rPr>
+              <a:t>!</a:t>
+            </a:r>
+          </a:p>
+          <a:p>
+            <a:pPr algn="l">
+              <a:lnSpc>
+                <a:spcPct val="150000"/>
+              </a:lnSpc>
+            </a:pPr>
+            <a:r>
+              <a:rPr lang="zh-CN" altLang="en-US" sz="2400" dirty="0">
+                <a:latin typeface="Times New Roman" panose="02020603050405020304" pitchFamily="18" charset="0"/>
+                <a:cs typeface="Times New Roman" panose="02020603050405020304" pitchFamily="18" charset="0"/>
+              </a:rPr>
+              <a:t>欢迎访问 </a:t>
+            </a:r>
+            <a:r>
+              <a:rPr lang="en-US" altLang="zh-CN" sz="2400" dirty="0">
+                <a:latin typeface="Times New Roman" panose="02020603050405020304" pitchFamily="18" charset="0"/>
+                <a:cs typeface="Times New Roman" panose="02020603050405020304" pitchFamily="18" charset="0"/>
+                <a:hlinkClick r:id="rId7"/>
+              </a:rPr>
+              <a:t>https://williamwyl.cn</a:t>
+            </a:r>
+            <a:r>
+              <a:rPr lang="en-US" altLang="zh-CN" sz="2400" dirty="0">
+                <a:latin typeface="Times New Roman" panose="02020603050405020304" pitchFamily="18" charset="0"/>
+                <a:cs typeface="Times New Roman" panose="02020603050405020304" pitchFamily="18" charset="0"/>
+              </a:rPr>
+              <a:t> !</a:t>
+            </a:r>
+            <a:endParaRPr lang="en-US" altLang="zh-CN" sz="2400" dirty="0">
+              <a:latin typeface="+mn-ea"/>
+              <a:cs typeface="Times New Roman" panose="02020603050405020304" pitchFamily="18" charset="0"/>
+            </a:endParaRPr>
+          </a:p>
+        </p:txBody>
+      </p:sp>
     </p:spTree>
     <p:extLst>
       <p:ext uri="{BB962C8B-B14F-4D97-AF65-F5344CB8AC3E}">
@@ -20642,7 +21313,7 @@
         <p:spPr>
           <a:xfrm>
             <a:off x="827472" y="979596"/>
-            <a:ext cx="10620816" cy="4555093"/>
+            <a:ext cx="10620816" cy="5478423"/>
           </a:xfrm>
           <a:prstGeom prst="rect">
             <a:avLst/>
@@ -21053,6 +21724,52 @@
               </a:rPr>
               <a:t>计算每个参数的预测效果</a:t>
             </a:r>
+            <a:endParaRPr lang="en-US" altLang="zh-CN" sz="2000" dirty="0">
+              <a:latin typeface="+mn-ea"/>
+            </a:endParaRPr>
+          </a:p>
+          <a:p>
+            <a:pPr>
+              <a:spcBef>
+                <a:spcPts val="600"/>
+              </a:spcBef>
+              <a:spcAft>
+                <a:spcPts val="600"/>
+              </a:spcAft>
+              <a:buFont typeface="Arial" panose="020B0604020202020204" pitchFamily="34" charset="0"/>
+              <a:buChar char="•"/>
+            </a:pPr>
+            <a:endParaRPr lang="en-US" altLang="zh-CN" sz="2000" dirty="0">
+              <a:latin typeface="+mn-ea"/>
+            </a:endParaRPr>
+          </a:p>
+          <a:p>
+            <a:pPr>
+              <a:spcBef>
+                <a:spcPts val="600"/>
+              </a:spcBef>
+              <a:spcAft>
+                <a:spcPts val="600"/>
+              </a:spcAft>
+            </a:pPr>
+            <a:r>
+              <a:rPr lang="zh-CN" altLang="en-US" sz="2000" dirty="0">
+                <a:latin typeface="+mn-ea"/>
+              </a:rPr>
+              <a:t>（</a:t>
+            </a:r>
+            <a:r>
+              <a:rPr lang="en-US" altLang="zh-CN" sz="2000" dirty="0">
+                <a:latin typeface="+mn-ea"/>
+              </a:rPr>
+              <a:t>from ChatGPT</a:t>
+            </a:r>
+            <a:r>
+              <a:rPr lang="zh-CN" altLang="en-US" sz="2000" dirty="0">
+                <a:latin typeface="+mn-ea"/>
+              </a:rPr>
+              <a:t>）</a:t>
+            </a:r>
           </a:p>
         </p:txBody>
       </p:sp>
@@ -21469,7 +22186,7 @@
         <p:spPr>
           <a:xfrm>
             <a:off x="869017" y="881755"/>
-            <a:ext cx="10036548" cy="5478423"/>
+            <a:ext cx="10036548" cy="5940088"/>
           </a:xfrm>
           <a:prstGeom prst="rect">
             <a:avLst/>
@@ -21925,6 +22642,28 @@
               </a:rPr>
               <a:t>计算各参数的预测误差</a:t>
             </a:r>
+            <a:endParaRPr lang="en-US" altLang="zh-CN" sz="2000" dirty="0">
+              <a:latin typeface="+mn-ea"/>
+            </a:endParaRPr>
+          </a:p>
+          <a:p>
+            <a:pPr>
+              <a:spcBef>
+                <a:spcPts val="600"/>
+              </a:spcBef>
+              <a:spcAft>
+                <a:spcPts val="600"/>
+              </a:spcAft>
+            </a:pPr>
+            <a:r>
+              <a:rPr lang="en-US" altLang="zh-CN" sz="2000" dirty="0">
+                <a:latin typeface="+mn-ea"/>
+              </a:rPr>
+              <a:t>(from ChatGPT)</a:t>
+            </a:r>
+            <a:endParaRPr lang="zh-CN" altLang="en-US" sz="2000" dirty="0">
+              <a:latin typeface="+mn-ea"/>
+            </a:endParaRPr>
           </a:p>
         </p:txBody>
       </p:sp>
@@ -24430,8 +25169,8 @@
           </a:p>
         </p:txBody>
       </p:sp>
-      <mc:AlternateContent xmlns:mc="http://schemas.openxmlformats.org/markup-compatibility/2006" xmlns:a14="http://schemas.microsoft.com/office/drawing/2010/main">
-        <mc:Choice Requires="a14">
+      <mc:AlternateContent xmlns:mc="http://schemas.openxmlformats.org/markup-compatibility/2006">
+        <mc:Choice xmlns:a14="http://schemas.microsoft.com/office/drawing/2010/main" Requires="a14">
           <p:sp>
             <p:nvSpPr>
               <p:cNvPr id="10" name="文本框 9">
@@ -24446,7 +25185,7 @@
             </p:nvSpPr>
             <p:spPr>
               <a:xfrm>
-                <a:off x="822366" y="4330463"/>
+                <a:off x="1508174" y="4464937"/>
                 <a:ext cx="4566729" cy="622735"/>
               </a:xfrm>
               <a:prstGeom prst="rect">
@@ -24647,7 +25386,7 @@
             </p:txBody>
           </p:sp>
         </mc:Choice>
-        <mc:Fallback xmlns="">
+        <mc:Fallback>
           <p:sp>
             <p:nvSpPr>
               <p:cNvPr id="10" name="文本框 9">
@@ -24664,7 +25403,7 @@
             </p:nvSpPr>
             <p:spPr>
               <a:xfrm>
-                <a:off x="822366" y="4330463"/>
+                <a:off x="1508174" y="4464937"/>
                 <a:ext cx="4566729" cy="622735"/>
               </a:xfrm>
               <a:prstGeom prst="rect">
@@ -24720,7 +25459,7 @@
         </p:blipFill>
         <p:spPr>
           <a:xfrm>
-            <a:off x="158743" y="2038016"/>
+            <a:off x="844551" y="2172490"/>
             <a:ext cx="5012423" cy="1886698"/>
           </a:xfrm>
           <a:prstGeom prst="rect">
@@ -24742,8 +25481,8 @@
         </p:nvSpPr>
         <p:spPr>
           <a:xfrm>
-            <a:off x="5455924" y="2779562"/>
-            <a:ext cx="987228" cy="267038"/>
+            <a:off x="5933301" y="2914036"/>
+            <a:ext cx="1346982" cy="279644"/>
           </a:xfrm>
           <a:prstGeom prst="rightArrow">
             <a:avLst/>
@@ -24802,7 +25541,7 @@
         </p:blipFill>
         <p:spPr>
           <a:xfrm>
-            <a:off x="6727910" y="814608"/>
+            <a:off x="7413718" y="949082"/>
             <a:ext cx="3144951" cy="2310931"/>
           </a:xfrm>
           <a:prstGeom prst="rect">
@@ -24838,7 +25577,7 @@
         </p:blipFill>
         <p:spPr>
           <a:xfrm>
-            <a:off x="6802906" y="3153180"/>
+            <a:off x="7488714" y="3287654"/>
             <a:ext cx="3069955" cy="2398658"/>
           </a:xfrm>
           <a:prstGeom prst="rect">
@@ -24860,8 +25599,8 @@
         </p:nvSpPr>
         <p:spPr>
           <a:xfrm>
-            <a:off x="5701553" y="2151529"/>
-            <a:ext cx="329453" cy="646331"/>
+            <a:off x="6347018" y="2064127"/>
+            <a:ext cx="329453" cy="1015663"/>
           </a:xfrm>
           <a:prstGeom prst="rect">
             <a:avLst/>
@@ -24876,7 +25615,7 @@
           <a:p>
             <a:pPr algn="l"/>
             <a:r>
-              <a:rPr lang="en-US" altLang="zh-CN" sz="3600" dirty="0">
+              <a:rPr lang="en-US" altLang="zh-CN" sz="6000" dirty="0">
                 <a:solidFill>
                   <a:srgbClr val="C00000"/>
                 </a:solidFill>
@@ -24885,7 +25624,7 @@
               </a:rPr>
               <a:t>?</a:t>
             </a:r>
-            <a:endParaRPr lang="zh-CN" altLang="en-US" sz="3600" dirty="0">
+            <a:endParaRPr lang="zh-CN" altLang="en-US" sz="6000" dirty="0">
               <a:solidFill>
                 <a:srgbClr val="C00000"/>
               </a:solidFill>
@@ -28203,8 +28942,8 @@
           </a:prstGeom>
         </p:spPr>
       </p:pic>
-      <mc:AlternateContent xmlns:mc="http://schemas.openxmlformats.org/markup-compatibility/2006" xmlns:a14="http://schemas.microsoft.com/office/drawing/2010/main">
-        <mc:Choice Requires="a14">
+      <mc:AlternateContent xmlns:mc="http://schemas.openxmlformats.org/markup-compatibility/2006">
+        <mc:Choice xmlns:a14="http://schemas.microsoft.com/office/drawing/2010/main" Requires="a14">
           <p:sp>
             <p:nvSpPr>
               <p:cNvPr id="12" name="文本框 11">
@@ -28219,8 +28958,8 @@
             </p:nvSpPr>
             <p:spPr>
               <a:xfrm>
-                <a:off x="6238959" y="1375646"/>
-                <a:ext cx="5025154" cy="4832092"/>
+                <a:off x="6145306" y="1375646"/>
+                <a:ext cx="5590855" cy="4832092"/>
               </a:xfrm>
               <a:prstGeom prst="rect">
                 <a:avLst/>
@@ -28293,6 +29032,20 @@
                     <a:cs typeface="Times New Roman" panose="02020603050405020304" pitchFamily="18" charset="0"/>
                   </a:rPr>
                   <a:t>LBL</a:t>
+                </a:r>
+                <a:r>
+                  <a:rPr lang="zh-CN" altLang="en-US" sz="2400" dirty="0">
+                    <a:latin typeface="Times New Roman" panose="02020603050405020304" pitchFamily="18" charset="0"/>
+                    <a:cs typeface="Times New Roman" panose="02020603050405020304" pitchFamily="18" charset="0"/>
+                  </a:rPr>
+                  <a:t>、</a:t>
+                </a:r>
+                <a:r>
+                  <a:rPr lang="en-US" altLang="zh-CN" sz="2400" dirty="0">
+                    <a:latin typeface="Times New Roman" panose="02020603050405020304" pitchFamily="18" charset="0"/>
+                    <a:cs typeface="Times New Roman" panose="02020603050405020304" pitchFamily="18" charset="0"/>
+                  </a:rPr>
+                  <a:t>CIA</a:t>
                 </a:r>
                 <a:r>
                   <a:rPr lang="zh-CN" altLang="en-US" sz="2400" dirty="0">
@@ -28579,7 +29332,7 @@
             </p:txBody>
           </p:sp>
         </mc:Choice>
-        <mc:Fallback xmlns="">
+        <mc:Fallback>
           <p:sp>
             <p:nvSpPr>
               <p:cNvPr id="12" name="文本框 11">
@@ -28596,8 +29349,8 @@
             </p:nvSpPr>
             <p:spPr>
               <a:xfrm>
-                <a:off x="6238959" y="1375646"/>
-                <a:ext cx="5025154" cy="4832092"/>
+                <a:off x="6145306" y="1375646"/>
+                <a:ext cx="5590855" cy="4832092"/>
               </a:xfrm>
               <a:prstGeom prst="rect">
                 <a:avLst/>
@@ -28605,7 +29358,7 @@
               <a:blipFill>
                 <a:blip r:embed="rId6"/>
                 <a:stretch>
-                  <a:fillRect l="-1818" t="-884" b="-1389"/>
+                  <a:fillRect l="-1636" t="-884" b="-1389"/>
                 </a:stretch>
               </a:blipFill>
             </p:spPr>

</xml_diff>

<commit_message>
Site updated: 2024-12-26 13:41:43
</commit_message>
<xml_diff>
--- a/pdf/PASRML/王艺霖_基于机器学习的行星大气光谱反演.pptx
+++ b/pdf/PASRML/王艺霖_基于机器学习的行星大气光谱反演.pptx
@@ -5,7 +5,7 @@
     <p:sldMasterId id="2147483648" r:id="rId1"/>
   </p:sldMasterIdLst>
   <p:notesMasterIdLst>
-    <p:notesMasterId r:id="rId21"/>
+    <p:notesMasterId r:id="rId22"/>
   </p:notesMasterIdLst>
   <p:sldIdLst>
     <p:sldId id="636" r:id="rId2"/>
@@ -17,16 +17,17 @@
     <p:sldId id="3258" r:id="rId8"/>
     <p:sldId id="3259" r:id="rId9"/>
     <p:sldId id="3262" r:id="rId10"/>
-    <p:sldId id="3254" r:id="rId11"/>
-    <p:sldId id="3255" r:id="rId12"/>
-    <p:sldId id="3252" r:id="rId13"/>
-    <p:sldId id="3263" r:id="rId14"/>
-    <p:sldId id="3257" r:id="rId15"/>
-    <p:sldId id="3264" r:id="rId16"/>
-    <p:sldId id="3256" r:id="rId17"/>
-    <p:sldId id="3267" r:id="rId18"/>
-    <p:sldId id="3265" r:id="rId19"/>
-    <p:sldId id="3266" r:id="rId20"/>
+    <p:sldId id="3268" r:id="rId11"/>
+    <p:sldId id="3254" r:id="rId12"/>
+    <p:sldId id="3255" r:id="rId13"/>
+    <p:sldId id="3252" r:id="rId14"/>
+    <p:sldId id="3263" r:id="rId15"/>
+    <p:sldId id="3257" r:id="rId16"/>
+    <p:sldId id="3264" r:id="rId17"/>
+    <p:sldId id="3256" r:id="rId18"/>
+    <p:sldId id="3267" r:id="rId19"/>
+    <p:sldId id="3265" r:id="rId20"/>
+    <p:sldId id="3266" r:id="rId21"/>
   </p:sldIdLst>
   <p:sldSz cx="12192000" cy="6858000"/>
   <p:notesSz cx="6858000" cy="9144000"/>
@@ -586,7 +587,7 @@
         <p:cNvPr id="1" name="">
           <a:extLst>
             <a:ext uri="{FF2B5EF4-FFF2-40B4-BE49-F238E27FC236}">
-              <a16:creationId xmlns:a16="http://schemas.microsoft.com/office/drawing/2014/main" id="{D365D370-C10C-0454-77FA-0D3D856EDED8}"/>
+              <a16:creationId xmlns:a16="http://schemas.microsoft.com/office/drawing/2014/main" id="{45968D43-E52F-F9B4-8292-64869DD23BDA}"/>
             </a:ext>
           </a:extLst>
         </p:cNvPr>
@@ -606,7 +607,7 @@
           <p:cNvPr id="2" name="幻灯片图像占位符 1">
             <a:extLst>
               <a:ext uri="{FF2B5EF4-FFF2-40B4-BE49-F238E27FC236}">
-                <a16:creationId xmlns:a16="http://schemas.microsoft.com/office/drawing/2014/main" id="{AF9D6593-441D-1361-5E2A-69F5F2703D74}"/>
+                <a16:creationId xmlns:a16="http://schemas.microsoft.com/office/drawing/2014/main" id="{3DC70A4A-FFF2-5DBD-0E52-B5C55E6DF740}"/>
               </a:ext>
             </a:extLst>
           </p:cNvPr>
@@ -624,7 +625,7 @@
           <p:cNvPr id="3" name="备注占位符 2">
             <a:extLst>
               <a:ext uri="{FF2B5EF4-FFF2-40B4-BE49-F238E27FC236}">
-                <a16:creationId xmlns:a16="http://schemas.microsoft.com/office/drawing/2014/main" id="{D8BB8EAF-2A9A-7B1B-5FE3-C5EABCB2BE1F}"/>
+                <a16:creationId xmlns:a16="http://schemas.microsoft.com/office/drawing/2014/main" id="{CEA6EC07-62F2-D1B8-DCE5-9C4633AE69FF}"/>
               </a:ext>
             </a:extLst>
           </p:cNvPr>
@@ -652,7 +653,7 @@
           <p:cNvPr id="4" name="灯片编号占位符 3">
             <a:extLst>
               <a:ext uri="{FF2B5EF4-FFF2-40B4-BE49-F238E27FC236}">
-                <a16:creationId xmlns:a16="http://schemas.microsoft.com/office/drawing/2014/main" id="{EF599FF8-9CDE-EE12-0363-4431DAD56FE1}"/>
+                <a16:creationId xmlns:a16="http://schemas.microsoft.com/office/drawing/2014/main" id="{6F3FB87A-2FD2-DDA3-5ADB-B60C865189D9}"/>
               </a:ext>
             </a:extLst>
           </p:cNvPr>
@@ -679,6 +680,117 @@
     </p:spTree>
     <p:extLst>
       <p:ext uri="{BB962C8B-B14F-4D97-AF65-F5344CB8AC3E}">
+        <p14:creationId xmlns:p14="http://schemas.microsoft.com/office/powerpoint/2010/main" val="1382077856"/>
+      </p:ext>
+    </p:extLst>
+  </p:cSld>
+  <p:clrMapOvr>
+    <a:masterClrMapping/>
+  </p:clrMapOvr>
+</p:notes>
+</file>
+
+<file path=ppt/notesSlides/notesSlide11.xml><?xml version="1.0" encoding="utf-8"?>
+<p:notes xmlns:a="http://schemas.openxmlformats.org/drawingml/2006/main" xmlns:r="http://schemas.openxmlformats.org/officeDocument/2006/relationships" xmlns:p="http://schemas.openxmlformats.org/presentationml/2006/main">
+  <p:cSld>
+    <p:spTree>
+      <p:nvGrpSpPr>
+        <p:cNvPr id="1" name="">
+          <a:extLst>
+            <a:ext uri="{FF2B5EF4-FFF2-40B4-BE49-F238E27FC236}">
+              <a16:creationId xmlns:a16="http://schemas.microsoft.com/office/drawing/2014/main" id="{D365D370-C10C-0454-77FA-0D3D856EDED8}"/>
+            </a:ext>
+          </a:extLst>
+        </p:cNvPr>
+        <p:cNvGrpSpPr/>
+        <p:nvPr/>
+      </p:nvGrpSpPr>
+      <p:grpSpPr>
+        <a:xfrm>
+          <a:off x="0" y="0"/>
+          <a:ext cx="0" cy="0"/>
+          <a:chOff x="0" y="0"/>
+          <a:chExt cx="0" cy="0"/>
+        </a:xfrm>
+      </p:grpSpPr>
+      <p:sp>
+        <p:nvSpPr>
+          <p:cNvPr id="2" name="幻灯片图像占位符 1">
+            <a:extLst>
+              <a:ext uri="{FF2B5EF4-FFF2-40B4-BE49-F238E27FC236}">
+                <a16:creationId xmlns:a16="http://schemas.microsoft.com/office/drawing/2014/main" id="{AF9D6593-441D-1361-5E2A-69F5F2703D74}"/>
+              </a:ext>
+            </a:extLst>
+          </p:cNvPr>
+          <p:cNvSpPr>
+            <a:spLocks noGrp="1" noRot="1" noChangeAspect="1"/>
+          </p:cNvSpPr>
+          <p:nvPr>
+            <p:ph type="sldImg"/>
+          </p:nvPr>
+        </p:nvSpPr>
+        <p:spPr/>
+      </p:sp>
+      <p:sp>
+        <p:nvSpPr>
+          <p:cNvPr id="3" name="备注占位符 2">
+            <a:extLst>
+              <a:ext uri="{FF2B5EF4-FFF2-40B4-BE49-F238E27FC236}">
+                <a16:creationId xmlns:a16="http://schemas.microsoft.com/office/drawing/2014/main" id="{D8BB8EAF-2A9A-7B1B-5FE3-C5EABCB2BE1F}"/>
+              </a:ext>
+            </a:extLst>
+          </p:cNvPr>
+          <p:cNvSpPr>
+            <a:spLocks noGrp="1"/>
+          </p:cNvSpPr>
+          <p:nvPr>
+            <p:ph type="body" idx="1"/>
+          </p:nvPr>
+        </p:nvSpPr>
+        <p:spPr/>
+        <p:txBody>
+          <a:bodyPr/>
+          <a:lstStyle/>
+          <a:p>
+            <a:endParaRPr lang="en-US" altLang="zh-CN" sz="1200" dirty="0">
+              <a:latin typeface="Times New Roman" panose="02020603050405020304" pitchFamily="18" charset="0"/>
+              <a:cs typeface="Times New Roman" panose="02020603050405020304" pitchFamily="18" charset="0"/>
+            </a:endParaRPr>
+          </a:p>
+        </p:txBody>
+      </p:sp>
+      <p:sp>
+        <p:nvSpPr>
+          <p:cNvPr id="4" name="灯片编号占位符 3">
+            <a:extLst>
+              <a:ext uri="{FF2B5EF4-FFF2-40B4-BE49-F238E27FC236}">
+                <a16:creationId xmlns:a16="http://schemas.microsoft.com/office/drawing/2014/main" id="{EF599FF8-9CDE-EE12-0363-4431DAD56FE1}"/>
+              </a:ext>
+            </a:extLst>
+          </p:cNvPr>
+          <p:cNvSpPr>
+            <a:spLocks noGrp="1"/>
+          </p:cNvSpPr>
+          <p:nvPr>
+            <p:ph type="sldNum" sz="quarter" idx="5"/>
+          </p:nvPr>
+        </p:nvSpPr>
+        <p:spPr/>
+        <p:txBody>
+          <a:bodyPr/>
+          <a:lstStyle/>
+          <a:p>
+            <a:fld id="{1B3A42BA-6EFD-4774-85EC-DDFF3C1B2325}" type="slidenum">
+              <a:rPr lang="zh-CN" altLang="en-US" smtClean="0"/>
+              <a:t>11</a:t>
+            </a:fld>
+            <a:endParaRPr lang="zh-CN" altLang="en-US"/>
+          </a:p>
+        </p:txBody>
+      </p:sp>
+    </p:spTree>
+    <p:extLst>
+      <p:ext uri="{BB962C8B-B14F-4D97-AF65-F5344CB8AC3E}">
         <p14:creationId xmlns:p14="http://schemas.microsoft.com/office/powerpoint/2010/main" val="3862479152"/>
       </p:ext>
     </p:extLst>
@@ -689,7 +801,7 @@
 </p:notes>
 </file>
 
-<file path=ppt/notesSlides/notesSlide11.xml><?xml version="1.0" encoding="utf-8"?>
+<file path=ppt/notesSlides/notesSlide12.xml><?xml version="1.0" encoding="utf-8"?>
 <p:notes xmlns:a="http://schemas.openxmlformats.org/drawingml/2006/main" xmlns:r="http://schemas.openxmlformats.org/officeDocument/2006/relationships" xmlns:p="http://schemas.openxmlformats.org/presentationml/2006/main">
   <p:cSld>
     <p:spTree>
@@ -781,7 +893,7 @@
           <a:p>
             <a:fld id="{1B3A42BA-6EFD-4774-85EC-DDFF3C1B2325}" type="slidenum">
               <a:rPr lang="zh-CN" altLang="en-US" smtClean="0"/>
-              <a:t>11</a:t>
+              <a:t>12</a:t>
             </a:fld>
             <a:endParaRPr lang="zh-CN" altLang="en-US"/>
           </a:p>
@@ -800,7 +912,7 @@
 </p:notes>
 </file>
 
-<file path=ppt/notesSlides/notesSlide12.xml><?xml version="1.0" encoding="utf-8"?>
+<file path=ppt/notesSlides/notesSlide13.xml><?xml version="1.0" encoding="utf-8"?>
 <p:notes xmlns:a="http://schemas.openxmlformats.org/drawingml/2006/main" xmlns:r="http://schemas.openxmlformats.org/officeDocument/2006/relationships" xmlns:p="http://schemas.openxmlformats.org/presentationml/2006/main">
   <p:cSld>
     <p:spTree>
@@ -889,7 +1001,7 @@
           <a:p>
             <a:fld id="{1B3A42BA-6EFD-4774-85EC-DDFF3C1B2325}" type="slidenum">
               <a:rPr lang="zh-CN" altLang="en-US" smtClean="0"/>
-              <a:t>12</a:t>
+              <a:t>13</a:t>
             </a:fld>
             <a:endParaRPr lang="zh-CN" altLang="en-US"/>
           </a:p>
@@ -908,7 +1020,7 @@
 </p:notes>
 </file>
 
-<file path=ppt/notesSlides/notesSlide13.xml><?xml version="1.0" encoding="utf-8"?>
+<file path=ppt/notesSlides/notesSlide14.xml><?xml version="1.0" encoding="utf-8"?>
 <p:notes xmlns:a="http://schemas.openxmlformats.org/drawingml/2006/main" xmlns:r="http://schemas.openxmlformats.org/officeDocument/2006/relationships" xmlns:p="http://schemas.openxmlformats.org/presentationml/2006/main">
   <p:cSld>
     <p:spTree>
@@ -1000,7 +1112,7 @@
           <a:p>
             <a:fld id="{1B3A42BA-6EFD-4774-85EC-DDFF3C1B2325}" type="slidenum">
               <a:rPr lang="zh-CN" altLang="en-US" smtClean="0"/>
-              <a:t>13</a:t>
+              <a:t>14</a:t>
             </a:fld>
             <a:endParaRPr lang="zh-CN" altLang="en-US"/>
           </a:p>
@@ -1019,7 +1131,7 @@
 </p:notes>
 </file>
 
-<file path=ppt/notesSlides/notesSlide14.xml><?xml version="1.0" encoding="utf-8"?>
+<file path=ppt/notesSlides/notesSlide15.xml><?xml version="1.0" encoding="utf-8"?>
 <p:notes xmlns:a="http://schemas.openxmlformats.org/drawingml/2006/main" xmlns:r="http://schemas.openxmlformats.org/officeDocument/2006/relationships" xmlns:p="http://schemas.openxmlformats.org/presentationml/2006/main">
   <p:cSld>
     <p:spTree>
@@ -1111,7 +1223,7 @@
           <a:p>
             <a:fld id="{1B3A42BA-6EFD-4774-85EC-DDFF3C1B2325}" type="slidenum">
               <a:rPr lang="zh-CN" altLang="en-US" smtClean="0"/>
-              <a:t>14</a:t>
+              <a:t>15</a:t>
             </a:fld>
             <a:endParaRPr lang="zh-CN" altLang="en-US"/>
           </a:p>
@@ -1130,7 +1242,7 @@
 </p:notes>
 </file>
 
-<file path=ppt/notesSlides/notesSlide15.xml><?xml version="1.0" encoding="utf-8"?>
+<file path=ppt/notesSlides/notesSlide16.xml><?xml version="1.0" encoding="utf-8"?>
 <p:notes xmlns:a="http://schemas.openxmlformats.org/drawingml/2006/main" xmlns:r="http://schemas.openxmlformats.org/officeDocument/2006/relationships" xmlns:p="http://schemas.openxmlformats.org/presentationml/2006/main">
   <p:cSld>
     <p:spTree>
@@ -1222,7 +1334,7 @@
           <a:p>
             <a:fld id="{1B3A42BA-6EFD-4774-85EC-DDFF3C1B2325}" type="slidenum">
               <a:rPr lang="zh-CN" altLang="en-US" smtClean="0"/>
-              <a:t>15</a:t>
+              <a:t>16</a:t>
             </a:fld>
             <a:endParaRPr lang="zh-CN" altLang="en-US"/>
           </a:p>
@@ -1241,7 +1353,7 @@
 </p:notes>
 </file>
 
-<file path=ppt/notesSlides/notesSlide16.xml><?xml version="1.0" encoding="utf-8"?>
+<file path=ppt/notesSlides/notesSlide17.xml><?xml version="1.0" encoding="utf-8"?>
 <p:notes xmlns:a="http://schemas.openxmlformats.org/drawingml/2006/main" xmlns:r="http://schemas.openxmlformats.org/officeDocument/2006/relationships" xmlns:p="http://schemas.openxmlformats.org/presentationml/2006/main">
   <p:cSld>
     <p:spTree>
@@ -1333,7 +1445,7 @@
           <a:p>
             <a:fld id="{1B3A42BA-6EFD-4774-85EC-DDFF3C1B2325}" type="slidenum">
               <a:rPr lang="zh-CN" altLang="en-US" smtClean="0"/>
-              <a:t>16</a:t>
+              <a:t>17</a:t>
             </a:fld>
             <a:endParaRPr lang="zh-CN" altLang="en-US"/>
           </a:p>
@@ -13533,7 +13645,7 @@
         <p:cNvPr id="1" name="">
           <a:extLst>
             <a:ext uri="{FF2B5EF4-FFF2-40B4-BE49-F238E27FC236}">
-              <a16:creationId xmlns:a16="http://schemas.microsoft.com/office/drawing/2014/main" id="{201703DE-43B5-4A97-CD5C-D0D07CCEADA3}"/>
+              <a16:creationId xmlns:a16="http://schemas.microsoft.com/office/drawing/2014/main" id="{CF5F3B6F-B0B3-7DEB-C68E-6EA47CD9546B}"/>
             </a:ext>
           </a:extLst>
         </p:cNvPr>
@@ -13553,7 +13665,7 @@
           <p:cNvPr id="2" name="矩形 1">
             <a:extLst>
               <a:ext uri="{FF2B5EF4-FFF2-40B4-BE49-F238E27FC236}">
-                <a16:creationId xmlns:a16="http://schemas.microsoft.com/office/drawing/2014/main" id="{124BB2BF-28B3-F161-2C53-9DF5CE1770AE}"/>
+                <a16:creationId xmlns:a16="http://schemas.microsoft.com/office/drawing/2014/main" id="{AA814CCC-1E33-86B1-83EF-52C64D6D37B6}"/>
               </a:ext>
             </a:extLst>
           </p:cNvPr>
@@ -13621,7 +13733,7 @@
           <p:cNvPr id="3" name="图片 2">
             <a:extLst>
               <a:ext uri="{FF2B5EF4-FFF2-40B4-BE49-F238E27FC236}">
-                <a16:creationId xmlns:a16="http://schemas.microsoft.com/office/drawing/2014/main" id="{B67E7DAE-97B3-132E-4459-27434E50013E}"/>
+                <a16:creationId xmlns:a16="http://schemas.microsoft.com/office/drawing/2014/main" id="{0BFFC400-7BDB-AC81-D41F-588EEE2BBF60}"/>
               </a:ext>
             </a:extLst>
           </p:cNvPr>
@@ -13657,7 +13769,7 @@
           <p:cNvPr id="4" name="图片 3" descr="卡通人物&#10;&#10;描述已自动生成">
             <a:extLst>
               <a:ext uri="{FF2B5EF4-FFF2-40B4-BE49-F238E27FC236}">
-                <a16:creationId xmlns:a16="http://schemas.microsoft.com/office/drawing/2014/main" id="{0CE36E9D-C455-5C63-298F-2F37D8B7BFAA}"/>
+                <a16:creationId xmlns:a16="http://schemas.microsoft.com/office/drawing/2014/main" id="{FA427842-F148-7AEE-DBAD-E6CBF61A54B3}"/>
               </a:ext>
             </a:extLst>
           </p:cNvPr>
@@ -13693,7 +13805,7 @@
           <p:cNvPr id="5" name="文本框 4">
             <a:extLst>
               <a:ext uri="{FF2B5EF4-FFF2-40B4-BE49-F238E27FC236}">
-                <a16:creationId xmlns:a16="http://schemas.microsoft.com/office/drawing/2014/main" id="{12CAE349-7888-4EFD-41F7-097CADAAA108}"/>
+                <a16:creationId xmlns:a16="http://schemas.microsoft.com/office/drawing/2014/main" id="{B32379AF-1AF1-B356-FBA2-4EECC4164322}"/>
               </a:ext>
             </a:extLst>
           </p:cNvPr>
@@ -13725,7 +13837,7 @@
                 <a:ea typeface="黑体" panose="02010609060101010101" pitchFamily="49" charset="-122"/>
                 <a:cs typeface="Times New Roman" panose="02020603050405020304" pitchFamily="18" charset="0"/>
               </a:rPr>
-              <a:t>参数选取</a:t>
+              <a:t>一个数据点实例</a:t>
             </a:r>
             <a:endParaRPr lang="en-US" altLang="zh-CN" sz="2400" b="1" dirty="0">
               <a:solidFill>
@@ -13743,7 +13855,7 @@
           <p:cNvPr id="6" name="椭圆 5">
             <a:extLst>
               <a:ext uri="{FF2B5EF4-FFF2-40B4-BE49-F238E27FC236}">
-                <a16:creationId xmlns:a16="http://schemas.microsoft.com/office/drawing/2014/main" id="{EB5791AE-4046-DFEF-E90D-C76023822047}"/>
+                <a16:creationId xmlns:a16="http://schemas.microsoft.com/office/drawing/2014/main" id="{A13C4C51-3677-6029-8C73-D7C4DEA9ECCD}"/>
               </a:ext>
             </a:extLst>
           </p:cNvPr>
@@ -13807,7 +13919,7 @@
           <p:cNvPr id="7" name="矩形 6">
             <a:extLst>
               <a:ext uri="{FF2B5EF4-FFF2-40B4-BE49-F238E27FC236}">
-                <a16:creationId xmlns:a16="http://schemas.microsoft.com/office/drawing/2014/main" id="{3816CE25-242E-9774-B5BB-EF96440859EF}"/>
+                <a16:creationId xmlns:a16="http://schemas.microsoft.com/office/drawing/2014/main" id="{243E7301-63FA-974C-0E74-A6C4F11A9138}"/>
               </a:ext>
             </a:extLst>
           </p:cNvPr>
@@ -13854,7 +13966,7 @@
           <p:cNvPr id="9" name="灯片编号占位符 8">
             <a:extLst>
               <a:ext uri="{FF2B5EF4-FFF2-40B4-BE49-F238E27FC236}">
-                <a16:creationId xmlns:a16="http://schemas.microsoft.com/office/drawing/2014/main" id="{31A654E1-9688-6680-FE83-6E25A9C760CA}"/>
+                <a16:creationId xmlns:a16="http://schemas.microsoft.com/office/drawing/2014/main" id="{28C62F1B-13A8-BF33-8041-A2905EA1FCCB}"/>
               </a:ext>
             </a:extLst>
           </p:cNvPr>
@@ -13878,8 +13990,482 @@
           </a:p>
         </p:txBody>
       </p:sp>
-      <mc:AlternateContent xmlns:mc="http://schemas.openxmlformats.org/markup-compatibility/2006">
-        <mc:Choice xmlns:a14="http://schemas.microsoft.com/office/drawing/2010/main" Requires="a14">
+      <p:pic>
+        <p:nvPicPr>
+          <p:cNvPr id="11" name="图片 10">
+            <a:extLst>
+              <a:ext uri="{FF2B5EF4-FFF2-40B4-BE49-F238E27FC236}">
+                <a16:creationId xmlns:a16="http://schemas.microsoft.com/office/drawing/2014/main" id="{FCD7B2FE-68DB-5117-5FDD-CBCC3388ED94}"/>
+              </a:ext>
+            </a:extLst>
+          </p:cNvPr>
+          <p:cNvPicPr>
+            <a:picLocks noChangeAspect="1"/>
+          </p:cNvPicPr>
+          <p:nvPr/>
+        </p:nvPicPr>
+        <p:blipFill>
+          <a:blip r:embed="rId5">
+            <a:extLst>
+              <a:ext uri="{28A0092B-C50C-407E-A947-70E740481C1C}">
+                <a14:useLocalDpi xmlns:a14="http://schemas.microsoft.com/office/drawing/2010/main" val="0"/>
+              </a:ext>
+            </a:extLst>
+          </a:blip>
+          <a:stretch>
+            <a:fillRect/>
+          </a:stretch>
+        </p:blipFill>
+        <p:spPr>
+          <a:xfrm>
+            <a:off x="5488083" y="3689184"/>
+            <a:ext cx="5691451" cy="2849728"/>
+          </a:xfrm>
+          <a:prstGeom prst="rect">
+            <a:avLst/>
+          </a:prstGeom>
+        </p:spPr>
+      </p:pic>
+      <p:pic>
+        <p:nvPicPr>
+          <p:cNvPr id="13" name="图片 12">
+            <a:extLst>
+              <a:ext uri="{FF2B5EF4-FFF2-40B4-BE49-F238E27FC236}">
+                <a16:creationId xmlns:a16="http://schemas.microsoft.com/office/drawing/2014/main" id="{D25C9DDD-C187-262F-2BBE-4E6AA963A8D6}"/>
+              </a:ext>
+            </a:extLst>
+          </p:cNvPr>
+          <p:cNvPicPr>
+            <a:picLocks noChangeAspect="1"/>
+          </p:cNvPicPr>
+          <p:nvPr/>
+        </p:nvPicPr>
+        <p:blipFill>
+          <a:blip r:embed="rId6">
+            <a:extLst>
+              <a:ext uri="{28A0092B-C50C-407E-A947-70E740481C1C}">
+                <a14:useLocalDpi xmlns:a14="http://schemas.microsoft.com/office/drawing/2010/main" val="0"/>
+              </a:ext>
+            </a:extLst>
+          </a:blip>
+          <a:stretch>
+            <a:fillRect/>
+          </a:stretch>
+        </p:blipFill>
+        <p:spPr>
+          <a:xfrm>
+            <a:off x="1940715" y="697325"/>
+            <a:ext cx="7844963" cy="2784453"/>
+          </a:xfrm>
+          <a:prstGeom prst="rect">
+            <a:avLst/>
+          </a:prstGeom>
+        </p:spPr>
+      </p:pic>
+      <p:pic>
+        <p:nvPicPr>
+          <p:cNvPr id="15" name="图片 14">
+            <a:extLst>
+              <a:ext uri="{FF2B5EF4-FFF2-40B4-BE49-F238E27FC236}">
+                <a16:creationId xmlns:a16="http://schemas.microsoft.com/office/drawing/2014/main" id="{76CB2EEC-C3E4-021E-C454-78F9FC875BB4}"/>
+              </a:ext>
+            </a:extLst>
+          </p:cNvPr>
+          <p:cNvPicPr>
+            <a:picLocks noChangeAspect="1"/>
+          </p:cNvPicPr>
+          <p:nvPr/>
+        </p:nvPicPr>
+        <p:blipFill>
+          <a:blip r:embed="rId7">
+            <a:extLst>
+              <a:ext uri="{28A0092B-C50C-407E-A947-70E740481C1C}">
+                <a14:useLocalDpi xmlns:a14="http://schemas.microsoft.com/office/drawing/2010/main" val="0"/>
+              </a:ext>
+            </a:extLst>
+          </a:blip>
+          <a:stretch>
+            <a:fillRect/>
+          </a:stretch>
+        </p:blipFill>
+        <p:spPr>
+          <a:xfrm>
+            <a:off x="838200" y="3689184"/>
+            <a:ext cx="4363379" cy="2884268"/>
+          </a:xfrm>
+          <a:prstGeom prst="rect">
+            <a:avLst/>
+          </a:prstGeom>
+        </p:spPr>
+      </p:pic>
+    </p:spTree>
+    <p:extLst>
+      <p:ext uri="{BB962C8B-B14F-4D97-AF65-F5344CB8AC3E}">
+        <p14:creationId xmlns:p14="http://schemas.microsoft.com/office/powerpoint/2010/main" val="4175803371"/>
+      </p:ext>
+    </p:extLst>
+  </p:cSld>
+  <p:clrMapOvr>
+    <a:masterClrMapping/>
+  </p:clrMapOvr>
+</p:sld>
+</file>
+
+<file path=ppt/slides/slide11.xml><?xml version="1.0" encoding="utf-8"?>
+<p:sld xmlns:a="http://schemas.openxmlformats.org/drawingml/2006/main" xmlns:r="http://schemas.openxmlformats.org/officeDocument/2006/relationships" xmlns:p="http://schemas.openxmlformats.org/presentationml/2006/main">
+  <p:cSld>
+    <p:spTree>
+      <p:nvGrpSpPr>
+        <p:cNvPr id="1" name="">
+          <a:extLst>
+            <a:ext uri="{FF2B5EF4-FFF2-40B4-BE49-F238E27FC236}">
+              <a16:creationId xmlns:a16="http://schemas.microsoft.com/office/drawing/2014/main" id="{201703DE-43B5-4A97-CD5C-D0D07CCEADA3}"/>
+            </a:ext>
+          </a:extLst>
+        </p:cNvPr>
+        <p:cNvGrpSpPr/>
+        <p:nvPr/>
+      </p:nvGrpSpPr>
+      <p:grpSpPr>
+        <a:xfrm>
+          <a:off x="0" y="0"/>
+          <a:ext cx="0" cy="0"/>
+          <a:chOff x="0" y="0"/>
+          <a:chExt cx="0" cy="0"/>
+        </a:xfrm>
+      </p:grpSpPr>
+      <p:sp>
+        <p:nvSpPr>
+          <p:cNvPr id="2" name="矩形 1">
+            <a:extLst>
+              <a:ext uri="{FF2B5EF4-FFF2-40B4-BE49-F238E27FC236}">
+                <a16:creationId xmlns:a16="http://schemas.microsoft.com/office/drawing/2014/main" id="{124BB2BF-28B3-F161-2C53-9DF5CE1770AE}"/>
+              </a:ext>
+            </a:extLst>
+          </p:cNvPr>
+          <p:cNvSpPr/>
+          <p:nvPr/>
+        </p:nvSpPr>
+        <p:spPr>
+          <a:xfrm>
+            <a:off x="0" y="0"/>
+            <a:ext cx="12192000" cy="615950"/>
+          </a:xfrm>
+          <a:prstGeom prst="rect">
+            <a:avLst/>
+          </a:prstGeom>
+          <a:solidFill>
+            <a:schemeClr val="accent1"/>
+          </a:solidFill>
+          <a:ln w="12700" cap="flat" cmpd="sng" algn="ctr">
+            <a:noFill/>
+            <a:prstDash val="solid"/>
+            <a:miter lim="800000"/>
+          </a:ln>
+          <a:effectLst/>
+          <a:extLst>
+            <a:ext uri="{91240B29-F687-4F45-9708-019B960494DF}">
+              <a14:hiddenLine xmlns:a14="http://schemas.microsoft.com/office/drawing/2010/main" w="0" cap="flat" cmpd="sng" algn="ctr">
+                <a:solidFill>
+                  <a:schemeClr val="accent1">
+                    <a:shade val="50000"/>
+                  </a:schemeClr>
+                </a:solidFill>
+                <a:prstDash val="solid"/>
+                <a:miter lim="800000"/>
+              </a14:hiddenLine>
+            </a:ext>
+          </a:extLst>
+        </p:spPr>
+        <p:style>
+          <a:lnRef idx="2">
+            <a:schemeClr val="accent1">
+              <a:shade val="50000"/>
+            </a:schemeClr>
+          </a:lnRef>
+          <a:fillRef idx="1">
+            <a:schemeClr val="accent1"/>
+          </a:fillRef>
+          <a:effectRef idx="0">
+            <a:schemeClr val="accent1"/>
+          </a:effectRef>
+          <a:fontRef idx="minor">
+            <a:schemeClr val="lt1"/>
+          </a:fontRef>
+        </p:style>
+        <p:txBody>
+          <a:bodyPr rtlCol="0" anchor="ctr"/>
+          <a:lstStyle/>
+          <a:p>
+            <a:pPr algn="ctr"/>
+            <a:endParaRPr lang="zh-CN" altLang="en-US"/>
+          </a:p>
+        </p:txBody>
+      </p:sp>
+      <p:pic>
+        <p:nvPicPr>
+          <p:cNvPr id="3" name="图片 2">
+            <a:extLst>
+              <a:ext uri="{FF2B5EF4-FFF2-40B4-BE49-F238E27FC236}">
+                <a16:creationId xmlns:a16="http://schemas.microsoft.com/office/drawing/2014/main" id="{B67E7DAE-97B3-132E-4459-27434E50013E}"/>
+              </a:ext>
+            </a:extLst>
+          </p:cNvPr>
+          <p:cNvPicPr>
+            <a:picLocks noChangeAspect="1"/>
+          </p:cNvPicPr>
+          <p:nvPr/>
+        </p:nvPicPr>
+        <p:blipFill rotWithShape="1">
+          <a:blip r:embed="rId3">
+            <a:alphaModFix amt="10000"/>
+            <a:extLst>
+              <a:ext uri="{28A0092B-C50C-407E-A947-70E740481C1C}">
+                <a14:useLocalDpi xmlns:a14="http://schemas.microsoft.com/office/drawing/2010/main" val="0"/>
+              </a:ext>
+            </a:extLst>
+          </a:blip>
+          <a:srcRect/>
+          <a:stretch/>
+        </p:blipFill>
+        <p:spPr>
+          <a:xfrm>
+            <a:off x="5867400" y="0"/>
+            <a:ext cx="6324600" cy="615950"/>
+          </a:xfrm>
+          <a:prstGeom prst="rect">
+            <a:avLst/>
+          </a:prstGeom>
+        </p:spPr>
+      </p:pic>
+      <p:pic>
+        <p:nvPicPr>
+          <p:cNvPr id="4" name="图片 3" descr="卡通人物&#10;&#10;描述已自动生成">
+            <a:extLst>
+              <a:ext uri="{FF2B5EF4-FFF2-40B4-BE49-F238E27FC236}">
+                <a16:creationId xmlns:a16="http://schemas.microsoft.com/office/drawing/2014/main" id="{0CE36E9D-C455-5C63-298F-2F37D8B7BFAA}"/>
+              </a:ext>
+            </a:extLst>
+          </p:cNvPr>
+          <p:cNvPicPr>
+            <a:picLocks noChangeAspect="1"/>
+          </p:cNvPicPr>
+          <p:nvPr/>
+        </p:nvPicPr>
+        <p:blipFill>
+          <a:blip r:embed="rId4" cstate="print">
+            <a:extLst>
+              <a:ext uri="{28A0092B-C50C-407E-A947-70E740481C1C}">
+                <a14:useLocalDpi xmlns:a14="http://schemas.microsoft.com/office/drawing/2010/main" val="0"/>
+              </a:ext>
+            </a:extLst>
+          </a:blip>
+          <a:stretch>
+            <a:fillRect/>
+          </a:stretch>
+        </p:blipFill>
+        <p:spPr>
+          <a:xfrm>
+            <a:off x="10489624" y="140330"/>
+            <a:ext cx="1246537" cy="359697"/>
+          </a:xfrm>
+          <a:prstGeom prst="rect">
+            <a:avLst/>
+          </a:prstGeom>
+        </p:spPr>
+      </p:pic>
+      <p:sp>
+        <p:nvSpPr>
+          <p:cNvPr id="5" name="文本框 4">
+            <a:extLst>
+              <a:ext uri="{FF2B5EF4-FFF2-40B4-BE49-F238E27FC236}">
+                <a16:creationId xmlns:a16="http://schemas.microsoft.com/office/drawing/2014/main" id="{12CAE349-7888-4EFD-41F7-097CADAAA108}"/>
+              </a:ext>
+            </a:extLst>
+          </p:cNvPr>
+          <p:cNvSpPr txBox="1"/>
+          <p:nvPr/>
+        </p:nvSpPr>
+        <p:spPr>
+          <a:xfrm>
+            <a:off x="750356" y="81375"/>
+            <a:ext cx="5199182" cy="461665"/>
+          </a:xfrm>
+          <a:prstGeom prst="rect">
+            <a:avLst/>
+          </a:prstGeom>
+          <a:noFill/>
+        </p:spPr>
+        <p:txBody>
+          <a:bodyPr wrap="square" rtlCol="0">
+            <a:spAutoFit/>
+          </a:bodyPr>
+          <a:lstStyle/>
+          <a:p>
+            <a:r>
+              <a:rPr lang="zh-CN" altLang="en-US" sz="2400" b="1" dirty="0">
+                <a:solidFill>
+                  <a:schemeClr val="bg1"/>
+                </a:solidFill>
+                <a:latin typeface="黑体" panose="02010609060101010101" pitchFamily="49" charset="-122"/>
+                <a:ea typeface="黑体" panose="02010609060101010101" pitchFamily="49" charset="-122"/>
+                <a:cs typeface="Times New Roman" panose="02020603050405020304" pitchFamily="18" charset="0"/>
+              </a:rPr>
+              <a:t>参数选取</a:t>
+            </a:r>
+            <a:endParaRPr lang="en-US" altLang="zh-CN" sz="2400" b="1" dirty="0">
+              <a:solidFill>
+                <a:schemeClr val="bg1"/>
+              </a:solidFill>
+              <a:latin typeface="黑体" panose="02010609060101010101" pitchFamily="49" charset="-122"/>
+              <a:ea typeface="黑体" panose="02010609060101010101" pitchFamily="49" charset="-122"/>
+              <a:cs typeface="Times New Roman" panose="02020603050405020304" pitchFamily="18" charset="0"/>
+            </a:endParaRPr>
+          </a:p>
+        </p:txBody>
+      </p:sp>
+      <p:sp>
+        <p:nvSpPr>
+          <p:cNvPr id="6" name="椭圆 5">
+            <a:extLst>
+              <a:ext uri="{FF2B5EF4-FFF2-40B4-BE49-F238E27FC236}">
+                <a16:creationId xmlns:a16="http://schemas.microsoft.com/office/drawing/2014/main" id="{EB5791AE-4046-DFEF-E90D-C76023822047}"/>
+              </a:ext>
+            </a:extLst>
+          </p:cNvPr>
+          <p:cNvSpPr/>
+          <p:nvPr/>
+        </p:nvSpPr>
+        <p:spPr>
+          <a:xfrm rot="19800000">
+            <a:off x="417882" y="231219"/>
+            <a:ext cx="177915" cy="177915"/>
+          </a:xfrm>
+          <a:prstGeom prst="ellipse">
+            <a:avLst/>
+          </a:prstGeom>
+          <a:gradFill>
+            <a:gsLst>
+              <a:gs pos="0">
+                <a:schemeClr val="bg1">
+                  <a:alpha val="70000"/>
+                </a:schemeClr>
+              </a:gs>
+              <a:gs pos="100000">
+                <a:schemeClr val="bg1">
+                  <a:alpha val="0"/>
+                </a:schemeClr>
+              </a:gs>
+            </a:gsLst>
+            <a:lin ang="5400000" scaled="1"/>
+          </a:gradFill>
+          <a:ln>
+            <a:noFill/>
+          </a:ln>
+        </p:spPr>
+        <p:style>
+          <a:lnRef idx="2">
+            <a:schemeClr val="accent1">
+              <a:shade val="50000"/>
+            </a:schemeClr>
+          </a:lnRef>
+          <a:fillRef idx="1">
+            <a:schemeClr val="accent1"/>
+          </a:fillRef>
+          <a:effectRef idx="0">
+            <a:schemeClr val="accent1"/>
+          </a:effectRef>
+          <a:fontRef idx="minor">
+            <a:schemeClr val="lt1"/>
+          </a:fontRef>
+        </p:style>
+        <p:txBody>
+          <a:bodyPr rtlCol="0" anchor="ctr"/>
+          <a:lstStyle/>
+          <a:p>
+            <a:pPr algn="ctr"/>
+            <a:endParaRPr lang="zh-CN" altLang="en-US"/>
+          </a:p>
+        </p:txBody>
+      </p:sp>
+      <p:sp>
+        <p:nvSpPr>
+          <p:cNvPr id="7" name="矩形 6">
+            <a:extLst>
+              <a:ext uri="{FF2B5EF4-FFF2-40B4-BE49-F238E27FC236}">
+                <a16:creationId xmlns:a16="http://schemas.microsoft.com/office/drawing/2014/main" id="{3816CE25-242E-9774-B5BB-EF96440859EF}"/>
+              </a:ext>
+            </a:extLst>
+          </p:cNvPr>
+          <p:cNvSpPr/>
+          <p:nvPr/>
+        </p:nvSpPr>
+        <p:spPr>
+          <a:xfrm flipV="1">
+            <a:off x="0" y="6780858"/>
+            <a:ext cx="12192000" cy="72000"/>
+          </a:xfrm>
+          <a:prstGeom prst="rect">
+            <a:avLst/>
+          </a:prstGeom>
+          <a:solidFill>
+            <a:srgbClr val="990000"/>
+          </a:solidFill>
+          <a:ln>
+            <a:noFill/>
+          </a:ln>
+        </p:spPr>
+        <p:txBody>
+          <a:bodyPr vert="horz" wrap="square" lIns="91440" tIns="45720" rIns="91440" bIns="45720" numCol="1" anchor="t" anchorCtr="0" compatLnSpc="1">
+            <a:prstTxWarp prst="textNoShape">
+              <a:avLst/>
+            </a:prstTxWarp>
+          </a:bodyPr>
+          <a:lstStyle/>
+          <a:p>
+            <a:endParaRPr lang="zh-CN" altLang="en-US">
+              <a:solidFill>
+                <a:srgbClr val="FF0000"/>
+              </a:solidFill>
+              <a:latin typeface="Arial" panose="020B0604020202020204" pitchFamily="34" charset="0"/>
+              <a:ea typeface="Microsoft YaHei" panose="020B0503020204020204" pitchFamily="34" charset="-122"/>
+              <a:cs typeface="+mn-ea"/>
+              <a:sym typeface="Arial" panose="020B0604020202020204" pitchFamily="34" charset="0"/>
+            </a:endParaRPr>
+          </a:p>
+        </p:txBody>
+      </p:sp>
+      <p:sp>
+        <p:nvSpPr>
+          <p:cNvPr id="9" name="灯片编号占位符 8">
+            <a:extLst>
+              <a:ext uri="{FF2B5EF4-FFF2-40B4-BE49-F238E27FC236}">
+                <a16:creationId xmlns:a16="http://schemas.microsoft.com/office/drawing/2014/main" id="{31A654E1-9688-6680-FE83-6E25A9C760CA}"/>
+              </a:ext>
+            </a:extLst>
+          </p:cNvPr>
+          <p:cNvSpPr>
+            <a:spLocks noGrp="1"/>
+          </p:cNvSpPr>
+          <p:nvPr>
+            <p:ph type="sldNum" sz="quarter" idx="12"/>
+          </p:nvPr>
+        </p:nvSpPr>
+        <p:spPr/>
+        <p:txBody>
+          <a:bodyPr/>
+          <a:lstStyle/>
+          <a:p>
+            <a:fld id="{A64A0CBB-2614-41AB-884D-C0633239B6E4}" type="slidenum">
+              <a:rPr lang="zh-CN" altLang="en-US" smtClean="0"/>
+              <a:t>11</a:t>
+            </a:fld>
+            <a:endParaRPr lang="zh-CN" altLang="en-US"/>
+          </a:p>
+        </p:txBody>
+      </p:sp>
+      <mc:AlternateContent xmlns:mc="http://schemas.openxmlformats.org/markup-compatibility/2006" xmlns:a14="http://schemas.microsoft.com/office/drawing/2010/main">
+        <mc:Choice Requires="a14">
           <p:sp>
             <p:nvSpPr>
               <p:cNvPr id="8" name="文本框 7">
@@ -15089,7 +15675,7 @@
             </p:txBody>
           </p:sp>
         </mc:Choice>
-        <mc:Fallback>
+        <mc:Fallback xmlns="">
           <p:sp>
             <p:nvSpPr>
               <p:cNvPr id="8" name="文本框 7">
@@ -15147,7 +15733,7 @@
 </p:sld>
 </file>
 
-<file path=ppt/slides/slide11.xml><?xml version="1.0" encoding="utf-8"?>
+<file path=ppt/slides/slide12.xml><?xml version="1.0" encoding="utf-8"?>
 <p:sld xmlns:a="http://schemas.openxmlformats.org/drawingml/2006/main" xmlns:r="http://schemas.openxmlformats.org/officeDocument/2006/relationships" xmlns:p="http://schemas.openxmlformats.org/presentationml/2006/main">
   <p:cSld>
     <p:spTree>
@@ -15494,7 +16080,7 @@
           <a:p>
             <a:fld id="{A64A0CBB-2614-41AB-884D-C0633239B6E4}" type="slidenum">
               <a:rPr lang="zh-CN" altLang="en-US" smtClean="0"/>
-              <a:t>11</a:t>
+              <a:t>12</a:t>
             </a:fld>
             <a:endParaRPr lang="zh-CN" altLang="en-US"/>
           </a:p>
@@ -15514,8 +16100,8 @@
         </p:nvSpPr>
         <p:spPr>
           <a:xfrm>
-            <a:off x="995320" y="1464658"/>
-            <a:ext cx="9669983" cy="1138773"/>
+            <a:off x="995321" y="1065918"/>
+            <a:ext cx="9669983" cy="1877437"/>
           </a:xfrm>
           <a:prstGeom prst="rect">
             <a:avLst/>
@@ -15534,52 +16120,87 @@
                 <a:latin typeface="Times New Roman" panose="02020603050405020304" pitchFamily="18" charset="0"/>
                 <a:cs typeface="Times New Roman" panose="02020603050405020304" pitchFamily="18" charset="0"/>
               </a:rPr>
-              <a:t>线性回归、随机森林、</a:t>
+              <a:t>尝试</a:t>
             </a:r>
             <a:r>
               <a:rPr lang="en-US" altLang="zh-CN" sz="2400" dirty="0">
                 <a:latin typeface="Times New Roman" panose="02020603050405020304" pitchFamily="18" charset="0"/>
                 <a:cs typeface="Times New Roman" panose="02020603050405020304" pitchFamily="18" charset="0"/>
               </a:rPr>
-              <a:t>MLP</a:t>
+              <a:t>6</a:t>
             </a:r>
             <a:r>
               <a:rPr lang="zh-CN" altLang="en-US" sz="2400" dirty="0">
                 <a:latin typeface="Times New Roman" panose="02020603050405020304" pitchFamily="18" charset="0"/>
                 <a:cs typeface="Times New Roman" panose="02020603050405020304" pitchFamily="18" charset="0"/>
               </a:rPr>
+              <a:t>种模型：</a:t>
+            </a:r>
+            <a:endParaRPr lang="en-US" altLang="zh-CN" sz="2400" dirty="0">
+              <a:latin typeface="Times New Roman" panose="02020603050405020304" pitchFamily="18" charset="0"/>
+              <a:cs typeface="Times New Roman" panose="02020603050405020304" pitchFamily="18" charset="0"/>
+            </a:endParaRPr>
+          </a:p>
+          <a:p>
+            <a:pPr algn="l"/>
+            <a:endParaRPr lang="en-US" altLang="zh-CN" sz="2400" dirty="0">
+              <a:latin typeface="Times New Roman" panose="02020603050405020304" pitchFamily="18" charset="0"/>
+              <a:cs typeface="Times New Roman" panose="02020603050405020304" pitchFamily="18" charset="0"/>
+            </a:endParaRPr>
+          </a:p>
+          <a:p>
+            <a:pPr algn="l"/>
+            <a:r>
+              <a:rPr lang="zh-CN" altLang="en-US" sz="2400" b="1" dirty="0">
+                <a:latin typeface="Times New Roman" panose="02020603050405020304" pitchFamily="18" charset="0"/>
+                <a:cs typeface="Times New Roman" panose="02020603050405020304" pitchFamily="18" charset="0"/>
+              </a:rPr>
+              <a:t>线性回归、随机森林、</a:t>
+            </a:r>
+            <a:r>
+              <a:rPr lang="en-US" altLang="zh-CN" sz="2400" b="1" dirty="0">
+                <a:latin typeface="Times New Roman" panose="02020603050405020304" pitchFamily="18" charset="0"/>
+                <a:cs typeface="Times New Roman" panose="02020603050405020304" pitchFamily="18" charset="0"/>
+              </a:rPr>
+              <a:t>MLP</a:t>
+            </a:r>
+            <a:r>
+              <a:rPr lang="zh-CN" altLang="en-US" sz="2400" b="1" dirty="0">
+                <a:latin typeface="Times New Roman" panose="02020603050405020304" pitchFamily="18" charset="0"/>
+                <a:cs typeface="Times New Roman" panose="02020603050405020304" pitchFamily="18" charset="0"/>
+              </a:rPr>
               <a:t>、</a:t>
             </a:r>
             <a:r>
-              <a:rPr lang="en-US" altLang="zh-CN" sz="2400" dirty="0">
+              <a:rPr lang="en-US" altLang="zh-CN" sz="2400" b="1" dirty="0">
                 <a:latin typeface="Times New Roman" panose="02020603050405020304" pitchFamily="18" charset="0"/>
                 <a:cs typeface="Times New Roman" panose="02020603050405020304" pitchFamily="18" charset="0"/>
               </a:rPr>
               <a:t>1D CNN</a:t>
             </a:r>
             <a:r>
-              <a:rPr lang="zh-CN" altLang="en-US" sz="2400" dirty="0">
+              <a:rPr lang="zh-CN" altLang="en-US" sz="2400" b="1" dirty="0">
                 <a:latin typeface="Times New Roman" panose="02020603050405020304" pitchFamily="18" charset="0"/>
                 <a:cs typeface="Times New Roman" panose="02020603050405020304" pitchFamily="18" charset="0"/>
               </a:rPr>
               <a:t>、</a:t>
             </a:r>
             <a:r>
-              <a:rPr lang="en-US" altLang="zh-CN" sz="2400" dirty="0">
+              <a:rPr lang="en-US" altLang="zh-CN" sz="2400" b="1" dirty="0">
                 <a:latin typeface="Times New Roman" panose="02020603050405020304" pitchFamily="18" charset="0"/>
                 <a:cs typeface="Times New Roman" panose="02020603050405020304" pitchFamily="18" charset="0"/>
               </a:rPr>
               <a:t>2D CNN</a:t>
             </a:r>
             <a:r>
-              <a:rPr lang="zh-CN" altLang="en-US" sz="2400" dirty="0">
+              <a:rPr lang="zh-CN" altLang="en-US" sz="2400" b="1" dirty="0">
                 <a:latin typeface="Times New Roman" panose="02020603050405020304" pitchFamily="18" charset="0"/>
                 <a:cs typeface="Times New Roman" panose="02020603050405020304" pitchFamily="18" charset="0"/>
               </a:rPr>
               <a:t>、</a:t>
             </a:r>
             <a:r>
-              <a:rPr lang="en-US" altLang="zh-CN" sz="2400" dirty="0">
+              <a:rPr lang="en-US" altLang="zh-CN" sz="2400" b="1" dirty="0">
                 <a:latin typeface="Times New Roman" panose="02020603050405020304" pitchFamily="18" charset="0"/>
                 <a:cs typeface="Times New Roman" panose="02020603050405020304" pitchFamily="18" charset="0"/>
               </a:rPr>
@@ -15626,8 +16247,8 @@
           </a:p>
         </p:txBody>
       </p:sp>
-      <mc:AlternateContent xmlns:mc="http://schemas.openxmlformats.org/markup-compatibility/2006">
-        <mc:Choice xmlns:a14="http://schemas.microsoft.com/office/drawing/2010/main" Requires="a14">
+      <mc:AlternateContent xmlns:mc="http://schemas.openxmlformats.org/markup-compatibility/2006" xmlns:a14="http://schemas.microsoft.com/office/drawing/2010/main">
+        <mc:Choice Requires="a14">
           <p:sp>
             <p:nvSpPr>
               <p:cNvPr id="10" name="文本框 9">
@@ -15802,7 +16423,7 @@
             </p:txBody>
           </p:sp>
         </mc:Choice>
-        <mc:Fallback>
+        <mc:Fallback xmlns="">
           <p:sp>
             <p:nvSpPr>
               <p:cNvPr id="10" name="文本框 9">
@@ -15860,7 +16481,7 @@
 </p:sld>
 </file>
 
-<file path=ppt/slides/slide12.xml><?xml version="1.0" encoding="utf-8"?>
+<file path=ppt/slides/slide13.xml><?xml version="1.0" encoding="utf-8"?>
 <p:sld xmlns:a="http://schemas.openxmlformats.org/drawingml/2006/main" xmlns:r="http://schemas.openxmlformats.org/officeDocument/2006/relationships" xmlns:p="http://schemas.openxmlformats.org/presentationml/2006/main">
   <p:cSld>
     <p:spTree>
@@ -16924,7 +17545,7 @@
           <a:p>
             <a:fld id="{A64A0CBB-2614-41AB-884D-C0633239B6E4}" type="slidenum">
               <a:rPr lang="zh-CN" altLang="en-US" smtClean="0"/>
-              <a:t>12</a:t>
+              <a:t>13</a:t>
             </a:fld>
             <a:endParaRPr lang="zh-CN" altLang="en-US"/>
           </a:p>
@@ -16993,7 +17614,7 @@
 </p:sld>
 </file>
 
-<file path=ppt/slides/slide13.xml><?xml version="1.0" encoding="utf-8"?>
+<file path=ppt/slides/slide14.xml><?xml version="1.0" encoding="utf-8"?>
 <p:sld xmlns:a="http://schemas.openxmlformats.org/drawingml/2006/main" xmlns:r="http://schemas.openxmlformats.org/officeDocument/2006/relationships" xmlns:p="http://schemas.openxmlformats.org/presentationml/2006/main">
   <p:cSld>
     <p:spTree>
@@ -17362,7 +17983,7 @@
           <a:p>
             <a:fld id="{A64A0CBB-2614-41AB-884D-C0633239B6E4}" type="slidenum">
               <a:rPr lang="zh-CN" altLang="en-US" smtClean="0"/>
-              <a:t>13</a:t>
+              <a:t>14</a:t>
             </a:fld>
             <a:endParaRPr lang="zh-CN" altLang="en-US"/>
           </a:p>
@@ -17580,7 +18201,7 @@
 </p:sld>
 </file>
 
-<file path=ppt/slides/slide14.xml><?xml version="1.0" encoding="utf-8"?>
+<file path=ppt/slides/slide15.xml><?xml version="1.0" encoding="utf-8"?>
 <p:sld xmlns:a="http://schemas.openxmlformats.org/drawingml/2006/main" xmlns:r="http://schemas.openxmlformats.org/officeDocument/2006/relationships" xmlns:p="http://schemas.openxmlformats.org/presentationml/2006/main">
   <p:cSld>
     <p:spTree>
@@ -18041,7 +18662,7 @@
           <a:p>
             <a:fld id="{A64A0CBB-2614-41AB-884D-C0633239B6E4}" type="slidenum">
               <a:rPr lang="zh-CN" altLang="en-US" smtClean="0"/>
-              <a:t>14</a:t>
+              <a:t>15</a:t>
             </a:fld>
             <a:endParaRPr lang="zh-CN" altLang="en-US"/>
           </a:p>
@@ -18083,8 +18704,8 @@
           </a:prstGeom>
         </p:spPr>
       </p:pic>
-      <mc:AlternateContent xmlns:mc="http://schemas.openxmlformats.org/markup-compatibility/2006">
-        <mc:Choice xmlns:a14="http://schemas.microsoft.com/office/drawing/2010/main" Requires="a14">
+      <mc:AlternateContent xmlns:mc="http://schemas.openxmlformats.org/markup-compatibility/2006" xmlns:a14="http://schemas.microsoft.com/office/drawing/2010/main">
+        <mc:Choice Requires="a14">
           <p:sp>
             <p:nvSpPr>
               <p:cNvPr id="11" name="文本框 10">
@@ -18156,21 +18777,7 @@
                         <a:latin typeface="Cambria Math" panose="02040503050406030204" pitchFamily="18" charset="0"/>
                         <a:cs typeface="Times New Roman" panose="02020603050405020304" pitchFamily="18" charset="0"/>
                       </a:rPr>
-                      <m:t>, </m:t>
-                    </m:r>
-                    <m:r>
-                      <a:rPr lang="en-US" altLang="zh-CN" sz="2400" b="0" i="1" smtClean="0">
-                        <a:latin typeface="Cambria Math" panose="02040503050406030204" pitchFamily="18" charset="0"/>
-                        <a:cs typeface="Times New Roman" panose="02020603050405020304" pitchFamily="18" charset="0"/>
-                      </a:rPr>
-                      <m:t> </m:t>
-                    </m:r>
-                    <m:r>
-                      <a:rPr lang="en-US" altLang="zh-CN" sz="2400" b="0" i="1" smtClean="0">
-                        <a:latin typeface="Cambria Math" panose="02040503050406030204" pitchFamily="18" charset="0"/>
-                        <a:cs typeface="Times New Roman" panose="02020603050405020304" pitchFamily="18" charset="0"/>
-                      </a:rPr>
-                      <m:t>{</m:t>
+                      <m:t>,  {</m:t>
                     </m:r>
                     <m:sSub>
                       <m:sSubPr>
@@ -18469,7 +19076,7 @@
             </p:txBody>
           </p:sp>
         </mc:Choice>
-        <mc:Fallback>
+        <mc:Fallback xmlns="">
           <p:sp>
             <p:nvSpPr>
               <p:cNvPr id="11" name="文本框 10">
@@ -18514,8 +19121,8 @@
           </p:sp>
         </mc:Fallback>
       </mc:AlternateContent>
-      <mc:AlternateContent xmlns:mc="http://schemas.openxmlformats.org/markup-compatibility/2006">
-        <mc:Choice xmlns:a14="http://schemas.microsoft.com/office/drawing/2010/main" Requires="a14">
+      <mc:AlternateContent xmlns:mc="http://schemas.openxmlformats.org/markup-compatibility/2006" xmlns:a14="http://schemas.microsoft.com/office/drawing/2010/main">
+        <mc:Choice Requires="a14">
           <p:sp>
             <p:nvSpPr>
               <p:cNvPr id="8" name="文本框 7">
@@ -18704,7 +19311,7 @@
             </p:txBody>
           </p:sp>
         </mc:Choice>
-        <mc:Fallback>
+        <mc:Fallback xmlns="">
           <p:sp>
             <p:nvSpPr>
               <p:cNvPr id="8" name="文本框 7">
@@ -18762,7 +19369,7 @@
 </p:sld>
 </file>
 
-<file path=ppt/slides/slide15.xml><?xml version="1.0" encoding="utf-8"?>
+<file path=ppt/slides/slide16.xml><?xml version="1.0" encoding="utf-8"?>
 <p:sld xmlns:a="http://schemas.openxmlformats.org/drawingml/2006/main" xmlns:r="http://schemas.openxmlformats.org/officeDocument/2006/relationships" xmlns:p="http://schemas.openxmlformats.org/presentationml/2006/main">
   <p:cSld>
     <p:spTree>
@@ -19109,7 +19716,7 @@
           <a:p>
             <a:fld id="{A64A0CBB-2614-41AB-884D-C0633239B6E4}" type="slidenum">
               <a:rPr lang="zh-CN" altLang="en-US" smtClean="0"/>
-              <a:t>15</a:t>
+              <a:t>16</a:t>
             </a:fld>
             <a:endParaRPr lang="zh-CN" altLang="en-US"/>
           </a:p>
@@ -19258,8 +19865,8 @@
           </a:p>
         </p:txBody>
       </p:sp>
-      <mc:AlternateContent xmlns:mc="http://schemas.openxmlformats.org/markup-compatibility/2006">
-        <mc:Choice xmlns:a14="http://schemas.microsoft.com/office/drawing/2010/main" Requires="a14">
+      <mc:AlternateContent xmlns:mc="http://schemas.openxmlformats.org/markup-compatibility/2006" xmlns:a14="http://schemas.microsoft.com/office/drawing/2010/main">
+        <mc:Choice Requires="a14">
           <p:sp>
             <p:nvSpPr>
               <p:cNvPr id="12" name="文本框 11">
@@ -19388,7 +19995,7 @@
             </p:txBody>
           </p:sp>
         </mc:Choice>
-        <mc:Fallback>
+        <mc:Fallback xmlns="">
           <p:sp>
             <p:nvSpPr>
               <p:cNvPr id="12" name="文本框 11">
@@ -19446,7 +20053,7 @@
 </p:sld>
 </file>
 
-<file path=ppt/slides/slide16.xml><?xml version="1.0" encoding="utf-8"?>
+<file path=ppt/slides/slide17.xml><?xml version="1.0" encoding="utf-8"?>
 <p:sld xmlns:a="http://schemas.openxmlformats.org/drawingml/2006/main" xmlns:r="http://schemas.openxmlformats.org/officeDocument/2006/relationships" xmlns:p="http://schemas.openxmlformats.org/presentationml/2006/main">
   <p:cSld>
     <p:spTree>
@@ -19793,14 +20400,14 @@
           <a:p>
             <a:fld id="{A64A0CBB-2614-41AB-884D-C0633239B6E4}" type="slidenum">
               <a:rPr lang="zh-CN" altLang="en-US" smtClean="0"/>
-              <a:t>16</a:t>
+              <a:t>17</a:t>
             </a:fld>
             <a:endParaRPr lang="zh-CN" altLang="en-US"/>
           </a:p>
         </p:txBody>
       </p:sp>
-      <mc:AlternateContent xmlns:mc="http://schemas.openxmlformats.org/markup-compatibility/2006">
-        <mc:Choice xmlns:a14="http://schemas.microsoft.com/office/drawing/2010/main" Requires="a14">
+      <mc:AlternateContent xmlns:mc="http://schemas.openxmlformats.org/markup-compatibility/2006" xmlns:a14="http://schemas.microsoft.com/office/drawing/2010/main">
+        <mc:Choice Requires="a14">
           <p:sp>
             <p:nvSpPr>
               <p:cNvPr id="8" name="文本框 7">
@@ -19906,6 +20513,7 @@
                   <a:rPr lang="en-US" altLang="zh-CN" dirty="0">
                     <a:latin typeface="Times New Roman" panose="02020603050405020304" pitchFamily="18" charset="0"/>
                     <a:cs typeface="Times New Roman" panose="02020603050405020304" pitchFamily="18" charset="0"/>
+                    <a:hlinkClick r:id="rId5" action="ppaction://hlinksldjump"/>
                   </a:rPr>
                   <a:t>Madhu</a:t>
                 </a:r>
@@ -19913,6 +20521,7 @@
                   <a:rPr lang="zh-CN" altLang="en-US" dirty="0">
                     <a:latin typeface="Times New Roman" panose="02020603050405020304" pitchFamily="18" charset="0"/>
                     <a:cs typeface="Times New Roman" panose="02020603050405020304" pitchFamily="18" charset="0"/>
+                    <a:hlinkClick r:id="rId5" action="ppaction://hlinksldjump"/>
                   </a:rPr>
                   <a:t>参数中的</a:t>
                 </a:r>
@@ -19924,6 +20533,7 @@
                           <a:rPr lang="en-US" altLang="zh-CN" b="0" i="1" smtClean="0">
                             <a:latin typeface="Cambria Math" panose="02040503050406030204" pitchFamily="18" charset="0"/>
                             <a:cs typeface="Times New Roman" panose="02020603050405020304" pitchFamily="18" charset="0"/>
+                            <a:hlinkClick r:id="rId5" action="ppaction://hlinksldjump"/>
                           </a:rPr>
                         </m:ctrlPr>
                       </m:sSubPr>
@@ -19932,6 +20542,7 @@
                           <a:rPr lang="en-US" altLang="zh-CN" b="0" i="1" smtClean="0">
                             <a:latin typeface="Cambria Math" panose="02040503050406030204" pitchFamily="18" charset="0"/>
                             <a:cs typeface="Times New Roman" panose="02020603050405020304" pitchFamily="18" charset="0"/>
+                            <a:hlinkClick r:id="rId5" action="ppaction://hlinksldjump"/>
                           </a:rPr>
                           <m:t>𝑎</m:t>
                         </m:r>
@@ -19941,6 +20552,7 @@
                           <a:rPr lang="en-US" altLang="zh-CN" b="0" i="1" smtClean="0">
                             <a:latin typeface="Cambria Math" panose="02040503050406030204" pitchFamily="18" charset="0"/>
                             <a:cs typeface="Times New Roman" panose="02020603050405020304" pitchFamily="18" charset="0"/>
+                            <a:hlinkClick r:id="rId5" action="ppaction://hlinksldjump"/>
                           </a:rPr>
                           <m:t>1</m:t>
                         </m:r>
@@ -19952,8 +20564,16 @@
                   <a:rPr lang="zh-CN" altLang="en-US" dirty="0">
                     <a:latin typeface="Times New Roman" panose="02020603050405020304" pitchFamily="18" charset="0"/>
                     <a:cs typeface="Times New Roman" panose="02020603050405020304" pitchFamily="18" charset="0"/>
+                    <a:hlinkClick r:id="rId5" action="ppaction://hlinksldjump"/>
                   </a:rPr>
-                  <a:t>对这个位置的决定也有作用，所以学的效果明显好于剩余的</a:t>
+                  <a:t>对这个位置的决定也有作用</a:t>
+                </a:r>
+                <a:r>
+                  <a:rPr lang="zh-CN" altLang="en-US" dirty="0">
+                    <a:latin typeface="Times New Roman" panose="02020603050405020304" pitchFamily="18" charset="0"/>
+                    <a:cs typeface="Times New Roman" panose="02020603050405020304" pitchFamily="18" charset="0"/>
+                  </a:rPr>
+                  <a:t>，所以学的效果明显好于剩余的</a:t>
                 </a:r>
                 <a:r>
                   <a:rPr lang="en-US" altLang="zh-CN" dirty="0">
@@ -20042,7 +20662,7 @@
             </p:txBody>
           </p:sp>
         </mc:Choice>
-        <mc:Fallback>
+        <mc:Fallback xmlns="">
           <p:sp>
             <p:nvSpPr>
               <p:cNvPr id="8" name="文本框 7">
@@ -20066,7 +20686,7 @@
                 <a:avLst/>
               </a:prstGeom>
               <a:blipFill>
-                <a:blip r:embed="rId5"/>
+                <a:blip r:embed="rId6"/>
                 <a:stretch>
                   <a:fillRect l="-1376" t="-1273" r="-952" b="-2364"/>
                 </a:stretch>
@@ -20102,7 +20722,7 @@
           <p:nvPr/>
         </p:nvPicPr>
         <p:blipFill>
-          <a:blip r:embed="rId6">
+          <a:blip r:embed="rId7">
             <a:extLst>
               <a:ext uri="{28A0092B-C50C-407E-A947-70E740481C1C}">
                 <a14:useLocalDpi xmlns:a14="http://schemas.microsoft.com/office/drawing/2010/main" val="0"/>
@@ -20279,7 +20899,7 @@
 </p:sld>
 </file>
 
-<file path=ppt/slides/slide17.xml><?xml version="1.0" encoding="utf-8"?>
+<file path=ppt/slides/slide18.xml><?xml version="1.0" encoding="utf-8"?>
 <p:sld xmlns:a="http://schemas.openxmlformats.org/drawingml/2006/main" xmlns:r="http://schemas.openxmlformats.org/officeDocument/2006/relationships" xmlns:p="http://schemas.openxmlformats.org/presentationml/2006/main">
   <p:cSld>
     <p:spTree>
@@ -20869,7 +21489,7 @@
           <a:p>
             <a:fld id="{A64A0CBB-2614-41AB-884D-C0633239B6E4}" type="slidenum">
               <a:rPr lang="zh-CN" altLang="en-US" smtClean="0"/>
-              <a:t>17</a:t>
+              <a:t>18</a:t>
             </a:fld>
             <a:endParaRPr lang="zh-CN" altLang="en-US"/>
           </a:p>
@@ -20971,7 +21591,7 @@
 </p:sld>
 </file>
 
-<file path=ppt/slides/slide18.xml><?xml version="1.0" encoding="utf-8"?>
+<file path=ppt/slides/slide19.xml><?xml version="1.0" encoding="utf-8"?>
 <p:sld xmlns:a="http://schemas.openxmlformats.org/drawingml/2006/main" xmlns:r="http://schemas.openxmlformats.org/officeDocument/2006/relationships" xmlns:p="http://schemas.openxmlformats.org/presentationml/2006/main" show="0">
   <p:cSld>
     <p:spTree>
@@ -21796,7 +22416,7 @@
           <a:p>
             <a:fld id="{A64A0CBB-2614-41AB-884D-C0633239B6E4}" type="slidenum">
               <a:rPr lang="zh-CN" altLang="en-US" smtClean="0"/>
-              <a:t>18</a:t>
+              <a:t>19</a:t>
             </a:fld>
             <a:endParaRPr lang="zh-CN" altLang="en-US"/>
           </a:p>
@@ -21815,18 +22435,12 @@
 </p:sld>
 </file>
 
-<file path=ppt/slides/slide19.xml><?xml version="1.0" encoding="utf-8"?>
-<p:sld xmlns:a="http://schemas.openxmlformats.org/drawingml/2006/main" xmlns:r="http://schemas.openxmlformats.org/officeDocument/2006/relationships" xmlns:p="http://schemas.openxmlformats.org/presentationml/2006/main" show="0">
+<file path=ppt/slides/slide2.xml><?xml version="1.0" encoding="utf-8"?>
+<p:sld xmlns:a="http://schemas.openxmlformats.org/drawingml/2006/main" xmlns:r="http://schemas.openxmlformats.org/officeDocument/2006/relationships" xmlns:p="http://schemas.openxmlformats.org/presentationml/2006/main">
   <p:cSld>
     <p:spTree>
       <p:nvGrpSpPr>
-        <p:cNvPr id="1" name="">
-          <a:extLst>
-            <a:ext uri="{FF2B5EF4-FFF2-40B4-BE49-F238E27FC236}">
-              <a16:creationId xmlns:a16="http://schemas.microsoft.com/office/drawing/2014/main" id="{FFD61D1D-6522-E5F8-81C4-D97AC628C5DB}"/>
-            </a:ext>
-          </a:extLst>
-        </p:cNvPr>
+        <p:cNvPr id="1" name=""/>
         <p:cNvGrpSpPr/>
         <p:nvPr/>
       </p:nvGrpSpPr>
@@ -21843,7 +22457,7 @@
           <p:cNvPr id="2" name="矩形 1">
             <a:extLst>
               <a:ext uri="{FF2B5EF4-FFF2-40B4-BE49-F238E27FC236}">
-                <a16:creationId xmlns:a16="http://schemas.microsoft.com/office/drawing/2014/main" id="{8BC5A5F7-B045-3D1C-719A-0066BCCFAB0F}"/>
+                <a16:creationId xmlns:a16="http://schemas.microsoft.com/office/drawing/2014/main" id="{7CAABC49-B2A5-49CF-A92F-7448EEA28822}"/>
               </a:ext>
             </a:extLst>
           </p:cNvPr>
@@ -21911,7 +22525,7 @@
           <p:cNvPr id="3" name="图片 2">
             <a:extLst>
               <a:ext uri="{FF2B5EF4-FFF2-40B4-BE49-F238E27FC236}">
-                <a16:creationId xmlns:a16="http://schemas.microsoft.com/office/drawing/2014/main" id="{ECBC2896-3C52-FE32-C917-186FC8E2EC5F}"/>
+                <a16:creationId xmlns:a16="http://schemas.microsoft.com/office/drawing/2014/main" id="{450FCE89-46F8-4D8A-91CA-C561DC6414E5}"/>
               </a:ext>
             </a:extLst>
           </p:cNvPr>
@@ -21921,7 +22535,7 @@
           <p:nvPr/>
         </p:nvPicPr>
         <p:blipFill rotWithShape="1">
-          <a:blip r:embed="rId2">
+          <a:blip r:embed="rId3">
             <a:alphaModFix amt="10000"/>
             <a:extLst>
               <a:ext uri="{28A0092B-C50C-407E-A947-70E740481C1C}">
@@ -21947,7 +22561,7 @@
           <p:cNvPr id="4" name="图片 3" descr="卡通人物&#10;&#10;描述已自动生成">
             <a:extLst>
               <a:ext uri="{FF2B5EF4-FFF2-40B4-BE49-F238E27FC236}">
-                <a16:creationId xmlns:a16="http://schemas.microsoft.com/office/drawing/2014/main" id="{B0EF7492-4877-B384-31F4-04438EDE9E7F}"/>
+                <a16:creationId xmlns:a16="http://schemas.microsoft.com/office/drawing/2014/main" id="{07E348B0-7717-4FFF-9C25-9953D1C191B0}"/>
               </a:ext>
             </a:extLst>
           </p:cNvPr>
@@ -21957,7 +22571,7 @@
           <p:nvPr/>
         </p:nvPicPr>
         <p:blipFill>
-          <a:blip r:embed="rId3" cstate="print">
+          <a:blip r:embed="rId4" cstate="print">
             <a:extLst>
               <a:ext uri="{28A0092B-C50C-407E-A947-70E740481C1C}">
                 <a14:useLocalDpi xmlns:a14="http://schemas.microsoft.com/office/drawing/2010/main" val="0"/>
@@ -21983,7 +22597,7 @@
           <p:cNvPr id="5" name="文本框 4">
             <a:extLst>
               <a:ext uri="{FF2B5EF4-FFF2-40B4-BE49-F238E27FC236}">
-                <a16:creationId xmlns:a16="http://schemas.microsoft.com/office/drawing/2014/main" id="{88BC6795-B38C-DCA5-AB50-201AA00B273F}"/>
+                <a16:creationId xmlns:a16="http://schemas.microsoft.com/office/drawing/2014/main" id="{DFF518DD-9BC6-40A9-8726-B76367D110BF}"/>
               </a:ext>
             </a:extLst>
           </p:cNvPr>
@@ -22011,23 +22625,20 @@
                 <a:solidFill>
                   <a:schemeClr val="bg1"/>
                 </a:solidFill>
-                <a:latin typeface="Palatino Linotype" panose="02040502050505030304" pitchFamily="18" charset="0"/>
+                <a:latin typeface="黑体" panose="02010609060101010101" pitchFamily="49" charset="-122"/>
                 <a:ea typeface="黑体" panose="02010609060101010101" pitchFamily="49" charset="-122"/>
                 <a:cs typeface="Times New Roman" panose="02020603050405020304" pitchFamily="18" charset="0"/>
               </a:rPr>
-              <a:t>附录：</a:t>
+              <a:t>基于机器学习的行星大气光谱反演</a:t>
             </a:r>
-            <a:r>
-              <a:rPr lang="en-US" altLang="zh-CN" sz="2400" b="1" dirty="0">
-                <a:solidFill>
-                  <a:schemeClr val="bg1"/>
-                </a:solidFill>
-                <a:latin typeface="Palatino Linotype" panose="02040502050505030304" pitchFamily="18" charset="0"/>
-                <a:ea typeface="黑体" panose="02010609060101010101" pitchFamily="49" charset="-122"/>
-                <a:cs typeface="Times New Roman" panose="02020603050405020304" pitchFamily="18" charset="0"/>
-              </a:rPr>
-              <a:t>Transformer</a:t>
-            </a:r>
+            <a:endParaRPr lang="en-US" altLang="zh-CN" sz="2400" b="1" dirty="0">
+              <a:solidFill>
+                <a:schemeClr val="bg1"/>
+              </a:solidFill>
+              <a:latin typeface="黑体" panose="02010609060101010101" pitchFamily="49" charset="-122"/>
+              <a:ea typeface="黑体" panose="02010609060101010101" pitchFamily="49" charset="-122"/>
+              <a:cs typeface="Times New Roman" panose="02020603050405020304" pitchFamily="18" charset="0"/>
+            </a:endParaRPr>
           </a:p>
         </p:txBody>
       </p:sp>
@@ -22036,7 +22647,7 @@
           <p:cNvPr id="6" name="椭圆 5">
             <a:extLst>
               <a:ext uri="{FF2B5EF4-FFF2-40B4-BE49-F238E27FC236}">
-                <a16:creationId xmlns:a16="http://schemas.microsoft.com/office/drawing/2014/main" id="{0F3275BD-33E4-5E59-40BC-639969515F0A}"/>
+                <a16:creationId xmlns:a16="http://schemas.microsoft.com/office/drawing/2014/main" id="{1C5638C8-30D9-4814-8433-EF6D592DBAE2}"/>
               </a:ext>
             </a:extLst>
           </p:cNvPr>
@@ -22100,6 +22711,1200 @@
           <p:cNvPr id="7" name="矩形 6">
             <a:extLst>
               <a:ext uri="{FF2B5EF4-FFF2-40B4-BE49-F238E27FC236}">
+                <a16:creationId xmlns:a16="http://schemas.microsoft.com/office/drawing/2014/main" id="{D5287FE0-E135-4BFF-8FFE-C4238C5DE712}"/>
+              </a:ext>
+            </a:extLst>
+          </p:cNvPr>
+          <p:cNvSpPr/>
+          <p:nvPr/>
+        </p:nvSpPr>
+        <p:spPr>
+          <a:xfrm flipV="1">
+            <a:off x="0" y="6780858"/>
+            <a:ext cx="12192000" cy="72000"/>
+          </a:xfrm>
+          <a:prstGeom prst="rect">
+            <a:avLst/>
+          </a:prstGeom>
+          <a:solidFill>
+            <a:srgbClr val="990000"/>
+          </a:solidFill>
+          <a:ln>
+            <a:noFill/>
+          </a:ln>
+        </p:spPr>
+        <p:txBody>
+          <a:bodyPr vert="horz" wrap="square" lIns="91440" tIns="45720" rIns="91440" bIns="45720" numCol="1" anchor="t" anchorCtr="0" compatLnSpc="1">
+            <a:prstTxWarp prst="textNoShape">
+              <a:avLst/>
+            </a:prstTxWarp>
+          </a:bodyPr>
+          <a:lstStyle/>
+          <a:p>
+            <a:endParaRPr lang="zh-CN" altLang="en-US">
+              <a:solidFill>
+                <a:srgbClr val="FF0000"/>
+              </a:solidFill>
+              <a:latin typeface="Arial" panose="020B0604020202020204" pitchFamily="34" charset="0"/>
+              <a:ea typeface="Microsoft YaHei" panose="020B0503020204020204" pitchFamily="34" charset="-122"/>
+              <a:cs typeface="+mn-ea"/>
+              <a:sym typeface="Arial" panose="020B0604020202020204" pitchFamily="34" charset="0"/>
+            </a:endParaRPr>
+          </a:p>
+        </p:txBody>
+      </p:sp>
+      <p:sp>
+        <p:nvSpPr>
+          <p:cNvPr id="8" name="文本框 7">
+            <a:extLst>
+              <a:ext uri="{FF2B5EF4-FFF2-40B4-BE49-F238E27FC236}">
+                <a16:creationId xmlns:a16="http://schemas.microsoft.com/office/drawing/2014/main" id="{17F0888A-E1F4-8AEC-2498-E3BBE9C81CC2}"/>
+              </a:ext>
+            </a:extLst>
+          </p:cNvPr>
+          <p:cNvSpPr txBox="1"/>
+          <p:nvPr/>
+        </p:nvSpPr>
+        <p:spPr>
+          <a:xfrm>
+            <a:off x="1325434" y="834831"/>
+            <a:ext cx="2643040" cy="707886"/>
+          </a:xfrm>
+          <a:prstGeom prst="rect">
+            <a:avLst/>
+          </a:prstGeom>
+          <a:noFill/>
+        </p:spPr>
+        <p:txBody>
+          <a:bodyPr wrap="square" rtlCol="0">
+            <a:spAutoFit/>
+          </a:bodyPr>
+          <a:lstStyle/>
+          <a:p>
+            <a:pPr marL="0" marR="0" lvl="0" indent="0" algn="l" defTabSz="914400" rtl="0" eaLnBrk="1" fontAlgn="auto" latinLnBrk="0" hangingPunct="1">
+              <a:lnSpc>
+                <a:spcPct val="100000"/>
+              </a:lnSpc>
+              <a:spcBef>
+                <a:spcPts val="0"/>
+              </a:spcBef>
+              <a:spcAft>
+                <a:spcPts val="0"/>
+              </a:spcAft>
+              <a:buClrTx/>
+              <a:buSzTx/>
+              <a:buFontTx/>
+              <a:buNone/>
+              <a:tabLst/>
+              <a:defRPr/>
+            </a:pPr>
+            <a:r>
+              <a:rPr kumimoji="0" lang="zh-CN" altLang="en-US" sz="4000" b="1" i="0" u="none" strike="noStrike" kern="1200" cap="none" spc="300" normalizeH="0" baseline="0" noProof="0" dirty="0">
+                <a:ln>
+                  <a:noFill/>
+                </a:ln>
+                <a:solidFill>
+                  <a:schemeClr val="accent1"/>
+                </a:solidFill>
+                <a:effectLst/>
+                <a:uLnTx/>
+                <a:uFillTx/>
+                <a:latin typeface="Arial" panose="020B0604020202020204" pitchFamily="34" charset="0"/>
+                <a:ea typeface="Microsoft YaHei" panose="020B0503020204020204" pitchFamily="34" charset="-122"/>
+                <a:cs typeface="+mn-ea"/>
+                <a:sym typeface="Arial" panose="020B0604020202020204" pitchFamily="34" charset="0"/>
+              </a:rPr>
+              <a:t>目录</a:t>
+            </a:r>
+          </a:p>
+        </p:txBody>
+      </p:sp>
+      <p:grpSp>
+        <p:nvGrpSpPr>
+          <p:cNvPr id="9" name="组合 8">
+            <a:extLst>
+              <a:ext uri="{FF2B5EF4-FFF2-40B4-BE49-F238E27FC236}">
+                <a16:creationId xmlns:a16="http://schemas.microsoft.com/office/drawing/2014/main" id="{06001707-24E3-9C66-D3D4-7B5339E47D28}"/>
+              </a:ext>
+            </a:extLst>
+          </p:cNvPr>
+          <p:cNvGrpSpPr/>
+          <p:nvPr/>
+        </p:nvGrpSpPr>
+        <p:grpSpPr>
+          <a:xfrm>
+            <a:off x="1296445" y="1881136"/>
+            <a:ext cx="6180596" cy="861352"/>
+            <a:chOff x="1296445" y="1777506"/>
+            <a:chExt cx="6180596" cy="861352"/>
+          </a:xfrm>
+        </p:grpSpPr>
+        <p:sp>
+          <p:nvSpPr>
+            <p:cNvPr id="10" name="文本框 9">
+              <a:extLst>
+                <a:ext uri="{FF2B5EF4-FFF2-40B4-BE49-F238E27FC236}">
+                  <a16:creationId xmlns:a16="http://schemas.microsoft.com/office/drawing/2014/main" id="{5BD3F604-1E1A-203A-5603-74646A92AE93}"/>
+                </a:ext>
+              </a:extLst>
+            </p:cNvPr>
+            <p:cNvSpPr txBox="1"/>
+            <p:nvPr/>
+          </p:nvSpPr>
+          <p:spPr>
+            <a:xfrm>
+              <a:off x="1830685" y="2115638"/>
+              <a:ext cx="5646356" cy="523220"/>
+            </a:xfrm>
+            <a:prstGeom prst="rect">
+              <a:avLst/>
+            </a:prstGeom>
+            <a:noFill/>
+          </p:spPr>
+          <p:txBody>
+            <a:bodyPr wrap="square" rtlCol="0">
+              <a:spAutoFit/>
+            </a:bodyPr>
+            <a:lstStyle/>
+            <a:p>
+              <a:pPr marL="0" marR="0" lvl="0" indent="0" algn="l" defTabSz="914400" rtl="0" eaLnBrk="1" fontAlgn="auto" latinLnBrk="0" hangingPunct="1">
+                <a:lnSpc>
+                  <a:spcPct val="100000"/>
+                </a:lnSpc>
+                <a:spcBef>
+                  <a:spcPts val="0"/>
+                </a:spcBef>
+                <a:spcAft>
+                  <a:spcPts val="0"/>
+                </a:spcAft>
+                <a:buClrTx/>
+                <a:buSzTx/>
+                <a:buFontTx/>
+                <a:buNone/>
+                <a:tabLst/>
+                <a:defRPr/>
+              </a:pPr>
+              <a:r>
+                <a:rPr kumimoji="0" lang="zh-CN" altLang="en-US" sz="2800" b="0" i="0" u="none" strike="noStrike" kern="1200" cap="none" spc="400" normalizeH="0" baseline="0" noProof="0" dirty="0">
+                  <a:ln>
+                    <a:noFill/>
+                  </a:ln>
+                  <a:solidFill>
+                    <a:schemeClr val="accent1"/>
+                  </a:solidFill>
+                  <a:effectLst/>
+                  <a:uLnTx/>
+                  <a:uFillTx/>
+                  <a:latin typeface="Arial" panose="020B0604020202020204" pitchFamily="34" charset="0"/>
+                  <a:ea typeface="Microsoft YaHei" panose="020B0503020204020204" pitchFamily="34" charset="-122"/>
+                  <a:cs typeface="+mn-ea"/>
+                  <a:sym typeface="Arial" panose="020B0604020202020204" pitchFamily="34" charset="0"/>
+                </a:rPr>
+                <a:t>背景：行星大气发射光谱</a:t>
+              </a:r>
+            </a:p>
+          </p:txBody>
+        </p:sp>
+        <p:grpSp>
+          <p:nvGrpSpPr>
+            <p:cNvPr id="11" name="组合 10">
+              <a:extLst>
+                <a:ext uri="{FF2B5EF4-FFF2-40B4-BE49-F238E27FC236}">
+                  <a16:creationId xmlns:a16="http://schemas.microsoft.com/office/drawing/2014/main" id="{E3EFB2D7-3FD3-5F38-EDE5-D988A980EFEA}"/>
+                </a:ext>
+              </a:extLst>
+            </p:cNvPr>
+            <p:cNvGrpSpPr/>
+            <p:nvPr/>
+          </p:nvGrpSpPr>
+          <p:grpSpPr>
+            <a:xfrm>
+              <a:off x="1296445" y="1777506"/>
+              <a:ext cx="800100" cy="713161"/>
+              <a:chOff x="6976951" y="1586703"/>
+              <a:chExt cx="800100" cy="713161"/>
+            </a:xfrm>
+          </p:grpSpPr>
+          <p:cxnSp>
+            <p:nvCxnSpPr>
+              <p:cNvPr id="12" name="直接连接符 11">
+                <a:extLst>
+                  <a:ext uri="{FF2B5EF4-FFF2-40B4-BE49-F238E27FC236}">
+                    <a16:creationId xmlns:a16="http://schemas.microsoft.com/office/drawing/2014/main" id="{75F260A5-52C5-A582-0FD8-8633D4E9CF33}"/>
+                  </a:ext>
+                </a:extLst>
+              </p:cNvPr>
+              <p:cNvCxnSpPr/>
+              <p:nvPr/>
+            </p:nvCxnSpPr>
+            <p:spPr>
+              <a:xfrm flipH="1">
+                <a:off x="7160632" y="1829707"/>
+                <a:ext cx="432738" cy="470157"/>
+              </a:xfrm>
+              <a:prstGeom prst="line">
+                <a:avLst/>
+              </a:prstGeom>
+              <a:ln>
+                <a:solidFill>
+                  <a:schemeClr val="tx1">
+                    <a:lumMod val="65000"/>
+                    <a:lumOff val="35000"/>
+                  </a:schemeClr>
+                </a:solidFill>
+              </a:ln>
+            </p:spPr>
+            <p:style>
+              <a:lnRef idx="1">
+                <a:schemeClr val="accent1"/>
+              </a:lnRef>
+              <a:fillRef idx="0">
+                <a:schemeClr val="accent1"/>
+              </a:fillRef>
+              <a:effectRef idx="0">
+                <a:schemeClr val="accent1"/>
+              </a:effectRef>
+              <a:fontRef idx="minor">
+                <a:schemeClr val="tx1"/>
+              </a:fontRef>
+            </p:style>
+          </p:cxnSp>
+          <p:sp>
+            <p:nvSpPr>
+              <p:cNvPr id="13" name="文本框 12">
+                <a:extLst>
+                  <a:ext uri="{FF2B5EF4-FFF2-40B4-BE49-F238E27FC236}">
+                    <a16:creationId xmlns:a16="http://schemas.microsoft.com/office/drawing/2014/main" id="{0F2CBFCE-2CBE-15CA-A9C6-CBD204EAC6E0}"/>
+                  </a:ext>
+                </a:extLst>
+              </p:cNvPr>
+              <p:cNvSpPr txBox="1"/>
+              <p:nvPr/>
+            </p:nvSpPr>
+            <p:spPr>
+              <a:xfrm>
+                <a:off x="6976951" y="1586703"/>
+                <a:ext cx="800100" cy="646331"/>
+              </a:xfrm>
+              <a:prstGeom prst="rect">
+                <a:avLst/>
+              </a:prstGeom>
+              <a:noFill/>
+            </p:spPr>
+            <p:txBody>
+              <a:bodyPr wrap="square" rtlCol="0">
+                <a:spAutoFit/>
+              </a:bodyPr>
+              <a:lstStyle/>
+              <a:p>
+                <a:pPr marL="0" marR="0" lvl="0" indent="0" algn="l" defTabSz="914400" rtl="0" eaLnBrk="1" fontAlgn="auto" latinLnBrk="0" hangingPunct="1">
+                  <a:lnSpc>
+                    <a:spcPct val="100000"/>
+                  </a:lnSpc>
+                  <a:spcBef>
+                    <a:spcPts val="0"/>
+                  </a:spcBef>
+                  <a:spcAft>
+                    <a:spcPts val="0"/>
+                  </a:spcAft>
+                  <a:buClrTx/>
+                  <a:buSzTx/>
+                  <a:buFontTx/>
+                  <a:buNone/>
+                  <a:tabLst/>
+                  <a:defRPr/>
+                </a:pPr>
+                <a:r>
+                  <a:rPr kumimoji="0" lang="en-US" altLang="zh-CN" sz="3600" b="0" i="0" u="none" strike="noStrike" kern="1200" cap="none" spc="0" normalizeH="0" baseline="0" noProof="0" dirty="0">
+                    <a:ln>
+                      <a:noFill/>
+                    </a:ln>
+                    <a:solidFill>
+                      <a:prstClr val="black">
+                        <a:lumMod val="75000"/>
+                        <a:lumOff val="25000"/>
+                      </a:prstClr>
+                    </a:solidFill>
+                    <a:effectLst/>
+                    <a:uLnTx/>
+                    <a:uFillTx/>
+                    <a:latin typeface="Arial" panose="020B0604020202020204" pitchFamily="34" charset="0"/>
+                    <a:ea typeface="Microsoft YaHei" panose="020B0503020204020204" pitchFamily="34" charset="-122"/>
+                    <a:cs typeface="+mn-ea"/>
+                    <a:sym typeface="Arial" panose="020B0604020202020204" pitchFamily="34" charset="0"/>
+                  </a:rPr>
+                  <a:t>1</a:t>
+                </a:r>
+                <a:endParaRPr kumimoji="0" lang="zh-CN" altLang="en-US" sz="3600" b="0" i="0" u="none" strike="noStrike" kern="1200" cap="none" spc="0" normalizeH="0" baseline="0" noProof="0" dirty="0">
+                  <a:ln>
+                    <a:noFill/>
+                  </a:ln>
+                  <a:solidFill>
+                    <a:prstClr val="black">
+                      <a:lumMod val="75000"/>
+                      <a:lumOff val="25000"/>
+                    </a:prstClr>
+                  </a:solidFill>
+                  <a:effectLst/>
+                  <a:uLnTx/>
+                  <a:uFillTx/>
+                  <a:latin typeface="Arial" panose="020B0604020202020204" pitchFamily="34" charset="0"/>
+                  <a:ea typeface="Microsoft YaHei" panose="020B0503020204020204" pitchFamily="34" charset="-122"/>
+                  <a:cs typeface="+mn-ea"/>
+                  <a:sym typeface="Arial" panose="020B0604020202020204" pitchFamily="34" charset="0"/>
+                </a:endParaRPr>
+              </a:p>
+            </p:txBody>
+          </p:sp>
+        </p:grpSp>
+      </p:grpSp>
+      <p:grpSp>
+        <p:nvGrpSpPr>
+          <p:cNvPr id="14" name="组合 13">
+            <a:extLst>
+              <a:ext uri="{FF2B5EF4-FFF2-40B4-BE49-F238E27FC236}">
+                <a16:creationId xmlns:a16="http://schemas.microsoft.com/office/drawing/2014/main" id="{A47A1309-1D08-FFEA-77A3-C213F9082978}"/>
+              </a:ext>
+            </a:extLst>
+          </p:cNvPr>
+          <p:cNvGrpSpPr/>
+          <p:nvPr/>
+        </p:nvGrpSpPr>
+        <p:grpSpPr>
+          <a:xfrm>
+            <a:off x="1296445" y="2996992"/>
+            <a:ext cx="5211233" cy="861352"/>
+            <a:chOff x="1296445" y="1777506"/>
+            <a:chExt cx="5211233" cy="861352"/>
+          </a:xfrm>
+        </p:grpSpPr>
+        <p:sp>
+          <p:nvSpPr>
+            <p:cNvPr id="15" name="文本框 14">
+              <a:extLst>
+                <a:ext uri="{FF2B5EF4-FFF2-40B4-BE49-F238E27FC236}">
+                  <a16:creationId xmlns:a16="http://schemas.microsoft.com/office/drawing/2014/main" id="{7BA4CF5E-A4F0-5556-AFE2-B6341643EF07}"/>
+                </a:ext>
+              </a:extLst>
+            </p:cNvPr>
+            <p:cNvSpPr txBox="1"/>
+            <p:nvPr/>
+          </p:nvSpPr>
+          <p:spPr>
+            <a:xfrm>
+              <a:off x="1830685" y="2115638"/>
+              <a:ext cx="4676993" cy="523220"/>
+            </a:xfrm>
+            <a:prstGeom prst="rect">
+              <a:avLst/>
+            </a:prstGeom>
+            <a:noFill/>
+          </p:spPr>
+          <p:txBody>
+            <a:bodyPr wrap="square" rtlCol="0">
+              <a:spAutoFit/>
+            </a:bodyPr>
+            <a:lstStyle/>
+            <a:p>
+              <a:pPr marL="0" marR="0" lvl="0" indent="0" algn="l" defTabSz="914400" rtl="0" eaLnBrk="1" fontAlgn="auto" latinLnBrk="0" hangingPunct="1">
+                <a:lnSpc>
+                  <a:spcPct val="100000"/>
+                </a:lnSpc>
+                <a:spcBef>
+                  <a:spcPts val="0"/>
+                </a:spcBef>
+                <a:spcAft>
+                  <a:spcPts val="0"/>
+                </a:spcAft>
+                <a:buClrTx/>
+                <a:buSzTx/>
+                <a:buFontTx/>
+                <a:buNone/>
+                <a:tabLst/>
+                <a:defRPr/>
+              </a:pPr>
+              <a:r>
+                <a:rPr kumimoji="0" lang="zh-CN" altLang="en-US" sz="2800" b="0" i="0" u="none" strike="noStrike" kern="1200" cap="none" spc="400" normalizeH="0" baseline="0" noProof="0" dirty="0">
+                  <a:ln>
+                    <a:noFill/>
+                  </a:ln>
+                  <a:solidFill>
+                    <a:prstClr val="black">
+                      <a:lumMod val="75000"/>
+                      <a:lumOff val="25000"/>
+                    </a:prstClr>
+                  </a:solidFill>
+                  <a:effectLst/>
+                  <a:uLnTx/>
+                  <a:uFillTx/>
+                  <a:latin typeface="Arial" panose="020B0604020202020204" pitchFamily="34" charset="0"/>
+                  <a:ea typeface="Microsoft YaHei" panose="020B0503020204020204" pitchFamily="34" charset="-122"/>
+                  <a:cs typeface="+mn-ea"/>
+                  <a:sym typeface="Arial" panose="020B0604020202020204" pitchFamily="34" charset="0"/>
+                </a:rPr>
+                <a:t>实现过程</a:t>
+              </a:r>
+            </a:p>
+          </p:txBody>
+        </p:sp>
+        <p:grpSp>
+          <p:nvGrpSpPr>
+            <p:cNvPr id="16" name="组合 15">
+              <a:extLst>
+                <a:ext uri="{FF2B5EF4-FFF2-40B4-BE49-F238E27FC236}">
+                  <a16:creationId xmlns:a16="http://schemas.microsoft.com/office/drawing/2014/main" id="{60E36DC8-7592-CB84-A6C6-0CF537423A2D}"/>
+                </a:ext>
+              </a:extLst>
+            </p:cNvPr>
+            <p:cNvGrpSpPr/>
+            <p:nvPr/>
+          </p:nvGrpSpPr>
+          <p:grpSpPr>
+            <a:xfrm>
+              <a:off x="1296445" y="1777506"/>
+              <a:ext cx="800100" cy="713161"/>
+              <a:chOff x="6976951" y="1586703"/>
+              <a:chExt cx="800100" cy="713161"/>
+            </a:xfrm>
+          </p:grpSpPr>
+          <p:sp>
+            <p:nvSpPr>
+              <p:cNvPr id="17" name="文本框 16">
+                <a:extLst>
+                  <a:ext uri="{FF2B5EF4-FFF2-40B4-BE49-F238E27FC236}">
+                    <a16:creationId xmlns:a16="http://schemas.microsoft.com/office/drawing/2014/main" id="{C94D2E1D-60D1-499A-5489-1020047CE376}"/>
+                  </a:ext>
+                </a:extLst>
+              </p:cNvPr>
+              <p:cNvSpPr txBox="1"/>
+              <p:nvPr/>
+            </p:nvSpPr>
+            <p:spPr>
+              <a:xfrm>
+                <a:off x="6976951" y="1586703"/>
+                <a:ext cx="800100" cy="646331"/>
+              </a:xfrm>
+              <a:prstGeom prst="rect">
+                <a:avLst/>
+              </a:prstGeom>
+              <a:noFill/>
+            </p:spPr>
+            <p:txBody>
+              <a:bodyPr wrap="square" rtlCol="0">
+                <a:spAutoFit/>
+              </a:bodyPr>
+              <a:lstStyle/>
+              <a:p>
+                <a:pPr marL="0" marR="0" lvl="0" indent="0" algn="l" defTabSz="914400" rtl="0" eaLnBrk="1" fontAlgn="auto" latinLnBrk="0" hangingPunct="1">
+                  <a:lnSpc>
+                    <a:spcPct val="100000"/>
+                  </a:lnSpc>
+                  <a:spcBef>
+                    <a:spcPts val="0"/>
+                  </a:spcBef>
+                  <a:spcAft>
+                    <a:spcPts val="0"/>
+                  </a:spcAft>
+                  <a:buClrTx/>
+                  <a:buSzTx/>
+                  <a:buFontTx/>
+                  <a:buNone/>
+                  <a:tabLst/>
+                  <a:defRPr/>
+                </a:pPr>
+                <a:r>
+                  <a:rPr kumimoji="0" lang="en-US" altLang="zh-CN" sz="3600" b="0" i="0" u="none" strike="noStrike" kern="1200" cap="none" spc="0" normalizeH="0" baseline="0" noProof="0" dirty="0">
+                    <a:ln>
+                      <a:noFill/>
+                    </a:ln>
+                    <a:solidFill>
+                      <a:prstClr val="black">
+                        <a:lumMod val="75000"/>
+                        <a:lumOff val="25000"/>
+                      </a:prstClr>
+                    </a:solidFill>
+                    <a:effectLst/>
+                    <a:uLnTx/>
+                    <a:uFillTx/>
+                    <a:latin typeface="Arial" panose="020B0604020202020204" pitchFamily="34" charset="0"/>
+                    <a:ea typeface="Microsoft YaHei" panose="020B0503020204020204" pitchFamily="34" charset="-122"/>
+                    <a:cs typeface="+mn-ea"/>
+                    <a:sym typeface="Arial" panose="020B0604020202020204" pitchFamily="34" charset="0"/>
+                  </a:rPr>
+                  <a:t>2</a:t>
+                </a:r>
+                <a:endParaRPr kumimoji="0" lang="zh-CN" altLang="en-US" sz="3600" b="0" i="0" u="none" strike="noStrike" kern="1200" cap="none" spc="0" normalizeH="0" baseline="0" noProof="0" dirty="0">
+                  <a:ln>
+                    <a:noFill/>
+                  </a:ln>
+                  <a:solidFill>
+                    <a:prstClr val="black">
+                      <a:lumMod val="75000"/>
+                      <a:lumOff val="25000"/>
+                    </a:prstClr>
+                  </a:solidFill>
+                  <a:effectLst/>
+                  <a:uLnTx/>
+                  <a:uFillTx/>
+                  <a:latin typeface="Arial" panose="020B0604020202020204" pitchFamily="34" charset="0"/>
+                  <a:ea typeface="Microsoft YaHei" panose="020B0503020204020204" pitchFamily="34" charset="-122"/>
+                  <a:cs typeface="+mn-ea"/>
+                  <a:sym typeface="Arial" panose="020B0604020202020204" pitchFamily="34" charset="0"/>
+                </a:endParaRPr>
+              </a:p>
+            </p:txBody>
+          </p:sp>
+          <p:cxnSp>
+            <p:nvCxnSpPr>
+              <p:cNvPr id="18" name="直接连接符 17">
+                <a:extLst>
+                  <a:ext uri="{FF2B5EF4-FFF2-40B4-BE49-F238E27FC236}">
+                    <a16:creationId xmlns:a16="http://schemas.microsoft.com/office/drawing/2014/main" id="{5AA8D459-F643-C1B8-4686-3BAAC6CEEBE9}"/>
+                  </a:ext>
+                </a:extLst>
+              </p:cNvPr>
+              <p:cNvCxnSpPr/>
+              <p:nvPr/>
+            </p:nvCxnSpPr>
+            <p:spPr>
+              <a:xfrm flipH="1">
+                <a:off x="7160632" y="1829707"/>
+                <a:ext cx="432738" cy="470157"/>
+              </a:xfrm>
+              <a:prstGeom prst="line">
+                <a:avLst/>
+              </a:prstGeom>
+              <a:ln>
+                <a:solidFill>
+                  <a:schemeClr val="tx1">
+                    <a:lumMod val="50000"/>
+                    <a:lumOff val="50000"/>
+                  </a:schemeClr>
+                </a:solidFill>
+              </a:ln>
+            </p:spPr>
+            <p:style>
+              <a:lnRef idx="1">
+                <a:schemeClr val="accent1"/>
+              </a:lnRef>
+              <a:fillRef idx="0">
+                <a:schemeClr val="accent1"/>
+              </a:fillRef>
+              <a:effectRef idx="0">
+                <a:schemeClr val="accent1"/>
+              </a:effectRef>
+              <a:fontRef idx="minor">
+                <a:schemeClr val="tx1"/>
+              </a:fontRef>
+            </p:style>
+          </p:cxnSp>
+        </p:grpSp>
+      </p:grpSp>
+      <p:grpSp>
+        <p:nvGrpSpPr>
+          <p:cNvPr id="19" name="组合 18">
+            <a:extLst>
+              <a:ext uri="{FF2B5EF4-FFF2-40B4-BE49-F238E27FC236}">
+                <a16:creationId xmlns:a16="http://schemas.microsoft.com/office/drawing/2014/main" id="{790BBF90-D8DE-2E2E-998C-61CDEB031C06}"/>
+              </a:ext>
+            </a:extLst>
+          </p:cNvPr>
+          <p:cNvGrpSpPr/>
+          <p:nvPr/>
+        </p:nvGrpSpPr>
+        <p:grpSpPr>
+          <a:xfrm>
+            <a:off x="1296445" y="4112848"/>
+            <a:ext cx="4890599" cy="861352"/>
+            <a:chOff x="1296445" y="1777506"/>
+            <a:chExt cx="4890599" cy="861352"/>
+          </a:xfrm>
+        </p:grpSpPr>
+        <p:sp>
+          <p:nvSpPr>
+            <p:cNvPr id="20" name="文本框 19">
+              <a:extLst>
+                <a:ext uri="{FF2B5EF4-FFF2-40B4-BE49-F238E27FC236}">
+                  <a16:creationId xmlns:a16="http://schemas.microsoft.com/office/drawing/2014/main" id="{B7937A3C-DE23-C896-142E-DE70A1314A47}"/>
+                </a:ext>
+              </a:extLst>
+            </p:cNvPr>
+            <p:cNvSpPr txBox="1"/>
+            <p:nvPr/>
+          </p:nvSpPr>
+          <p:spPr>
+            <a:xfrm>
+              <a:off x="1830685" y="2115638"/>
+              <a:ext cx="4356359" cy="523220"/>
+            </a:xfrm>
+            <a:prstGeom prst="rect">
+              <a:avLst/>
+            </a:prstGeom>
+            <a:noFill/>
+          </p:spPr>
+          <p:txBody>
+            <a:bodyPr wrap="square" rtlCol="0">
+              <a:spAutoFit/>
+            </a:bodyPr>
+            <a:lstStyle/>
+            <a:p>
+              <a:pPr marL="0" marR="0" lvl="0" indent="0" algn="l" defTabSz="914400" rtl="0" eaLnBrk="1" fontAlgn="auto" latinLnBrk="0" hangingPunct="1">
+                <a:lnSpc>
+                  <a:spcPct val="100000"/>
+                </a:lnSpc>
+                <a:spcBef>
+                  <a:spcPts val="0"/>
+                </a:spcBef>
+                <a:spcAft>
+                  <a:spcPts val="0"/>
+                </a:spcAft>
+                <a:buClrTx/>
+                <a:buSzTx/>
+                <a:buFontTx/>
+                <a:buNone/>
+                <a:tabLst/>
+                <a:defRPr/>
+              </a:pPr>
+              <a:r>
+                <a:rPr kumimoji="0" lang="zh-CN" altLang="en-US" sz="2800" b="0" i="0" u="none" strike="noStrike" kern="1200" cap="none" spc="400" normalizeH="0" baseline="0" noProof="0" dirty="0">
+                  <a:ln>
+                    <a:noFill/>
+                  </a:ln>
+                  <a:solidFill>
+                    <a:prstClr val="black">
+                      <a:lumMod val="75000"/>
+                      <a:lumOff val="25000"/>
+                    </a:prstClr>
+                  </a:solidFill>
+                  <a:effectLst/>
+                  <a:uLnTx/>
+                  <a:uFillTx/>
+                  <a:latin typeface="Arial" panose="020B0604020202020204" pitchFamily="34" charset="0"/>
+                  <a:ea typeface="Microsoft YaHei" panose="020B0503020204020204" pitchFamily="34" charset="-122"/>
+                  <a:cs typeface="+mn-ea"/>
+                  <a:sym typeface="Arial" panose="020B0604020202020204" pitchFamily="34" charset="0"/>
+                </a:rPr>
+                <a:t>结果</a:t>
+              </a:r>
+              <a:r>
+                <a:rPr kumimoji="0" lang="en-US" altLang="zh-CN" sz="2800" b="0" i="0" u="none" strike="noStrike" kern="1200" cap="none" spc="400" normalizeH="0" baseline="0" noProof="0" dirty="0">
+                  <a:ln>
+                    <a:noFill/>
+                  </a:ln>
+                  <a:solidFill>
+                    <a:prstClr val="black">
+                      <a:lumMod val="75000"/>
+                      <a:lumOff val="25000"/>
+                    </a:prstClr>
+                  </a:solidFill>
+                  <a:effectLst/>
+                  <a:uLnTx/>
+                  <a:uFillTx/>
+                  <a:latin typeface="Arial" panose="020B0604020202020204" pitchFamily="34" charset="0"/>
+                  <a:ea typeface="Microsoft YaHei" panose="020B0503020204020204" pitchFamily="34" charset="-122"/>
+                  <a:cs typeface="+mn-ea"/>
+                  <a:sym typeface="Arial" panose="020B0604020202020204" pitchFamily="34" charset="0"/>
+                </a:rPr>
+                <a:t>&amp;</a:t>
+              </a:r>
+              <a:r>
+                <a:rPr kumimoji="0" lang="zh-CN" altLang="en-US" sz="2800" b="0" i="0" u="none" strike="noStrike" kern="1200" cap="none" spc="400" normalizeH="0" baseline="0" noProof="0" dirty="0">
+                  <a:ln>
+                    <a:noFill/>
+                  </a:ln>
+                  <a:solidFill>
+                    <a:prstClr val="black">
+                      <a:lumMod val="75000"/>
+                      <a:lumOff val="25000"/>
+                    </a:prstClr>
+                  </a:solidFill>
+                  <a:effectLst/>
+                  <a:uLnTx/>
+                  <a:uFillTx/>
+                  <a:latin typeface="Arial" panose="020B0604020202020204" pitchFamily="34" charset="0"/>
+                  <a:ea typeface="Microsoft YaHei" panose="020B0503020204020204" pitchFamily="34" charset="-122"/>
+                  <a:cs typeface="+mn-ea"/>
+                  <a:sym typeface="Arial" panose="020B0604020202020204" pitchFamily="34" charset="0"/>
+                </a:rPr>
+                <a:t>讨论</a:t>
+              </a:r>
+            </a:p>
+          </p:txBody>
+        </p:sp>
+        <p:grpSp>
+          <p:nvGrpSpPr>
+            <p:cNvPr id="21" name="组合 20">
+              <a:extLst>
+                <a:ext uri="{FF2B5EF4-FFF2-40B4-BE49-F238E27FC236}">
+                  <a16:creationId xmlns:a16="http://schemas.microsoft.com/office/drawing/2014/main" id="{E4EB9E75-13E2-C9B6-049F-2B5E6D81EDF2}"/>
+                </a:ext>
+              </a:extLst>
+            </p:cNvPr>
+            <p:cNvGrpSpPr/>
+            <p:nvPr/>
+          </p:nvGrpSpPr>
+          <p:grpSpPr>
+            <a:xfrm>
+              <a:off x="1296445" y="1777506"/>
+              <a:ext cx="800100" cy="713161"/>
+              <a:chOff x="6976951" y="1586703"/>
+              <a:chExt cx="800100" cy="713161"/>
+            </a:xfrm>
+          </p:grpSpPr>
+          <p:sp>
+            <p:nvSpPr>
+              <p:cNvPr id="22" name="文本框 21">
+                <a:extLst>
+                  <a:ext uri="{FF2B5EF4-FFF2-40B4-BE49-F238E27FC236}">
+                    <a16:creationId xmlns:a16="http://schemas.microsoft.com/office/drawing/2014/main" id="{43830E6A-A1BC-902A-571F-2395F545A7A1}"/>
+                  </a:ext>
+                </a:extLst>
+              </p:cNvPr>
+              <p:cNvSpPr txBox="1"/>
+              <p:nvPr/>
+            </p:nvSpPr>
+            <p:spPr>
+              <a:xfrm>
+                <a:off x="6976951" y="1586703"/>
+                <a:ext cx="800100" cy="646331"/>
+              </a:xfrm>
+              <a:prstGeom prst="rect">
+                <a:avLst/>
+              </a:prstGeom>
+              <a:noFill/>
+            </p:spPr>
+            <p:txBody>
+              <a:bodyPr wrap="square" rtlCol="0">
+                <a:spAutoFit/>
+              </a:bodyPr>
+              <a:lstStyle/>
+              <a:p>
+                <a:pPr marL="0" marR="0" lvl="0" indent="0" algn="l" defTabSz="914400" rtl="0" eaLnBrk="1" fontAlgn="auto" latinLnBrk="0" hangingPunct="1">
+                  <a:lnSpc>
+                    <a:spcPct val="100000"/>
+                  </a:lnSpc>
+                  <a:spcBef>
+                    <a:spcPts val="0"/>
+                  </a:spcBef>
+                  <a:spcAft>
+                    <a:spcPts val="0"/>
+                  </a:spcAft>
+                  <a:buClrTx/>
+                  <a:buSzTx/>
+                  <a:buFontTx/>
+                  <a:buNone/>
+                  <a:tabLst/>
+                  <a:defRPr/>
+                </a:pPr>
+                <a:r>
+                  <a:rPr lang="en-US" altLang="zh-CN" sz="3600" dirty="0">
+                    <a:solidFill>
+                      <a:prstClr val="black">
+                        <a:lumMod val="75000"/>
+                        <a:lumOff val="25000"/>
+                      </a:prstClr>
+                    </a:solidFill>
+                    <a:latin typeface="Arial" panose="020B0604020202020204" pitchFamily="34" charset="0"/>
+                    <a:ea typeface="Microsoft YaHei" panose="020B0503020204020204" pitchFamily="34" charset="-122"/>
+                    <a:cs typeface="+mn-ea"/>
+                    <a:sym typeface="Arial" panose="020B0604020202020204" pitchFamily="34" charset="0"/>
+                  </a:rPr>
+                  <a:t>3</a:t>
+                </a:r>
+                <a:endParaRPr kumimoji="0" lang="zh-CN" altLang="en-US" sz="3600" b="0" i="0" u="none" strike="noStrike" kern="1200" cap="none" spc="0" normalizeH="0" baseline="0" noProof="0" dirty="0">
+                  <a:ln>
+                    <a:noFill/>
+                  </a:ln>
+                  <a:solidFill>
+                    <a:prstClr val="black">
+                      <a:lumMod val="75000"/>
+                      <a:lumOff val="25000"/>
+                    </a:prstClr>
+                  </a:solidFill>
+                  <a:effectLst/>
+                  <a:uLnTx/>
+                  <a:uFillTx/>
+                  <a:latin typeface="Arial" panose="020B0604020202020204" pitchFamily="34" charset="0"/>
+                  <a:ea typeface="Microsoft YaHei" panose="020B0503020204020204" pitchFamily="34" charset="-122"/>
+                  <a:cs typeface="+mn-ea"/>
+                  <a:sym typeface="Arial" panose="020B0604020202020204" pitchFamily="34" charset="0"/>
+                </a:endParaRPr>
+              </a:p>
+            </p:txBody>
+          </p:sp>
+          <p:cxnSp>
+            <p:nvCxnSpPr>
+              <p:cNvPr id="23" name="直接连接符 22">
+                <a:extLst>
+                  <a:ext uri="{FF2B5EF4-FFF2-40B4-BE49-F238E27FC236}">
+                    <a16:creationId xmlns:a16="http://schemas.microsoft.com/office/drawing/2014/main" id="{94EBB447-AD1F-647D-AF7A-235C390B4818}"/>
+                  </a:ext>
+                </a:extLst>
+              </p:cNvPr>
+              <p:cNvCxnSpPr/>
+              <p:nvPr/>
+            </p:nvCxnSpPr>
+            <p:spPr>
+              <a:xfrm flipH="1">
+                <a:off x="7160632" y="1829707"/>
+                <a:ext cx="432738" cy="470157"/>
+              </a:xfrm>
+              <a:prstGeom prst="line">
+                <a:avLst/>
+              </a:prstGeom>
+              <a:ln>
+                <a:solidFill>
+                  <a:schemeClr val="tx1">
+                    <a:lumMod val="50000"/>
+                    <a:lumOff val="50000"/>
+                  </a:schemeClr>
+                </a:solidFill>
+              </a:ln>
+            </p:spPr>
+            <p:style>
+              <a:lnRef idx="1">
+                <a:schemeClr val="accent1"/>
+              </a:lnRef>
+              <a:fillRef idx="0">
+                <a:schemeClr val="accent1"/>
+              </a:fillRef>
+              <a:effectRef idx="0">
+                <a:schemeClr val="accent1"/>
+              </a:effectRef>
+              <a:fontRef idx="minor">
+                <a:schemeClr val="tx1"/>
+              </a:fontRef>
+            </p:style>
+          </p:cxnSp>
+        </p:grpSp>
+      </p:grpSp>
+      <p:sp>
+        <p:nvSpPr>
+          <p:cNvPr id="29" name="灯片编号占位符 28">
+            <a:extLst>
+              <a:ext uri="{FF2B5EF4-FFF2-40B4-BE49-F238E27FC236}">
+                <a16:creationId xmlns:a16="http://schemas.microsoft.com/office/drawing/2014/main" id="{02569B93-675D-EFDC-ED96-8F8F01109B3D}"/>
+              </a:ext>
+            </a:extLst>
+          </p:cNvPr>
+          <p:cNvSpPr>
+            <a:spLocks noGrp="1"/>
+          </p:cNvSpPr>
+          <p:nvPr>
+            <p:ph type="sldNum" sz="quarter" idx="12"/>
+          </p:nvPr>
+        </p:nvSpPr>
+        <p:spPr/>
+        <p:txBody>
+          <a:bodyPr/>
+          <a:lstStyle/>
+          <a:p>
+            <a:fld id="{A64A0CBB-2614-41AB-884D-C0633239B6E4}" type="slidenum">
+              <a:rPr lang="zh-CN" altLang="en-US" smtClean="0"/>
+              <a:t>2</a:t>
+            </a:fld>
+            <a:endParaRPr lang="zh-CN" altLang="en-US"/>
+          </a:p>
+        </p:txBody>
+      </p:sp>
+    </p:spTree>
+    <p:extLst>
+      <p:ext uri="{BB962C8B-B14F-4D97-AF65-F5344CB8AC3E}">
+        <p14:creationId xmlns:p14="http://schemas.microsoft.com/office/powerpoint/2010/main" val="3053133134"/>
+      </p:ext>
+    </p:extLst>
+  </p:cSld>
+  <p:clrMapOvr>
+    <a:masterClrMapping/>
+  </p:clrMapOvr>
+</p:sld>
+</file>
+
+<file path=ppt/slides/slide20.xml><?xml version="1.0" encoding="utf-8"?>
+<p:sld xmlns:a="http://schemas.openxmlformats.org/drawingml/2006/main" xmlns:r="http://schemas.openxmlformats.org/officeDocument/2006/relationships" xmlns:p="http://schemas.openxmlformats.org/presentationml/2006/main" show="0">
+  <p:cSld>
+    <p:spTree>
+      <p:nvGrpSpPr>
+        <p:cNvPr id="1" name="">
+          <a:extLst>
+            <a:ext uri="{FF2B5EF4-FFF2-40B4-BE49-F238E27FC236}">
+              <a16:creationId xmlns:a16="http://schemas.microsoft.com/office/drawing/2014/main" id="{FFD61D1D-6522-E5F8-81C4-D97AC628C5DB}"/>
+            </a:ext>
+          </a:extLst>
+        </p:cNvPr>
+        <p:cNvGrpSpPr/>
+        <p:nvPr/>
+      </p:nvGrpSpPr>
+      <p:grpSpPr>
+        <a:xfrm>
+          <a:off x="0" y="0"/>
+          <a:ext cx="0" cy="0"/>
+          <a:chOff x="0" y="0"/>
+          <a:chExt cx="0" cy="0"/>
+        </a:xfrm>
+      </p:grpSpPr>
+      <p:sp>
+        <p:nvSpPr>
+          <p:cNvPr id="2" name="矩形 1">
+            <a:extLst>
+              <a:ext uri="{FF2B5EF4-FFF2-40B4-BE49-F238E27FC236}">
+                <a16:creationId xmlns:a16="http://schemas.microsoft.com/office/drawing/2014/main" id="{8BC5A5F7-B045-3D1C-719A-0066BCCFAB0F}"/>
+              </a:ext>
+            </a:extLst>
+          </p:cNvPr>
+          <p:cNvSpPr/>
+          <p:nvPr/>
+        </p:nvSpPr>
+        <p:spPr>
+          <a:xfrm>
+            <a:off x="0" y="0"/>
+            <a:ext cx="12192000" cy="615950"/>
+          </a:xfrm>
+          <a:prstGeom prst="rect">
+            <a:avLst/>
+          </a:prstGeom>
+          <a:solidFill>
+            <a:schemeClr val="accent1"/>
+          </a:solidFill>
+          <a:ln w="12700" cap="flat" cmpd="sng" algn="ctr">
+            <a:noFill/>
+            <a:prstDash val="solid"/>
+            <a:miter lim="800000"/>
+          </a:ln>
+          <a:effectLst/>
+          <a:extLst>
+            <a:ext uri="{91240B29-F687-4F45-9708-019B960494DF}">
+              <a14:hiddenLine xmlns:a14="http://schemas.microsoft.com/office/drawing/2010/main" w="0" cap="flat" cmpd="sng" algn="ctr">
+                <a:solidFill>
+                  <a:schemeClr val="accent1">
+                    <a:shade val="50000"/>
+                  </a:schemeClr>
+                </a:solidFill>
+                <a:prstDash val="solid"/>
+                <a:miter lim="800000"/>
+              </a14:hiddenLine>
+            </a:ext>
+          </a:extLst>
+        </p:spPr>
+        <p:style>
+          <a:lnRef idx="2">
+            <a:schemeClr val="accent1">
+              <a:shade val="50000"/>
+            </a:schemeClr>
+          </a:lnRef>
+          <a:fillRef idx="1">
+            <a:schemeClr val="accent1"/>
+          </a:fillRef>
+          <a:effectRef idx="0">
+            <a:schemeClr val="accent1"/>
+          </a:effectRef>
+          <a:fontRef idx="minor">
+            <a:schemeClr val="lt1"/>
+          </a:fontRef>
+        </p:style>
+        <p:txBody>
+          <a:bodyPr rtlCol="0" anchor="ctr"/>
+          <a:lstStyle/>
+          <a:p>
+            <a:pPr algn="ctr"/>
+            <a:endParaRPr lang="zh-CN" altLang="en-US"/>
+          </a:p>
+        </p:txBody>
+      </p:sp>
+      <p:pic>
+        <p:nvPicPr>
+          <p:cNvPr id="3" name="图片 2">
+            <a:extLst>
+              <a:ext uri="{FF2B5EF4-FFF2-40B4-BE49-F238E27FC236}">
+                <a16:creationId xmlns:a16="http://schemas.microsoft.com/office/drawing/2014/main" id="{ECBC2896-3C52-FE32-C917-186FC8E2EC5F}"/>
+              </a:ext>
+            </a:extLst>
+          </p:cNvPr>
+          <p:cNvPicPr>
+            <a:picLocks noChangeAspect="1"/>
+          </p:cNvPicPr>
+          <p:nvPr/>
+        </p:nvPicPr>
+        <p:blipFill rotWithShape="1">
+          <a:blip r:embed="rId2">
+            <a:alphaModFix amt="10000"/>
+            <a:extLst>
+              <a:ext uri="{28A0092B-C50C-407E-A947-70E740481C1C}">
+                <a14:useLocalDpi xmlns:a14="http://schemas.microsoft.com/office/drawing/2010/main" val="0"/>
+              </a:ext>
+            </a:extLst>
+          </a:blip>
+          <a:srcRect/>
+          <a:stretch/>
+        </p:blipFill>
+        <p:spPr>
+          <a:xfrm>
+            <a:off x="5867400" y="0"/>
+            <a:ext cx="6324600" cy="615950"/>
+          </a:xfrm>
+          <a:prstGeom prst="rect">
+            <a:avLst/>
+          </a:prstGeom>
+        </p:spPr>
+      </p:pic>
+      <p:pic>
+        <p:nvPicPr>
+          <p:cNvPr id="4" name="图片 3" descr="卡通人物&#10;&#10;描述已自动生成">
+            <a:extLst>
+              <a:ext uri="{FF2B5EF4-FFF2-40B4-BE49-F238E27FC236}">
+                <a16:creationId xmlns:a16="http://schemas.microsoft.com/office/drawing/2014/main" id="{B0EF7492-4877-B384-31F4-04438EDE9E7F}"/>
+              </a:ext>
+            </a:extLst>
+          </p:cNvPr>
+          <p:cNvPicPr>
+            <a:picLocks noChangeAspect="1"/>
+          </p:cNvPicPr>
+          <p:nvPr/>
+        </p:nvPicPr>
+        <p:blipFill>
+          <a:blip r:embed="rId3" cstate="print">
+            <a:extLst>
+              <a:ext uri="{28A0092B-C50C-407E-A947-70E740481C1C}">
+                <a14:useLocalDpi xmlns:a14="http://schemas.microsoft.com/office/drawing/2010/main" val="0"/>
+              </a:ext>
+            </a:extLst>
+          </a:blip>
+          <a:stretch>
+            <a:fillRect/>
+          </a:stretch>
+        </p:blipFill>
+        <p:spPr>
+          <a:xfrm>
+            <a:off x="10489624" y="140330"/>
+            <a:ext cx="1246537" cy="359697"/>
+          </a:xfrm>
+          <a:prstGeom prst="rect">
+            <a:avLst/>
+          </a:prstGeom>
+        </p:spPr>
+      </p:pic>
+      <p:sp>
+        <p:nvSpPr>
+          <p:cNvPr id="5" name="文本框 4">
+            <a:extLst>
+              <a:ext uri="{FF2B5EF4-FFF2-40B4-BE49-F238E27FC236}">
+                <a16:creationId xmlns:a16="http://schemas.microsoft.com/office/drawing/2014/main" id="{88BC6795-B38C-DCA5-AB50-201AA00B273F}"/>
+              </a:ext>
+            </a:extLst>
+          </p:cNvPr>
+          <p:cNvSpPr txBox="1"/>
+          <p:nvPr/>
+        </p:nvSpPr>
+        <p:spPr>
+          <a:xfrm>
+            <a:off x="750356" y="81375"/>
+            <a:ext cx="5199182" cy="461665"/>
+          </a:xfrm>
+          <a:prstGeom prst="rect">
+            <a:avLst/>
+          </a:prstGeom>
+          <a:noFill/>
+        </p:spPr>
+        <p:txBody>
+          <a:bodyPr wrap="square" rtlCol="0">
+            <a:spAutoFit/>
+          </a:bodyPr>
+          <a:lstStyle/>
+          <a:p>
+            <a:r>
+              <a:rPr lang="zh-CN" altLang="en-US" sz="2400" b="1" dirty="0">
+                <a:solidFill>
+                  <a:schemeClr val="bg1"/>
+                </a:solidFill>
+                <a:latin typeface="Palatino Linotype" panose="02040502050505030304" pitchFamily="18" charset="0"/>
+                <a:ea typeface="黑体" panose="02010609060101010101" pitchFamily="49" charset="-122"/>
+                <a:cs typeface="Times New Roman" panose="02020603050405020304" pitchFamily="18" charset="0"/>
+              </a:rPr>
+              <a:t>附录：</a:t>
+            </a:r>
+            <a:r>
+              <a:rPr lang="en-US" altLang="zh-CN" sz="2400" b="1" dirty="0">
+                <a:solidFill>
+                  <a:schemeClr val="bg1"/>
+                </a:solidFill>
+                <a:latin typeface="Palatino Linotype" panose="02040502050505030304" pitchFamily="18" charset="0"/>
+                <a:ea typeface="黑体" panose="02010609060101010101" pitchFamily="49" charset="-122"/>
+                <a:cs typeface="Times New Roman" panose="02020603050405020304" pitchFamily="18" charset="0"/>
+              </a:rPr>
+              <a:t>Transformer</a:t>
+            </a:r>
+          </a:p>
+        </p:txBody>
+      </p:sp>
+      <p:sp>
+        <p:nvSpPr>
+          <p:cNvPr id="6" name="椭圆 5">
+            <a:extLst>
+              <a:ext uri="{FF2B5EF4-FFF2-40B4-BE49-F238E27FC236}">
+                <a16:creationId xmlns:a16="http://schemas.microsoft.com/office/drawing/2014/main" id="{0F3275BD-33E4-5E59-40BC-639969515F0A}"/>
+              </a:ext>
+            </a:extLst>
+          </p:cNvPr>
+          <p:cNvSpPr/>
+          <p:nvPr/>
+        </p:nvSpPr>
+        <p:spPr>
+          <a:xfrm rot="19800000">
+            <a:off x="417882" y="231219"/>
+            <a:ext cx="177915" cy="177915"/>
+          </a:xfrm>
+          <a:prstGeom prst="ellipse">
+            <a:avLst/>
+          </a:prstGeom>
+          <a:gradFill>
+            <a:gsLst>
+              <a:gs pos="0">
+                <a:schemeClr val="bg1">
+                  <a:alpha val="70000"/>
+                </a:schemeClr>
+              </a:gs>
+              <a:gs pos="100000">
+                <a:schemeClr val="bg1">
+                  <a:alpha val="0"/>
+                </a:schemeClr>
+              </a:gs>
+            </a:gsLst>
+            <a:lin ang="5400000" scaled="1"/>
+          </a:gradFill>
+          <a:ln>
+            <a:noFill/>
+          </a:ln>
+        </p:spPr>
+        <p:style>
+          <a:lnRef idx="2">
+            <a:schemeClr val="accent1">
+              <a:shade val="50000"/>
+            </a:schemeClr>
+          </a:lnRef>
+          <a:fillRef idx="1">
+            <a:schemeClr val="accent1"/>
+          </a:fillRef>
+          <a:effectRef idx="0">
+            <a:schemeClr val="accent1"/>
+          </a:effectRef>
+          <a:fontRef idx="minor">
+            <a:schemeClr val="lt1"/>
+          </a:fontRef>
+        </p:style>
+        <p:txBody>
+          <a:bodyPr rtlCol="0" anchor="ctr"/>
+          <a:lstStyle/>
+          <a:p>
+            <a:pPr algn="ctr"/>
+            <a:endParaRPr lang="zh-CN" altLang="en-US"/>
+          </a:p>
+        </p:txBody>
+      </p:sp>
+      <p:sp>
+        <p:nvSpPr>
+          <p:cNvPr id="7" name="矩形 6">
+            <a:extLst>
+              <a:ext uri="{FF2B5EF4-FFF2-40B4-BE49-F238E27FC236}">
                 <a16:creationId xmlns:a16="http://schemas.microsoft.com/office/drawing/2014/main" id="{C1E4BC67-C977-A00C-892F-8AB8FC01819B}"/>
               </a:ext>
             </a:extLst>
@@ -22165,7 +23970,7 @@
           <a:p>
             <a:fld id="{A64A0CBB-2614-41AB-884D-C0633239B6E4}" type="slidenum">
               <a:rPr lang="zh-CN" altLang="en-US" smtClean="0"/>
-              <a:t>19</a:t>
+              <a:t>20</a:t>
             </a:fld>
             <a:endParaRPr lang="zh-CN" altLang="en-US"/>
           </a:p>
@@ -22680,1191 +24485,6 @@
 </p:sld>
 </file>
 
-<file path=ppt/slides/slide2.xml><?xml version="1.0" encoding="utf-8"?>
-<p:sld xmlns:a="http://schemas.openxmlformats.org/drawingml/2006/main" xmlns:r="http://schemas.openxmlformats.org/officeDocument/2006/relationships" xmlns:p="http://schemas.openxmlformats.org/presentationml/2006/main">
-  <p:cSld>
-    <p:spTree>
-      <p:nvGrpSpPr>
-        <p:cNvPr id="1" name=""/>
-        <p:cNvGrpSpPr/>
-        <p:nvPr/>
-      </p:nvGrpSpPr>
-      <p:grpSpPr>
-        <a:xfrm>
-          <a:off x="0" y="0"/>
-          <a:ext cx="0" cy="0"/>
-          <a:chOff x="0" y="0"/>
-          <a:chExt cx="0" cy="0"/>
-        </a:xfrm>
-      </p:grpSpPr>
-      <p:sp>
-        <p:nvSpPr>
-          <p:cNvPr id="2" name="矩形 1">
-            <a:extLst>
-              <a:ext uri="{FF2B5EF4-FFF2-40B4-BE49-F238E27FC236}">
-                <a16:creationId xmlns:a16="http://schemas.microsoft.com/office/drawing/2014/main" id="{7CAABC49-B2A5-49CF-A92F-7448EEA28822}"/>
-              </a:ext>
-            </a:extLst>
-          </p:cNvPr>
-          <p:cNvSpPr/>
-          <p:nvPr/>
-        </p:nvSpPr>
-        <p:spPr>
-          <a:xfrm>
-            <a:off x="0" y="0"/>
-            <a:ext cx="12192000" cy="615950"/>
-          </a:xfrm>
-          <a:prstGeom prst="rect">
-            <a:avLst/>
-          </a:prstGeom>
-          <a:solidFill>
-            <a:schemeClr val="accent1"/>
-          </a:solidFill>
-          <a:ln w="12700" cap="flat" cmpd="sng" algn="ctr">
-            <a:noFill/>
-            <a:prstDash val="solid"/>
-            <a:miter lim="800000"/>
-          </a:ln>
-          <a:effectLst/>
-          <a:extLst>
-            <a:ext uri="{91240B29-F687-4F45-9708-019B960494DF}">
-              <a14:hiddenLine xmlns:a14="http://schemas.microsoft.com/office/drawing/2010/main" w="0" cap="flat" cmpd="sng" algn="ctr">
-                <a:solidFill>
-                  <a:schemeClr val="accent1">
-                    <a:shade val="50000"/>
-                  </a:schemeClr>
-                </a:solidFill>
-                <a:prstDash val="solid"/>
-                <a:miter lim="800000"/>
-              </a14:hiddenLine>
-            </a:ext>
-          </a:extLst>
-        </p:spPr>
-        <p:style>
-          <a:lnRef idx="2">
-            <a:schemeClr val="accent1">
-              <a:shade val="50000"/>
-            </a:schemeClr>
-          </a:lnRef>
-          <a:fillRef idx="1">
-            <a:schemeClr val="accent1"/>
-          </a:fillRef>
-          <a:effectRef idx="0">
-            <a:schemeClr val="accent1"/>
-          </a:effectRef>
-          <a:fontRef idx="minor">
-            <a:schemeClr val="lt1"/>
-          </a:fontRef>
-        </p:style>
-        <p:txBody>
-          <a:bodyPr rtlCol="0" anchor="ctr"/>
-          <a:lstStyle/>
-          <a:p>
-            <a:pPr algn="ctr"/>
-            <a:endParaRPr lang="zh-CN" altLang="en-US"/>
-          </a:p>
-        </p:txBody>
-      </p:sp>
-      <p:pic>
-        <p:nvPicPr>
-          <p:cNvPr id="3" name="图片 2">
-            <a:extLst>
-              <a:ext uri="{FF2B5EF4-FFF2-40B4-BE49-F238E27FC236}">
-                <a16:creationId xmlns:a16="http://schemas.microsoft.com/office/drawing/2014/main" id="{450FCE89-46F8-4D8A-91CA-C561DC6414E5}"/>
-              </a:ext>
-            </a:extLst>
-          </p:cNvPr>
-          <p:cNvPicPr>
-            <a:picLocks noChangeAspect="1"/>
-          </p:cNvPicPr>
-          <p:nvPr/>
-        </p:nvPicPr>
-        <p:blipFill rotWithShape="1">
-          <a:blip r:embed="rId3">
-            <a:alphaModFix amt="10000"/>
-            <a:extLst>
-              <a:ext uri="{28A0092B-C50C-407E-A947-70E740481C1C}">
-                <a14:useLocalDpi xmlns:a14="http://schemas.microsoft.com/office/drawing/2010/main" val="0"/>
-              </a:ext>
-            </a:extLst>
-          </a:blip>
-          <a:srcRect/>
-          <a:stretch/>
-        </p:blipFill>
-        <p:spPr>
-          <a:xfrm>
-            <a:off x="5867400" y="0"/>
-            <a:ext cx="6324600" cy="615950"/>
-          </a:xfrm>
-          <a:prstGeom prst="rect">
-            <a:avLst/>
-          </a:prstGeom>
-        </p:spPr>
-      </p:pic>
-      <p:pic>
-        <p:nvPicPr>
-          <p:cNvPr id="4" name="图片 3" descr="卡通人物&#10;&#10;描述已自动生成">
-            <a:extLst>
-              <a:ext uri="{FF2B5EF4-FFF2-40B4-BE49-F238E27FC236}">
-                <a16:creationId xmlns:a16="http://schemas.microsoft.com/office/drawing/2014/main" id="{07E348B0-7717-4FFF-9C25-9953D1C191B0}"/>
-              </a:ext>
-            </a:extLst>
-          </p:cNvPr>
-          <p:cNvPicPr>
-            <a:picLocks noChangeAspect="1"/>
-          </p:cNvPicPr>
-          <p:nvPr/>
-        </p:nvPicPr>
-        <p:blipFill>
-          <a:blip r:embed="rId4" cstate="print">
-            <a:extLst>
-              <a:ext uri="{28A0092B-C50C-407E-A947-70E740481C1C}">
-                <a14:useLocalDpi xmlns:a14="http://schemas.microsoft.com/office/drawing/2010/main" val="0"/>
-              </a:ext>
-            </a:extLst>
-          </a:blip>
-          <a:stretch>
-            <a:fillRect/>
-          </a:stretch>
-        </p:blipFill>
-        <p:spPr>
-          <a:xfrm>
-            <a:off x="10489624" y="140330"/>
-            <a:ext cx="1246537" cy="359697"/>
-          </a:xfrm>
-          <a:prstGeom prst="rect">
-            <a:avLst/>
-          </a:prstGeom>
-        </p:spPr>
-      </p:pic>
-      <p:sp>
-        <p:nvSpPr>
-          <p:cNvPr id="5" name="文本框 4">
-            <a:extLst>
-              <a:ext uri="{FF2B5EF4-FFF2-40B4-BE49-F238E27FC236}">
-                <a16:creationId xmlns:a16="http://schemas.microsoft.com/office/drawing/2014/main" id="{DFF518DD-9BC6-40A9-8726-B76367D110BF}"/>
-              </a:ext>
-            </a:extLst>
-          </p:cNvPr>
-          <p:cNvSpPr txBox="1"/>
-          <p:nvPr/>
-        </p:nvSpPr>
-        <p:spPr>
-          <a:xfrm>
-            <a:off x="750356" y="81375"/>
-            <a:ext cx="5199182" cy="461665"/>
-          </a:xfrm>
-          <a:prstGeom prst="rect">
-            <a:avLst/>
-          </a:prstGeom>
-          <a:noFill/>
-        </p:spPr>
-        <p:txBody>
-          <a:bodyPr wrap="square" rtlCol="0">
-            <a:spAutoFit/>
-          </a:bodyPr>
-          <a:lstStyle/>
-          <a:p>
-            <a:r>
-              <a:rPr lang="zh-CN" altLang="en-US" sz="2400" b="1" dirty="0">
-                <a:solidFill>
-                  <a:schemeClr val="bg1"/>
-                </a:solidFill>
-                <a:latin typeface="黑体" panose="02010609060101010101" pitchFamily="49" charset="-122"/>
-                <a:ea typeface="黑体" panose="02010609060101010101" pitchFamily="49" charset="-122"/>
-                <a:cs typeface="Times New Roman" panose="02020603050405020304" pitchFamily="18" charset="0"/>
-              </a:rPr>
-              <a:t>基于机器学习的行星大气光谱反演</a:t>
-            </a:r>
-            <a:endParaRPr lang="en-US" altLang="zh-CN" sz="2400" b="1" dirty="0">
-              <a:solidFill>
-                <a:schemeClr val="bg1"/>
-              </a:solidFill>
-              <a:latin typeface="黑体" panose="02010609060101010101" pitchFamily="49" charset="-122"/>
-              <a:ea typeface="黑体" panose="02010609060101010101" pitchFamily="49" charset="-122"/>
-              <a:cs typeface="Times New Roman" panose="02020603050405020304" pitchFamily="18" charset="0"/>
-            </a:endParaRPr>
-          </a:p>
-        </p:txBody>
-      </p:sp>
-      <p:sp>
-        <p:nvSpPr>
-          <p:cNvPr id="6" name="椭圆 5">
-            <a:extLst>
-              <a:ext uri="{FF2B5EF4-FFF2-40B4-BE49-F238E27FC236}">
-                <a16:creationId xmlns:a16="http://schemas.microsoft.com/office/drawing/2014/main" id="{1C5638C8-30D9-4814-8433-EF6D592DBAE2}"/>
-              </a:ext>
-            </a:extLst>
-          </p:cNvPr>
-          <p:cNvSpPr/>
-          <p:nvPr/>
-        </p:nvSpPr>
-        <p:spPr>
-          <a:xfrm rot="19800000">
-            <a:off x="417882" y="231219"/>
-            <a:ext cx="177915" cy="177915"/>
-          </a:xfrm>
-          <a:prstGeom prst="ellipse">
-            <a:avLst/>
-          </a:prstGeom>
-          <a:gradFill>
-            <a:gsLst>
-              <a:gs pos="0">
-                <a:schemeClr val="bg1">
-                  <a:alpha val="70000"/>
-                </a:schemeClr>
-              </a:gs>
-              <a:gs pos="100000">
-                <a:schemeClr val="bg1">
-                  <a:alpha val="0"/>
-                </a:schemeClr>
-              </a:gs>
-            </a:gsLst>
-            <a:lin ang="5400000" scaled="1"/>
-          </a:gradFill>
-          <a:ln>
-            <a:noFill/>
-          </a:ln>
-        </p:spPr>
-        <p:style>
-          <a:lnRef idx="2">
-            <a:schemeClr val="accent1">
-              <a:shade val="50000"/>
-            </a:schemeClr>
-          </a:lnRef>
-          <a:fillRef idx="1">
-            <a:schemeClr val="accent1"/>
-          </a:fillRef>
-          <a:effectRef idx="0">
-            <a:schemeClr val="accent1"/>
-          </a:effectRef>
-          <a:fontRef idx="minor">
-            <a:schemeClr val="lt1"/>
-          </a:fontRef>
-        </p:style>
-        <p:txBody>
-          <a:bodyPr rtlCol="0" anchor="ctr"/>
-          <a:lstStyle/>
-          <a:p>
-            <a:pPr algn="ctr"/>
-            <a:endParaRPr lang="zh-CN" altLang="en-US"/>
-          </a:p>
-        </p:txBody>
-      </p:sp>
-      <p:sp>
-        <p:nvSpPr>
-          <p:cNvPr id="7" name="矩形 6">
-            <a:extLst>
-              <a:ext uri="{FF2B5EF4-FFF2-40B4-BE49-F238E27FC236}">
-                <a16:creationId xmlns:a16="http://schemas.microsoft.com/office/drawing/2014/main" id="{D5287FE0-E135-4BFF-8FFE-C4238C5DE712}"/>
-              </a:ext>
-            </a:extLst>
-          </p:cNvPr>
-          <p:cNvSpPr/>
-          <p:nvPr/>
-        </p:nvSpPr>
-        <p:spPr>
-          <a:xfrm flipV="1">
-            <a:off x="0" y="6780858"/>
-            <a:ext cx="12192000" cy="72000"/>
-          </a:xfrm>
-          <a:prstGeom prst="rect">
-            <a:avLst/>
-          </a:prstGeom>
-          <a:solidFill>
-            <a:srgbClr val="990000"/>
-          </a:solidFill>
-          <a:ln>
-            <a:noFill/>
-          </a:ln>
-        </p:spPr>
-        <p:txBody>
-          <a:bodyPr vert="horz" wrap="square" lIns="91440" tIns="45720" rIns="91440" bIns="45720" numCol="1" anchor="t" anchorCtr="0" compatLnSpc="1">
-            <a:prstTxWarp prst="textNoShape">
-              <a:avLst/>
-            </a:prstTxWarp>
-          </a:bodyPr>
-          <a:lstStyle/>
-          <a:p>
-            <a:endParaRPr lang="zh-CN" altLang="en-US">
-              <a:solidFill>
-                <a:srgbClr val="FF0000"/>
-              </a:solidFill>
-              <a:latin typeface="Arial" panose="020B0604020202020204" pitchFamily="34" charset="0"/>
-              <a:ea typeface="Microsoft YaHei" panose="020B0503020204020204" pitchFamily="34" charset="-122"/>
-              <a:cs typeface="+mn-ea"/>
-              <a:sym typeface="Arial" panose="020B0604020202020204" pitchFamily="34" charset="0"/>
-            </a:endParaRPr>
-          </a:p>
-        </p:txBody>
-      </p:sp>
-      <p:sp>
-        <p:nvSpPr>
-          <p:cNvPr id="8" name="文本框 7">
-            <a:extLst>
-              <a:ext uri="{FF2B5EF4-FFF2-40B4-BE49-F238E27FC236}">
-                <a16:creationId xmlns:a16="http://schemas.microsoft.com/office/drawing/2014/main" id="{17F0888A-E1F4-8AEC-2498-E3BBE9C81CC2}"/>
-              </a:ext>
-            </a:extLst>
-          </p:cNvPr>
-          <p:cNvSpPr txBox="1"/>
-          <p:nvPr/>
-        </p:nvSpPr>
-        <p:spPr>
-          <a:xfrm>
-            <a:off x="1325434" y="834831"/>
-            <a:ext cx="2643040" cy="707886"/>
-          </a:xfrm>
-          <a:prstGeom prst="rect">
-            <a:avLst/>
-          </a:prstGeom>
-          <a:noFill/>
-        </p:spPr>
-        <p:txBody>
-          <a:bodyPr wrap="square" rtlCol="0">
-            <a:spAutoFit/>
-          </a:bodyPr>
-          <a:lstStyle/>
-          <a:p>
-            <a:pPr marL="0" marR="0" lvl="0" indent="0" algn="l" defTabSz="914400" rtl="0" eaLnBrk="1" fontAlgn="auto" latinLnBrk="0" hangingPunct="1">
-              <a:lnSpc>
-                <a:spcPct val="100000"/>
-              </a:lnSpc>
-              <a:spcBef>
-                <a:spcPts val="0"/>
-              </a:spcBef>
-              <a:spcAft>
-                <a:spcPts val="0"/>
-              </a:spcAft>
-              <a:buClrTx/>
-              <a:buSzTx/>
-              <a:buFontTx/>
-              <a:buNone/>
-              <a:tabLst/>
-              <a:defRPr/>
-            </a:pPr>
-            <a:r>
-              <a:rPr kumimoji="0" lang="zh-CN" altLang="en-US" sz="4000" b="1" i="0" u="none" strike="noStrike" kern="1200" cap="none" spc="300" normalizeH="0" baseline="0" noProof="0" dirty="0">
-                <a:ln>
-                  <a:noFill/>
-                </a:ln>
-                <a:solidFill>
-                  <a:schemeClr val="accent1"/>
-                </a:solidFill>
-                <a:effectLst/>
-                <a:uLnTx/>
-                <a:uFillTx/>
-                <a:latin typeface="Arial" panose="020B0604020202020204" pitchFamily="34" charset="0"/>
-                <a:ea typeface="Microsoft YaHei" panose="020B0503020204020204" pitchFamily="34" charset="-122"/>
-                <a:cs typeface="+mn-ea"/>
-                <a:sym typeface="Arial" panose="020B0604020202020204" pitchFamily="34" charset="0"/>
-              </a:rPr>
-              <a:t>目录</a:t>
-            </a:r>
-          </a:p>
-        </p:txBody>
-      </p:sp>
-      <p:grpSp>
-        <p:nvGrpSpPr>
-          <p:cNvPr id="9" name="组合 8">
-            <a:extLst>
-              <a:ext uri="{FF2B5EF4-FFF2-40B4-BE49-F238E27FC236}">
-                <a16:creationId xmlns:a16="http://schemas.microsoft.com/office/drawing/2014/main" id="{06001707-24E3-9C66-D3D4-7B5339E47D28}"/>
-              </a:ext>
-            </a:extLst>
-          </p:cNvPr>
-          <p:cNvGrpSpPr/>
-          <p:nvPr/>
-        </p:nvGrpSpPr>
-        <p:grpSpPr>
-          <a:xfrm>
-            <a:off x="1296445" y="1881136"/>
-            <a:ext cx="6180596" cy="861352"/>
-            <a:chOff x="1296445" y="1777506"/>
-            <a:chExt cx="6180596" cy="861352"/>
-          </a:xfrm>
-        </p:grpSpPr>
-        <p:sp>
-          <p:nvSpPr>
-            <p:cNvPr id="10" name="文本框 9">
-              <a:extLst>
-                <a:ext uri="{FF2B5EF4-FFF2-40B4-BE49-F238E27FC236}">
-                  <a16:creationId xmlns:a16="http://schemas.microsoft.com/office/drawing/2014/main" id="{5BD3F604-1E1A-203A-5603-74646A92AE93}"/>
-                </a:ext>
-              </a:extLst>
-            </p:cNvPr>
-            <p:cNvSpPr txBox="1"/>
-            <p:nvPr/>
-          </p:nvSpPr>
-          <p:spPr>
-            <a:xfrm>
-              <a:off x="1830685" y="2115638"/>
-              <a:ext cx="5646356" cy="523220"/>
-            </a:xfrm>
-            <a:prstGeom prst="rect">
-              <a:avLst/>
-            </a:prstGeom>
-            <a:noFill/>
-          </p:spPr>
-          <p:txBody>
-            <a:bodyPr wrap="square" rtlCol="0">
-              <a:spAutoFit/>
-            </a:bodyPr>
-            <a:lstStyle/>
-            <a:p>
-              <a:pPr marL="0" marR="0" lvl="0" indent="0" algn="l" defTabSz="914400" rtl="0" eaLnBrk="1" fontAlgn="auto" latinLnBrk="0" hangingPunct="1">
-                <a:lnSpc>
-                  <a:spcPct val="100000"/>
-                </a:lnSpc>
-                <a:spcBef>
-                  <a:spcPts val="0"/>
-                </a:spcBef>
-                <a:spcAft>
-                  <a:spcPts val="0"/>
-                </a:spcAft>
-                <a:buClrTx/>
-                <a:buSzTx/>
-                <a:buFontTx/>
-                <a:buNone/>
-                <a:tabLst/>
-                <a:defRPr/>
-              </a:pPr>
-              <a:r>
-                <a:rPr kumimoji="0" lang="zh-CN" altLang="en-US" sz="2800" b="0" i="0" u="none" strike="noStrike" kern="1200" cap="none" spc="400" normalizeH="0" baseline="0" noProof="0" dirty="0">
-                  <a:ln>
-                    <a:noFill/>
-                  </a:ln>
-                  <a:solidFill>
-                    <a:schemeClr val="accent1"/>
-                  </a:solidFill>
-                  <a:effectLst/>
-                  <a:uLnTx/>
-                  <a:uFillTx/>
-                  <a:latin typeface="Arial" panose="020B0604020202020204" pitchFamily="34" charset="0"/>
-                  <a:ea typeface="Microsoft YaHei" panose="020B0503020204020204" pitchFamily="34" charset="-122"/>
-                  <a:cs typeface="+mn-ea"/>
-                  <a:sym typeface="Arial" panose="020B0604020202020204" pitchFamily="34" charset="0"/>
-                </a:rPr>
-                <a:t>背景：行星大气发射光谱</a:t>
-              </a:r>
-            </a:p>
-          </p:txBody>
-        </p:sp>
-        <p:grpSp>
-          <p:nvGrpSpPr>
-            <p:cNvPr id="11" name="组合 10">
-              <a:extLst>
-                <a:ext uri="{FF2B5EF4-FFF2-40B4-BE49-F238E27FC236}">
-                  <a16:creationId xmlns:a16="http://schemas.microsoft.com/office/drawing/2014/main" id="{E3EFB2D7-3FD3-5F38-EDE5-D988A980EFEA}"/>
-                </a:ext>
-              </a:extLst>
-            </p:cNvPr>
-            <p:cNvGrpSpPr/>
-            <p:nvPr/>
-          </p:nvGrpSpPr>
-          <p:grpSpPr>
-            <a:xfrm>
-              <a:off x="1296445" y="1777506"/>
-              <a:ext cx="800100" cy="713161"/>
-              <a:chOff x="6976951" y="1586703"/>
-              <a:chExt cx="800100" cy="713161"/>
-            </a:xfrm>
-          </p:grpSpPr>
-          <p:cxnSp>
-            <p:nvCxnSpPr>
-              <p:cNvPr id="12" name="直接连接符 11">
-                <a:extLst>
-                  <a:ext uri="{FF2B5EF4-FFF2-40B4-BE49-F238E27FC236}">
-                    <a16:creationId xmlns:a16="http://schemas.microsoft.com/office/drawing/2014/main" id="{75F260A5-52C5-A582-0FD8-8633D4E9CF33}"/>
-                  </a:ext>
-                </a:extLst>
-              </p:cNvPr>
-              <p:cNvCxnSpPr/>
-              <p:nvPr/>
-            </p:nvCxnSpPr>
-            <p:spPr>
-              <a:xfrm flipH="1">
-                <a:off x="7160632" y="1829707"/>
-                <a:ext cx="432738" cy="470157"/>
-              </a:xfrm>
-              <a:prstGeom prst="line">
-                <a:avLst/>
-              </a:prstGeom>
-              <a:ln>
-                <a:solidFill>
-                  <a:schemeClr val="tx1">
-                    <a:lumMod val="65000"/>
-                    <a:lumOff val="35000"/>
-                  </a:schemeClr>
-                </a:solidFill>
-              </a:ln>
-            </p:spPr>
-            <p:style>
-              <a:lnRef idx="1">
-                <a:schemeClr val="accent1"/>
-              </a:lnRef>
-              <a:fillRef idx="0">
-                <a:schemeClr val="accent1"/>
-              </a:fillRef>
-              <a:effectRef idx="0">
-                <a:schemeClr val="accent1"/>
-              </a:effectRef>
-              <a:fontRef idx="minor">
-                <a:schemeClr val="tx1"/>
-              </a:fontRef>
-            </p:style>
-          </p:cxnSp>
-          <p:sp>
-            <p:nvSpPr>
-              <p:cNvPr id="13" name="文本框 12">
-                <a:extLst>
-                  <a:ext uri="{FF2B5EF4-FFF2-40B4-BE49-F238E27FC236}">
-                    <a16:creationId xmlns:a16="http://schemas.microsoft.com/office/drawing/2014/main" id="{0F2CBFCE-2CBE-15CA-A9C6-CBD204EAC6E0}"/>
-                  </a:ext>
-                </a:extLst>
-              </p:cNvPr>
-              <p:cNvSpPr txBox="1"/>
-              <p:nvPr/>
-            </p:nvSpPr>
-            <p:spPr>
-              <a:xfrm>
-                <a:off x="6976951" y="1586703"/>
-                <a:ext cx="800100" cy="646331"/>
-              </a:xfrm>
-              <a:prstGeom prst="rect">
-                <a:avLst/>
-              </a:prstGeom>
-              <a:noFill/>
-            </p:spPr>
-            <p:txBody>
-              <a:bodyPr wrap="square" rtlCol="0">
-                <a:spAutoFit/>
-              </a:bodyPr>
-              <a:lstStyle/>
-              <a:p>
-                <a:pPr marL="0" marR="0" lvl="0" indent="0" algn="l" defTabSz="914400" rtl="0" eaLnBrk="1" fontAlgn="auto" latinLnBrk="0" hangingPunct="1">
-                  <a:lnSpc>
-                    <a:spcPct val="100000"/>
-                  </a:lnSpc>
-                  <a:spcBef>
-                    <a:spcPts val="0"/>
-                  </a:spcBef>
-                  <a:spcAft>
-                    <a:spcPts val="0"/>
-                  </a:spcAft>
-                  <a:buClrTx/>
-                  <a:buSzTx/>
-                  <a:buFontTx/>
-                  <a:buNone/>
-                  <a:tabLst/>
-                  <a:defRPr/>
-                </a:pPr>
-                <a:r>
-                  <a:rPr kumimoji="0" lang="en-US" altLang="zh-CN" sz="3600" b="0" i="0" u="none" strike="noStrike" kern="1200" cap="none" spc="0" normalizeH="0" baseline="0" noProof="0" dirty="0">
-                    <a:ln>
-                      <a:noFill/>
-                    </a:ln>
-                    <a:solidFill>
-                      <a:prstClr val="black">
-                        <a:lumMod val="75000"/>
-                        <a:lumOff val="25000"/>
-                      </a:prstClr>
-                    </a:solidFill>
-                    <a:effectLst/>
-                    <a:uLnTx/>
-                    <a:uFillTx/>
-                    <a:latin typeface="Arial" panose="020B0604020202020204" pitchFamily="34" charset="0"/>
-                    <a:ea typeface="Microsoft YaHei" panose="020B0503020204020204" pitchFamily="34" charset="-122"/>
-                    <a:cs typeface="+mn-ea"/>
-                    <a:sym typeface="Arial" panose="020B0604020202020204" pitchFamily="34" charset="0"/>
-                  </a:rPr>
-                  <a:t>1</a:t>
-                </a:r>
-                <a:endParaRPr kumimoji="0" lang="zh-CN" altLang="en-US" sz="3600" b="0" i="0" u="none" strike="noStrike" kern="1200" cap="none" spc="0" normalizeH="0" baseline="0" noProof="0" dirty="0">
-                  <a:ln>
-                    <a:noFill/>
-                  </a:ln>
-                  <a:solidFill>
-                    <a:prstClr val="black">
-                      <a:lumMod val="75000"/>
-                      <a:lumOff val="25000"/>
-                    </a:prstClr>
-                  </a:solidFill>
-                  <a:effectLst/>
-                  <a:uLnTx/>
-                  <a:uFillTx/>
-                  <a:latin typeface="Arial" panose="020B0604020202020204" pitchFamily="34" charset="0"/>
-                  <a:ea typeface="Microsoft YaHei" panose="020B0503020204020204" pitchFamily="34" charset="-122"/>
-                  <a:cs typeface="+mn-ea"/>
-                  <a:sym typeface="Arial" panose="020B0604020202020204" pitchFamily="34" charset="0"/>
-                </a:endParaRPr>
-              </a:p>
-            </p:txBody>
-          </p:sp>
-        </p:grpSp>
-      </p:grpSp>
-      <p:grpSp>
-        <p:nvGrpSpPr>
-          <p:cNvPr id="14" name="组合 13">
-            <a:extLst>
-              <a:ext uri="{FF2B5EF4-FFF2-40B4-BE49-F238E27FC236}">
-                <a16:creationId xmlns:a16="http://schemas.microsoft.com/office/drawing/2014/main" id="{A47A1309-1D08-FFEA-77A3-C213F9082978}"/>
-              </a:ext>
-            </a:extLst>
-          </p:cNvPr>
-          <p:cNvGrpSpPr/>
-          <p:nvPr/>
-        </p:nvGrpSpPr>
-        <p:grpSpPr>
-          <a:xfrm>
-            <a:off x="1296445" y="2996992"/>
-            <a:ext cx="5211233" cy="861352"/>
-            <a:chOff x="1296445" y="1777506"/>
-            <a:chExt cx="5211233" cy="861352"/>
-          </a:xfrm>
-        </p:grpSpPr>
-        <p:sp>
-          <p:nvSpPr>
-            <p:cNvPr id="15" name="文本框 14">
-              <a:extLst>
-                <a:ext uri="{FF2B5EF4-FFF2-40B4-BE49-F238E27FC236}">
-                  <a16:creationId xmlns:a16="http://schemas.microsoft.com/office/drawing/2014/main" id="{7BA4CF5E-A4F0-5556-AFE2-B6341643EF07}"/>
-                </a:ext>
-              </a:extLst>
-            </p:cNvPr>
-            <p:cNvSpPr txBox="1"/>
-            <p:nvPr/>
-          </p:nvSpPr>
-          <p:spPr>
-            <a:xfrm>
-              <a:off x="1830685" y="2115638"/>
-              <a:ext cx="4676993" cy="523220"/>
-            </a:xfrm>
-            <a:prstGeom prst="rect">
-              <a:avLst/>
-            </a:prstGeom>
-            <a:noFill/>
-          </p:spPr>
-          <p:txBody>
-            <a:bodyPr wrap="square" rtlCol="0">
-              <a:spAutoFit/>
-            </a:bodyPr>
-            <a:lstStyle/>
-            <a:p>
-              <a:pPr marL="0" marR="0" lvl="0" indent="0" algn="l" defTabSz="914400" rtl="0" eaLnBrk="1" fontAlgn="auto" latinLnBrk="0" hangingPunct="1">
-                <a:lnSpc>
-                  <a:spcPct val="100000"/>
-                </a:lnSpc>
-                <a:spcBef>
-                  <a:spcPts val="0"/>
-                </a:spcBef>
-                <a:spcAft>
-                  <a:spcPts val="0"/>
-                </a:spcAft>
-                <a:buClrTx/>
-                <a:buSzTx/>
-                <a:buFontTx/>
-                <a:buNone/>
-                <a:tabLst/>
-                <a:defRPr/>
-              </a:pPr>
-              <a:r>
-                <a:rPr kumimoji="0" lang="zh-CN" altLang="en-US" sz="2800" b="0" i="0" u="none" strike="noStrike" kern="1200" cap="none" spc="400" normalizeH="0" baseline="0" noProof="0" dirty="0">
-                  <a:ln>
-                    <a:noFill/>
-                  </a:ln>
-                  <a:solidFill>
-                    <a:prstClr val="black">
-                      <a:lumMod val="75000"/>
-                      <a:lumOff val="25000"/>
-                    </a:prstClr>
-                  </a:solidFill>
-                  <a:effectLst/>
-                  <a:uLnTx/>
-                  <a:uFillTx/>
-                  <a:latin typeface="Arial" panose="020B0604020202020204" pitchFamily="34" charset="0"/>
-                  <a:ea typeface="Microsoft YaHei" panose="020B0503020204020204" pitchFamily="34" charset="-122"/>
-                  <a:cs typeface="+mn-ea"/>
-                  <a:sym typeface="Arial" panose="020B0604020202020204" pitchFamily="34" charset="0"/>
-                </a:rPr>
-                <a:t>实现过程</a:t>
-              </a:r>
-            </a:p>
-          </p:txBody>
-        </p:sp>
-        <p:grpSp>
-          <p:nvGrpSpPr>
-            <p:cNvPr id="16" name="组合 15">
-              <a:extLst>
-                <a:ext uri="{FF2B5EF4-FFF2-40B4-BE49-F238E27FC236}">
-                  <a16:creationId xmlns:a16="http://schemas.microsoft.com/office/drawing/2014/main" id="{60E36DC8-7592-CB84-A6C6-0CF537423A2D}"/>
-                </a:ext>
-              </a:extLst>
-            </p:cNvPr>
-            <p:cNvGrpSpPr/>
-            <p:nvPr/>
-          </p:nvGrpSpPr>
-          <p:grpSpPr>
-            <a:xfrm>
-              <a:off x="1296445" y="1777506"/>
-              <a:ext cx="800100" cy="713161"/>
-              <a:chOff x="6976951" y="1586703"/>
-              <a:chExt cx="800100" cy="713161"/>
-            </a:xfrm>
-          </p:grpSpPr>
-          <p:sp>
-            <p:nvSpPr>
-              <p:cNvPr id="17" name="文本框 16">
-                <a:extLst>
-                  <a:ext uri="{FF2B5EF4-FFF2-40B4-BE49-F238E27FC236}">
-                    <a16:creationId xmlns:a16="http://schemas.microsoft.com/office/drawing/2014/main" id="{C94D2E1D-60D1-499A-5489-1020047CE376}"/>
-                  </a:ext>
-                </a:extLst>
-              </p:cNvPr>
-              <p:cNvSpPr txBox="1"/>
-              <p:nvPr/>
-            </p:nvSpPr>
-            <p:spPr>
-              <a:xfrm>
-                <a:off x="6976951" y="1586703"/>
-                <a:ext cx="800100" cy="646331"/>
-              </a:xfrm>
-              <a:prstGeom prst="rect">
-                <a:avLst/>
-              </a:prstGeom>
-              <a:noFill/>
-            </p:spPr>
-            <p:txBody>
-              <a:bodyPr wrap="square" rtlCol="0">
-                <a:spAutoFit/>
-              </a:bodyPr>
-              <a:lstStyle/>
-              <a:p>
-                <a:pPr marL="0" marR="0" lvl="0" indent="0" algn="l" defTabSz="914400" rtl="0" eaLnBrk="1" fontAlgn="auto" latinLnBrk="0" hangingPunct="1">
-                  <a:lnSpc>
-                    <a:spcPct val="100000"/>
-                  </a:lnSpc>
-                  <a:spcBef>
-                    <a:spcPts val="0"/>
-                  </a:spcBef>
-                  <a:spcAft>
-                    <a:spcPts val="0"/>
-                  </a:spcAft>
-                  <a:buClrTx/>
-                  <a:buSzTx/>
-                  <a:buFontTx/>
-                  <a:buNone/>
-                  <a:tabLst/>
-                  <a:defRPr/>
-                </a:pPr>
-                <a:r>
-                  <a:rPr kumimoji="0" lang="en-US" altLang="zh-CN" sz="3600" b="0" i="0" u="none" strike="noStrike" kern="1200" cap="none" spc="0" normalizeH="0" baseline="0" noProof="0" dirty="0">
-                    <a:ln>
-                      <a:noFill/>
-                    </a:ln>
-                    <a:solidFill>
-                      <a:prstClr val="black">
-                        <a:lumMod val="75000"/>
-                        <a:lumOff val="25000"/>
-                      </a:prstClr>
-                    </a:solidFill>
-                    <a:effectLst/>
-                    <a:uLnTx/>
-                    <a:uFillTx/>
-                    <a:latin typeface="Arial" panose="020B0604020202020204" pitchFamily="34" charset="0"/>
-                    <a:ea typeface="Microsoft YaHei" panose="020B0503020204020204" pitchFamily="34" charset="-122"/>
-                    <a:cs typeface="+mn-ea"/>
-                    <a:sym typeface="Arial" panose="020B0604020202020204" pitchFamily="34" charset="0"/>
-                  </a:rPr>
-                  <a:t>2</a:t>
-                </a:r>
-                <a:endParaRPr kumimoji="0" lang="zh-CN" altLang="en-US" sz="3600" b="0" i="0" u="none" strike="noStrike" kern="1200" cap="none" spc="0" normalizeH="0" baseline="0" noProof="0" dirty="0">
-                  <a:ln>
-                    <a:noFill/>
-                  </a:ln>
-                  <a:solidFill>
-                    <a:prstClr val="black">
-                      <a:lumMod val="75000"/>
-                      <a:lumOff val="25000"/>
-                    </a:prstClr>
-                  </a:solidFill>
-                  <a:effectLst/>
-                  <a:uLnTx/>
-                  <a:uFillTx/>
-                  <a:latin typeface="Arial" panose="020B0604020202020204" pitchFamily="34" charset="0"/>
-                  <a:ea typeface="Microsoft YaHei" panose="020B0503020204020204" pitchFamily="34" charset="-122"/>
-                  <a:cs typeface="+mn-ea"/>
-                  <a:sym typeface="Arial" panose="020B0604020202020204" pitchFamily="34" charset="0"/>
-                </a:endParaRPr>
-              </a:p>
-            </p:txBody>
-          </p:sp>
-          <p:cxnSp>
-            <p:nvCxnSpPr>
-              <p:cNvPr id="18" name="直接连接符 17">
-                <a:extLst>
-                  <a:ext uri="{FF2B5EF4-FFF2-40B4-BE49-F238E27FC236}">
-                    <a16:creationId xmlns:a16="http://schemas.microsoft.com/office/drawing/2014/main" id="{5AA8D459-F643-C1B8-4686-3BAAC6CEEBE9}"/>
-                  </a:ext>
-                </a:extLst>
-              </p:cNvPr>
-              <p:cNvCxnSpPr/>
-              <p:nvPr/>
-            </p:nvCxnSpPr>
-            <p:spPr>
-              <a:xfrm flipH="1">
-                <a:off x="7160632" y="1829707"/>
-                <a:ext cx="432738" cy="470157"/>
-              </a:xfrm>
-              <a:prstGeom prst="line">
-                <a:avLst/>
-              </a:prstGeom>
-              <a:ln>
-                <a:solidFill>
-                  <a:schemeClr val="tx1">
-                    <a:lumMod val="50000"/>
-                    <a:lumOff val="50000"/>
-                  </a:schemeClr>
-                </a:solidFill>
-              </a:ln>
-            </p:spPr>
-            <p:style>
-              <a:lnRef idx="1">
-                <a:schemeClr val="accent1"/>
-              </a:lnRef>
-              <a:fillRef idx="0">
-                <a:schemeClr val="accent1"/>
-              </a:fillRef>
-              <a:effectRef idx="0">
-                <a:schemeClr val="accent1"/>
-              </a:effectRef>
-              <a:fontRef idx="minor">
-                <a:schemeClr val="tx1"/>
-              </a:fontRef>
-            </p:style>
-          </p:cxnSp>
-        </p:grpSp>
-      </p:grpSp>
-      <p:grpSp>
-        <p:nvGrpSpPr>
-          <p:cNvPr id="19" name="组合 18">
-            <a:extLst>
-              <a:ext uri="{FF2B5EF4-FFF2-40B4-BE49-F238E27FC236}">
-                <a16:creationId xmlns:a16="http://schemas.microsoft.com/office/drawing/2014/main" id="{790BBF90-D8DE-2E2E-998C-61CDEB031C06}"/>
-              </a:ext>
-            </a:extLst>
-          </p:cNvPr>
-          <p:cNvGrpSpPr/>
-          <p:nvPr/>
-        </p:nvGrpSpPr>
-        <p:grpSpPr>
-          <a:xfrm>
-            <a:off x="1296445" y="4112848"/>
-            <a:ext cx="4890599" cy="861352"/>
-            <a:chOff x="1296445" y="1777506"/>
-            <a:chExt cx="4890599" cy="861352"/>
-          </a:xfrm>
-        </p:grpSpPr>
-        <p:sp>
-          <p:nvSpPr>
-            <p:cNvPr id="20" name="文本框 19">
-              <a:extLst>
-                <a:ext uri="{FF2B5EF4-FFF2-40B4-BE49-F238E27FC236}">
-                  <a16:creationId xmlns:a16="http://schemas.microsoft.com/office/drawing/2014/main" id="{B7937A3C-DE23-C896-142E-DE70A1314A47}"/>
-                </a:ext>
-              </a:extLst>
-            </p:cNvPr>
-            <p:cNvSpPr txBox="1"/>
-            <p:nvPr/>
-          </p:nvSpPr>
-          <p:spPr>
-            <a:xfrm>
-              <a:off x="1830685" y="2115638"/>
-              <a:ext cx="4356359" cy="523220"/>
-            </a:xfrm>
-            <a:prstGeom prst="rect">
-              <a:avLst/>
-            </a:prstGeom>
-            <a:noFill/>
-          </p:spPr>
-          <p:txBody>
-            <a:bodyPr wrap="square" rtlCol="0">
-              <a:spAutoFit/>
-            </a:bodyPr>
-            <a:lstStyle/>
-            <a:p>
-              <a:pPr marL="0" marR="0" lvl="0" indent="0" algn="l" defTabSz="914400" rtl="0" eaLnBrk="1" fontAlgn="auto" latinLnBrk="0" hangingPunct="1">
-                <a:lnSpc>
-                  <a:spcPct val="100000"/>
-                </a:lnSpc>
-                <a:spcBef>
-                  <a:spcPts val="0"/>
-                </a:spcBef>
-                <a:spcAft>
-                  <a:spcPts val="0"/>
-                </a:spcAft>
-                <a:buClrTx/>
-                <a:buSzTx/>
-                <a:buFontTx/>
-                <a:buNone/>
-                <a:tabLst/>
-                <a:defRPr/>
-              </a:pPr>
-              <a:r>
-                <a:rPr kumimoji="0" lang="zh-CN" altLang="en-US" sz="2800" b="0" i="0" u="none" strike="noStrike" kern="1200" cap="none" spc="400" normalizeH="0" baseline="0" noProof="0" dirty="0">
-                  <a:ln>
-                    <a:noFill/>
-                  </a:ln>
-                  <a:solidFill>
-                    <a:prstClr val="black">
-                      <a:lumMod val="75000"/>
-                      <a:lumOff val="25000"/>
-                    </a:prstClr>
-                  </a:solidFill>
-                  <a:effectLst/>
-                  <a:uLnTx/>
-                  <a:uFillTx/>
-                  <a:latin typeface="Arial" panose="020B0604020202020204" pitchFamily="34" charset="0"/>
-                  <a:ea typeface="Microsoft YaHei" panose="020B0503020204020204" pitchFamily="34" charset="-122"/>
-                  <a:cs typeface="+mn-ea"/>
-                  <a:sym typeface="Arial" panose="020B0604020202020204" pitchFamily="34" charset="0"/>
-                </a:rPr>
-                <a:t>结果</a:t>
-              </a:r>
-              <a:r>
-                <a:rPr kumimoji="0" lang="en-US" altLang="zh-CN" sz="2800" b="0" i="0" u="none" strike="noStrike" kern="1200" cap="none" spc="400" normalizeH="0" baseline="0" noProof="0" dirty="0">
-                  <a:ln>
-                    <a:noFill/>
-                  </a:ln>
-                  <a:solidFill>
-                    <a:prstClr val="black">
-                      <a:lumMod val="75000"/>
-                      <a:lumOff val="25000"/>
-                    </a:prstClr>
-                  </a:solidFill>
-                  <a:effectLst/>
-                  <a:uLnTx/>
-                  <a:uFillTx/>
-                  <a:latin typeface="Arial" panose="020B0604020202020204" pitchFamily="34" charset="0"/>
-                  <a:ea typeface="Microsoft YaHei" panose="020B0503020204020204" pitchFamily="34" charset="-122"/>
-                  <a:cs typeface="+mn-ea"/>
-                  <a:sym typeface="Arial" panose="020B0604020202020204" pitchFamily="34" charset="0"/>
-                </a:rPr>
-                <a:t>&amp;</a:t>
-              </a:r>
-              <a:r>
-                <a:rPr kumimoji="0" lang="zh-CN" altLang="en-US" sz="2800" b="0" i="0" u="none" strike="noStrike" kern="1200" cap="none" spc="400" normalizeH="0" baseline="0" noProof="0" dirty="0">
-                  <a:ln>
-                    <a:noFill/>
-                  </a:ln>
-                  <a:solidFill>
-                    <a:prstClr val="black">
-                      <a:lumMod val="75000"/>
-                      <a:lumOff val="25000"/>
-                    </a:prstClr>
-                  </a:solidFill>
-                  <a:effectLst/>
-                  <a:uLnTx/>
-                  <a:uFillTx/>
-                  <a:latin typeface="Arial" panose="020B0604020202020204" pitchFamily="34" charset="0"/>
-                  <a:ea typeface="Microsoft YaHei" panose="020B0503020204020204" pitchFamily="34" charset="-122"/>
-                  <a:cs typeface="+mn-ea"/>
-                  <a:sym typeface="Arial" panose="020B0604020202020204" pitchFamily="34" charset="0"/>
-                </a:rPr>
-                <a:t>讨论</a:t>
-              </a:r>
-            </a:p>
-          </p:txBody>
-        </p:sp>
-        <p:grpSp>
-          <p:nvGrpSpPr>
-            <p:cNvPr id="21" name="组合 20">
-              <a:extLst>
-                <a:ext uri="{FF2B5EF4-FFF2-40B4-BE49-F238E27FC236}">
-                  <a16:creationId xmlns:a16="http://schemas.microsoft.com/office/drawing/2014/main" id="{E4EB9E75-13E2-C9B6-049F-2B5E6D81EDF2}"/>
-                </a:ext>
-              </a:extLst>
-            </p:cNvPr>
-            <p:cNvGrpSpPr/>
-            <p:nvPr/>
-          </p:nvGrpSpPr>
-          <p:grpSpPr>
-            <a:xfrm>
-              <a:off x="1296445" y="1777506"/>
-              <a:ext cx="800100" cy="713161"/>
-              <a:chOff x="6976951" y="1586703"/>
-              <a:chExt cx="800100" cy="713161"/>
-            </a:xfrm>
-          </p:grpSpPr>
-          <p:sp>
-            <p:nvSpPr>
-              <p:cNvPr id="22" name="文本框 21">
-                <a:extLst>
-                  <a:ext uri="{FF2B5EF4-FFF2-40B4-BE49-F238E27FC236}">
-                    <a16:creationId xmlns:a16="http://schemas.microsoft.com/office/drawing/2014/main" id="{43830E6A-A1BC-902A-571F-2395F545A7A1}"/>
-                  </a:ext>
-                </a:extLst>
-              </p:cNvPr>
-              <p:cNvSpPr txBox="1"/>
-              <p:nvPr/>
-            </p:nvSpPr>
-            <p:spPr>
-              <a:xfrm>
-                <a:off x="6976951" y="1586703"/>
-                <a:ext cx="800100" cy="646331"/>
-              </a:xfrm>
-              <a:prstGeom prst="rect">
-                <a:avLst/>
-              </a:prstGeom>
-              <a:noFill/>
-            </p:spPr>
-            <p:txBody>
-              <a:bodyPr wrap="square" rtlCol="0">
-                <a:spAutoFit/>
-              </a:bodyPr>
-              <a:lstStyle/>
-              <a:p>
-                <a:pPr marL="0" marR="0" lvl="0" indent="0" algn="l" defTabSz="914400" rtl="0" eaLnBrk="1" fontAlgn="auto" latinLnBrk="0" hangingPunct="1">
-                  <a:lnSpc>
-                    <a:spcPct val="100000"/>
-                  </a:lnSpc>
-                  <a:spcBef>
-                    <a:spcPts val="0"/>
-                  </a:spcBef>
-                  <a:spcAft>
-                    <a:spcPts val="0"/>
-                  </a:spcAft>
-                  <a:buClrTx/>
-                  <a:buSzTx/>
-                  <a:buFontTx/>
-                  <a:buNone/>
-                  <a:tabLst/>
-                  <a:defRPr/>
-                </a:pPr>
-                <a:r>
-                  <a:rPr lang="en-US" altLang="zh-CN" sz="3600" dirty="0">
-                    <a:solidFill>
-                      <a:prstClr val="black">
-                        <a:lumMod val="75000"/>
-                        <a:lumOff val="25000"/>
-                      </a:prstClr>
-                    </a:solidFill>
-                    <a:latin typeface="Arial" panose="020B0604020202020204" pitchFamily="34" charset="0"/>
-                    <a:ea typeface="Microsoft YaHei" panose="020B0503020204020204" pitchFamily="34" charset="-122"/>
-                    <a:cs typeface="+mn-ea"/>
-                    <a:sym typeface="Arial" panose="020B0604020202020204" pitchFamily="34" charset="0"/>
-                  </a:rPr>
-                  <a:t>3</a:t>
-                </a:r>
-                <a:endParaRPr kumimoji="0" lang="zh-CN" altLang="en-US" sz="3600" b="0" i="0" u="none" strike="noStrike" kern="1200" cap="none" spc="0" normalizeH="0" baseline="0" noProof="0" dirty="0">
-                  <a:ln>
-                    <a:noFill/>
-                  </a:ln>
-                  <a:solidFill>
-                    <a:prstClr val="black">
-                      <a:lumMod val="75000"/>
-                      <a:lumOff val="25000"/>
-                    </a:prstClr>
-                  </a:solidFill>
-                  <a:effectLst/>
-                  <a:uLnTx/>
-                  <a:uFillTx/>
-                  <a:latin typeface="Arial" panose="020B0604020202020204" pitchFamily="34" charset="0"/>
-                  <a:ea typeface="Microsoft YaHei" panose="020B0503020204020204" pitchFamily="34" charset="-122"/>
-                  <a:cs typeface="+mn-ea"/>
-                  <a:sym typeface="Arial" panose="020B0604020202020204" pitchFamily="34" charset="0"/>
-                </a:endParaRPr>
-              </a:p>
-            </p:txBody>
-          </p:sp>
-          <p:cxnSp>
-            <p:nvCxnSpPr>
-              <p:cNvPr id="23" name="直接连接符 22">
-                <a:extLst>
-                  <a:ext uri="{FF2B5EF4-FFF2-40B4-BE49-F238E27FC236}">
-                    <a16:creationId xmlns:a16="http://schemas.microsoft.com/office/drawing/2014/main" id="{94EBB447-AD1F-647D-AF7A-235C390B4818}"/>
-                  </a:ext>
-                </a:extLst>
-              </p:cNvPr>
-              <p:cNvCxnSpPr/>
-              <p:nvPr/>
-            </p:nvCxnSpPr>
-            <p:spPr>
-              <a:xfrm flipH="1">
-                <a:off x="7160632" y="1829707"/>
-                <a:ext cx="432738" cy="470157"/>
-              </a:xfrm>
-              <a:prstGeom prst="line">
-                <a:avLst/>
-              </a:prstGeom>
-              <a:ln>
-                <a:solidFill>
-                  <a:schemeClr val="tx1">
-                    <a:lumMod val="50000"/>
-                    <a:lumOff val="50000"/>
-                  </a:schemeClr>
-                </a:solidFill>
-              </a:ln>
-            </p:spPr>
-            <p:style>
-              <a:lnRef idx="1">
-                <a:schemeClr val="accent1"/>
-              </a:lnRef>
-              <a:fillRef idx="0">
-                <a:schemeClr val="accent1"/>
-              </a:fillRef>
-              <a:effectRef idx="0">
-                <a:schemeClr val="accent1"/>
-              </a:effectRef>
-              <a:fontRef idx="minor">
-                <a:schemeClr val="tx1"/>
-              </a:fontRef>
-            </p:style>
-          </p:cxnSp>
-        </p:grpSp>
-      </p:grpSp>
-      <p:sp>
-        <p:nvSpPr>
-          <p:cNvPr id="29" name="灯片编号占位符 28">
-            <a:extLst>
-              <a:ext uri="{FF2B5EF4-FFF2-40B4-BE49-F238E27FC236}">
-                <a16:creationId xmlns:a16="http://schemas.microsoft.com/office/drawing/2014/main" id="{02569B93-675D-EFDC-ED96-8F8F01109B3D}"/>
-              </a:ext>
-            </a:extLst>
-          </p:cNvPr>
-          <p:cNvSpPr>
-            <a:spLocks noGrp="1"/>
-          </p:cNvSpPr>
-          <p:nvPr>
-            <p:ph type="sldNum" sz="quarter" idx="12"/>
-          </p:nvPr>
-        </p:nvSpPr>
-        <p:spPr/>
-        <p:txBody>
-          <a:bodyPr/>
-          <a:lstStyle/>
-          <a:p>
-            <a:fld id="{A64A0CBB-2614-41AB-884D-C0633239B6E4}" type="slidenum">
-              <a:rPr lang="zh-CN" altLang="en-US" smtClean="0"/>
-              <a:t>2</a:t>
-            </a:fld>
-            <a:endParaRPr lang="zh-CN" altLang="en-US"/>
-          </a:p>
-        </p:txBody>
-      </p:sp>
-    </p:spTree>
-    <p:extLst>
-      <p:ext uri="{BB962C8B-B14F-4D97-AF65-F5344CB8AC3E}">
-        <p14:creationId xmlns:p14="http://schemas.microsoft.com/office/powerpoint/2010/main" val="3053133134"/>
-      </p:ext>
-    </p:extLst>
-  </p:cSld>
-  <p:clrMapOvr>
-    <a:masterClrMapping/>
-  </p:clrMapOvr>
-</p:sld>
-</file>
-
 <file path=ppt/slides/slide3.xml><?xml version="1.0" encoding="utf-8"?>
 <p:sld xmlns:a="http://schemas.openxmlformats.org/drawingml/2006/main" xmlns:r="http://schemas.openxmlformats.org/officeDocument/2006/relationships" xmlns:p="http://schemas.openxmlformats.org/presentationml/2006/main">
   <p:cSld>
@@ -25169,8 +25789,8 @@
           </a:p>
         </p:txBody>
       </p:sp>
-      <mc:AlternateContent xmlns:mc="http://schemas.openxmlformats.org/markup-compatibility/2006">
-        <mc:Choice xmlns:a14="http://schemas.microsoft.com/office/drawing/2010/main" Requires="a14">
+      <mc:AlternateContent xmlns:mc="http://schemas.openxmlformats.org/markup-compatibility/2006" xmlns:a14="http://schemas.microsoft.com/office/drawing/2010/main">
+        <mc:Choice Requires="a14">
           <p:sp>
             <p:nvSpPr>
               <p:cNvPr id="10" name="文本框 9">
@@ -25386,7 +26006,7 @@
             </p:txBody>
           </p:sp>
         </mc:Choice>
-        <mc:Fallback>
+        <mc:Fallback xmlns="">
           <p:sp>
             <p:nvSpPr>
               <p:cNvPr id="10" name="文本框 9">
@@ -28958,7 +29578,7 @@
             </p:nvSpPr>
             <p:spPr>
               <a:xfrm>
-                <a:off x="6145306" y="1375646"/>
+                <a:off x="6145306" y="1120148"/>
                 <a:ext cx="5590855" cy="4832092"/>
               </a:xfrm>
               <a:prstGeom prst="rect">
@@ -29349,7 +29969,7 @@
             </p:nvSpPr>
             <p:spPr>
               <a:xfrm>
-                <a:off x="6145306" y="1375646"/>
+                <a:off x="6145306" y="1120148"/>
                 <a:ext cx="5590855" cy="4832092"/>
               </a:xfrm>
               <a:prstGeom prst="rect">
@@ -29860,6 +30480,7 @@
       <p:pic>
         <p:nvPicPr>
           <p:cNvPr id="12" name="图片 11">
+            <a:hlinkClick r:id="rId6" action="ppaction://hlinksldjump"/>
             <a:extLst>
               <a:ext uri="{FF2B5EF4-FFF2-40B4-BE49-F238E27FC236}">
                 <a16:creationId xmlns:a16="http://schemas.microsoft.com/office/drawing/2014/main" id="{447700BD-1E79-D2F3-D4DE-8E7422395F03}"/>
@@ -29872,7 +30493,7 @@
           <p:nvPr/>
         </p:nvPicPr>
         <p:blipFill>
-          <a:blip r:embed="rId6">
+          <a:blip r:embed="rId7">
             <a:extLst>
               <a:ext uri="{28A0092B-C50C-407E-A947-70E740481C1C}">
                 <a14:useLocalDpi xmlns:a14="http://schemas.microsoft.com/office/drawing/2010/main" val="0"/>
@@ -29908,7 +30529,7 @@
           <p:nvPr/>
         </p:nvPicPr>
         <p:blipFill>
-          <a:blip r:embed="rId7">
+          <a:blip r:embed="rId8">
             <a:extLst>
               <a:ext uri="{28A0092B-C50C-407E-A947-70E740481C1C}">
                 <a14:useLocalDpi xmlns:a14="http://schemas.microsoft.com/office/drawing/2010/main" val="0"/>
@@ -30142,7 +30763,7 @@
                 <a:avLst/>
               </a:prstGeom>
               <a:blipFill>
-                <a:blip r:embed="rId8"/>
+                <a:blip r:embed="rId9"/>
                 <a:stretch>
                   <a:fillRect l="-1670" t="-9211" b="-30263"/>
                 </a:stretch>

</xml_diff>

<commit_message>
Site updated: 2024-12-26 13:57:49
</commit_message>
<xml_diff>
--- a/pdf/PASRML/王艺霖_基于机器学习的行星大气光谱反演.pptx
+++ b/pdf/PASRML/王艺霖_基于机器学习的行星大气光谱反演.pptx
@@ -19392,6 +19392,42 @@
           <a:chExt cx="0" cy="0"/>
         </a:xfrm>
       </p:grpSpPr>
+      <p:pic>
+        <p:nvPicPr>
+          <p:cNvPr id="14" name="图片 13">
+            <a:extLst>
+              <a:ext uri="{FF2B5EF4-FFF2-40B4-BE49-F238E27FC236}">
+                <a16:creationId xmlns:a16="http://schemas.microsoft.com/office/drawing/2014/main" id="{A43AF772-C942-6CA1-9741-456510D72CE6}"/>
+              </a:ext>
+            </a:extLst>
+          </p:cNvPr>
+          <p:cNvPicPr>
+            <a:picLocks noChangeAspect="1"/>
+          </p:cNvPicPr>
+          <p:nvPr/>
+        </p:nvPicPr>
+        <p:blipFill>
+          <a:blip r:embed="rId3">
+            <a:extLst>
+              <a:ext uri="{28A0092B-C50C-407E-A947-70E740481C1C}">
+                <a14:useLocalDpi xmlns:a14="http://schemas.microsoft.com/office/drawing/2010/main" val="0"/>
+              </a:ext>
+            </a:extLst>
+          </a:blip>
+          <a:stretch>
+            <a:fillRect/>
+          </a:stretch>
+        </p:blipFill>
+        <p:spPr>
+          <a:xfrm>
+            <a:off x="6314400" y="882000"/>
+            <a:ext cx="5202000" cy="5202000"/>
+          </a:xfrm>
+          <a:prstGeom prst="rect">
+            <a:avLst/>
+          </a:prstGeom>
+        </p:spPr>
+      </p:pic>
       <p:sp>
         <p:nvSpPr>
           <p:cNvPr id="2" name="矩形 1">
@@ -19475,7 +19511,7 @@
           <p:nvPr/>
         </p:nvPicPr>
         <p:blipFill rotWithShape="1">
-          <a:blip r:embed="rId3">
+          <a:blip r:embed="rId4">
             <a:alphaModFix amt="10000"/>
             <a:extLst>
               <a:ext uri="{28A0092B-C50C-407E-A947-70E740481C1C}">
@@ -19511,7 +19547,7 @@
           <p:nvPr/>
         </p:nvPicPr>
         <p:blipFill>
-          <a:blip r:embed="rId4" cstate="print">
+          <a:blip r:embed="rId5" cstate="print">
             <a:extLst>
               <a:ext uri="{28A0092B-C50C-407E-A947-70E740481C1C}">
                 <a14:useLocalDpi xmlns:a14="http://schemas.microsoft.com/office/drawing/2010/main" val="0"/>
@@ -19737,7 +19773,7 @@
           <p:nvPr/>
         </p:nvPicPr>
         <p:blipFill>
-          <a:blip r:embed="rId5">
+          <a:blip r:embed="rId6">
             <a:extLst>
               <a:ext uri="{28A0092B-C50C-407E-A947-70E740481C1C}">
                 <a14:useLocalDpi xmlns:a14="http://schemas.microsoft.com/office/drawing/2010/main" val="0"/>
@@ -19752,42 +19788,6 @@
           <a:xfrm>
             <a:off x="385321" y="940225"/>
             <a:ext cx="5493178" cy="4184165"/>
-          </a:xfrm>
-          <a:prstGeom prst="rect">
-            <a:avLst/>
-          </a:prstGeom>
-        </p:spPr>
-      </p:pic>
-      <p:pic>
-        <p:nvPicPr>
-          <p:cNvPr id="11" name="图片 10">
-            <a:extLst>
-              <a:ext uri="{FF2B5EF4-FFF2-40B4-BE49-F238E27FC236}">
-                <a16:creationId xmlns:a16="http://schemas.microsoft.com/office/drawing/2014/main" id="{7F3DB8B8-EBFB-4A44-63CD-2890238583E5}"/>
-              </a:ext>
-            </a:extLst>
-          </p:cNvPr>
-          <p:cNvPicPr>
-            <a:picLocks noChangeAspect="1"/>
-          </p:cNvPicPr>
-          <p:nvPr/>
-        </p:nvPicPr>
-        <p:blipFill>
-          <a:blip r:embed="rId6">
-            <a:extLst>
-              <a:ext uri="{28A0092B-C50C-407E-A947-70E740481C1C}">
-                <a14:useLocalDpi xmlns:a14="http://schemas.microsoft.com/office/drawing/2010/main" val="0"/>
-              </a:ext>
-            </a:extLst>
-          </a:blip>
-          <a:stretch>
-            <a:fillRect/>
-          </a:stretch>
-        </p:blipFill>
-        <p:spPr>
-          <a:xfrm>
-            <a:off x="6313503" y="880782"/>
-            <a:ext cx="5207616" cy="5201032"/>
           </a:xfrm>
           <a:prstGeom prst="rect">
             <a:avLst/>
@@ -21510,7 +21510,7 @@
         <p:spPr>
           <a:xfrm>
             <a:off x="894229" y="5002306"/>
-            <a:ext cx="5055309" cy="1234184"/>
+            <a:ext cx="8895230" cy="1234184"/>
           </a:xfrm>
           <a:prstGeom prst="rect">
             <a:avLst/>
@@ -21569,7 +21569,35 @@
                 <a:latin typeface="Times New Roman" panose="02020603050405020304" pitchFamily="18" charset="0"/>
                 <a:cs typeface="Times New Roman" panose="02020603050405020304" pitchFamily="18" charset="0"/>
               </a:rPr>
-              <a:t> !</a:t>
+              <a:t> ! </a:t>
+            </a:r>
+            <a:r>
+              <a:rPr lang="zh-CN" altLang="en-US" sz="2400" dirty="0">
+                <a:latin typeface="Times New Roman" panose="02020603050405020304" pitchFamily="18" charset="0"/>
+                <a:cs typeface="Times New Roman" panose="02020603050405020304" pitchFamily="18" charset="0"/>
+              </a:rPr>
+              <a:t>（</a:t>
+            </a:r>
+            <a:r>
+              <a:rPr lang="en-US" altLang="zh-CN" sz="2400" dirty="0" err="1">
+                <a:latin typeface="Times New Roman" panose="02020603050405020304" pitchFamily="18" charset="0"/>
+                <a:cs typeface="Times New Roman" panose="02020603050405020304" pitchFamily="18" charset="0"/>
+              </a:rPr>
+              <a:t>slides+data+source</a:t>
+            </a:r>
+            <a:r>
+              <a:rPr lang="en-US" altLang="zh-CN" sz="2400" dirty="0">
+                <a:latin typeface="Times New Roman" panose="02020603050405020304" pitchFamily="18" charset="0"/>
+                <a:cs typeface="Times New Roman" panose="02020603050405020304" pitchFamily="18" charset="0"/>
+              </a:rPr>
+              <a:t> code</a:t>
+            </a:r>
+            <a:r>
+              <a:rPr lang="zh-CN" altLang="en-US" sz="2400" dirty="0">
+                <a:latin typeface="Times New Roman" panose="02020603050405020304" pitchFamily="18" charset="0"/>
+                <a:cs typeface="Times New Roman" panose="02020603050405020304" pitchFamily="18" charset="0"/>
+              </a:rPr>
+              <a:t>）</a:t>
             </a:r>
             <a:endParaRPr lang="en-US" altLang="zh-CN" sz="2400" dirty="0">
               <a:latin typeface="+mn-ea"/>
@@ -29562,8 +29590,8 @@
           </a:prstGeom>
         </p:spPr>
       </p:pic>
-      <mc:AlternateContent xmlns:mc="http://schemas.openxmlformats.org/markup-compatibility/2006">
-        <mc:Choice xmlns:a14="http://schemas.microsoft.com/office/drawing/2010/main" Requires="a14">
+      <mc:AlternateContent xmlns:mc="http://schemas.openxmlformats.org/markup-compatibility/2006" xmlns:a14="http://schemas.microsoft.com/office/drawing/2010/main">
+        <mc:Choice Requires="a14">
           <p:sp>
             <p:nvSpPr>
               <p:cNvPr id="12" name="文本框 11">
@@ -29952,7 +29980,7 @@
             </p:txBody>
           </p:sp>
         </mc:Choice>
-        <mc:Fallback>
+        <mc:Fallback xmlns="">
           <p:sp>
             <p:nvSpPr>
               <p:cNvPr id="12" name="文本框 11">

</xml_diff>